<commit_message>
(Zac) Added more information to Final Presentation Slides.
</commit_message>
<xml_diff>
--- a/doc/final_presentation.pptx
+++ b/doc/final_presentation.pptx
@@ -382,7 +382,7 @@
     </p:spTree>
     <p:extLst>
       <p:ext uri="{BB962C8B-B14F-4D97-AF65-F5344CB8AC3E}">
-        <p14:creationId xmlns:p14="http://schemas.microsoft.com/office/powerpoint/2010/main" xmlns="" val="3494936748"/>
+        <p14:creationId xmlns="" xmlns:p14="http://schemas.microsoft.com/office/powerpoint/2010/main" val="3494936748"/>
       </p:ext>
     </p:extLst>
   </p:cSld>
@@ -565,7 +565,7 @@
     </p:spTree>
     <p:extLst>
       <p:ext uri="{BB962C8B-B14F-4D97-AF65-F5344CB8AC3E}">
-        <p14:creationId xmlns:p14="http://schemas.microsoft.com/office/powerpoint/2010/main" xmlns="" val="1767483421"/>
+        <p14:creationId xmlns="" xmlns:p14="http://schemas.microsoft.com/office/powerpoint/2010/main" val="1767483421"/>
       </p:ext>
     </p:extLst>
   </p:cSld>
@@ -658,7 +658,7 @@
     </p:spTree>
     <p:extLst>
       <p:ext uri="{BB962C8B-B14F-4D97-AF65-F5344CB8AC3E}">
-        <p14:creationId xmlns:p14="http://schemas.microsoft.com/office/powerpoint/2010/main" xmlns="" val="387822502"/>
+        <p14:creationId xmlns="" xmlns:p14="http://schemas.microsoft.com/office/powerpoint/2010/main" val="387822502"/>
       </p:ext>
     </p:extLst>
   </p:cSld>
@@ -2264,7 +2264,7 @@
     <a:masterClrMapping/>
   </p:clrMapOvr>
   <mc:AlternateContent xmlns:mc="http://schemas.openxmlformats.org/markup-compatibility/2006">
-    <mc:Choice xmlns:p14="http://schemas.microsoft.com/office/powerpoint/2010/main" xmlns="" Requires="p14">
+    <mc:Choice xmlns="" xmlns:p14="http://schemas.microsoft.com/office/powerpoint/2010/main" Requires="p14">
       <p:transition spd="slow" p14:dur="2000">
         <p14:ferris dir="l"/>
       </p:transition>
@@ -3381,7 +3381,7 @@
     <a:masterClrMapping/>
   </p:clrMapOvr>
   <mc:AlternateContent xmlns:mc="http://schemas.openxmlformats.org/markup-compatibility/2006">
-    <mc:Choice xmlns:p14="http://schemas.microsoft.com/office/powerpoint/2010/main" xmlns="" Requires="p14">
+    <mc:Choice xmlns="" xmlns:p14="http://schemas.microsoft.com/office/powerpoint/2010/main" Requires="p14">
       <p:transition spd="slow" p14:dur="2000">
         <p14:ferris dir="l"/>
       </p:transition>
@@ -4508,7 +4508,7 @@
     <a:masterClrMapping/>
   </p:clrMapOvr>
   <mc:AlternateContent xmlns:mc="http://schemas.openxmlformats.org/markup-compatibility/2006">
-    <mc:Choice xmlns:p14="http://schemas.microsoft.com/office/powerpoint/2010/main" xmlns="" Requires="p14">
+    <mc:Choice xmlns="" xmlns:p14="http://schemas.microsoft.com/office/powerpoint/2010/main" Requires="p14">
       <p:transition spd="slow" p14:dur="2000">
         <p14:ferris dir="l"/>
       </p:transition>
@@ -5630,7 +5630,7 @@
     <a:masterClrMapping/>
   </p:clrMapOvr>
   <mc:AlternateContent xmlns:mc="http://schemas.openxmlformats.org/markup-compatibility/2006">
-    <mc:Choice xmlns:p14="http://schemas.microsoft.com/office/powerpoint/2010/main" xmlns="" Requires="p14">
+    <mc:Choice xmlns="" xmlns:p14="http://schemas.microsoft.com/office/powerpoint/2010/main" Requires="p14">
       <p:transition spd="slow" p14:dur="2000">
         <p14:ferris dir="l"/>
       </p:transition>
@@ -7237,7 +7237,7 @@
     <a:masterClrMapping/>
   </p:clrMapOvr>
   <mc:AlternateContent xmlns:mc="http://schemas.openxmlformats.org/markup-compatibility/2006">
-    <mc:Choice xmlns:p14="http://schemas.microsoft.com/office/powerpoint/2010/main" xmlns="" Requires="p14">
+    <mc:Choice xmlns="" xmlns:p14="http://schemas.microsoft.com/office/powerpoint/2010/main" Requires="p14">
       <p:transition spd="slow" p14:dur="2000">
         <p14:ferris dir="l"/>
       </p:transition>
@@ -8423,7 +8423,7 @@
     <a:masterClrMapping/>
   </p:clrMapOvr>
   <mc:AlternateContent xmlns:mc="http://schemas.openxmlformats.org/markup-compatibility/2006">
-    <mc:Choice xmlns:p14="http://schemas.microsoft.com/office/powerpoint/2010/main" xmlns="" Requires="p14">
+    <mc:Choice xmlns="" xmlns:p14="http://schemas.microsoft.com/office/powerpoint/2010/main" Requires="p14">
       <p:transition spd="slow" p14:dur="2000">
         <p14:ferris dir="l"/>
       </p:transition>
@@ -9764,7 +9764,7 @@
     <a:masterClrMapping/>
   </p:clrMapOvr>
   <mc:AlternateContent xmlns:mc="http://schemas.openxmlformats.org/markup-compatibility/2006">
-    <mc:Choice xmlns:p14="http://schemas.microsoft.com/office/powerpoint/2010/main" xmlns="" Requires="p14">
+    <mc:Choice xmlns="" xmlns:p14="http://schemas.microsoft.com/office/powerpoint/2010/main" Requires="p14">
       <p:transition spd="slow" p14:dur="2000">
         <p14:ferris dir="l"/>
       </p:transition>
@@ -10801,7 +10801,7 @@
     <a:masterClrMapping/>
   </p:clrMapOvr>
   <mc:AlternateContent xmlns:mc="http://schemas.openxmlformats.org/markup-compatibility/2006">
-    <mc:Choice xmlns:p14="http://schemas.microsoft.com/office/powerpoint/2010/main" xmlns="" Requires="p14">
+    <mc:Choice xmlns="" xmlns:p14="http://schemas.microsoft.com/office/powerpoint/2010/main" Requires="p14">
       <p:transition spd="slow" p14:dur="2000">
         <p14:ferris dir="l"/>
       </p:transition>
@@ -11871,7 +11871,7 @@
     <a:masterClrMapping/>
   </p:clrMapOvr>
   <mc:AlternateContent xmlns:mc="http://schemas.openxmlformats.org/markup-compatibility/2006">
-    <mc:Choice xmlns:p14="http://schemas.microsoft.com/office/powerpoint/2010/main" xmlns="" Requires="p14">
+    <mc:Choice xmlns="" xmlns:p14="http://schemas.microsoft.com/office/powerpoint/2010/main" Requires="p14">
       <p:transition spd="slow" p14:dur="2000">
         <p14:ferris dir="l"/>
       </p:transition>
@@ -13036,7 +13036,7 @@
     <a:masterClrMapping/>
   </p:clrMapOvr>
   <mc:AlternateContent xmlns:mc="http://schemas.openxmlformats.org/markup-compatibility/2006">
-    <mc:Choice xmlns:p14="http://schemas.microsoft.com/office/powerpoint/2010/main" xmlns="" Requires="p14">
+    <mc:Choice xmlns="" xmlns:p14="http://schemas.microsoft.com/office/powerpoint/2010/main" Requires="p14">
       <p:transition spd="slow" p14:dur="2000">
         <p14:ferris dir="l"/>
       </p:transition>
@@ -14266,7 +14266,7 @@
     <a:masterClrMapping/>
   </p:clrMapOvr>
   <mc:AlternateContent xmlns:mc="http://schemas.openxmlformats.org/markup-compatibility/2006">
-    <mc:Choice xmlns:p14="http://schemas.microsoft.com/office/powerpoint/2010/main" xmlns="" Requires="p14">
+    <mc:Choice xmlns="" xmlns:p14="http://schemas.microsoft.com/office/powerpoint/2010/main" Requires="p14">
       <p:transition spd="slow" p14:dur="2000">
         <p14:ferris dir="l"/>
       </p:transition>
@@ -14582,7 +14582,7 @@
     <p:sldLayoutId id="2147483683" r:id="rId11"/>
   </p:sldLayoutIdLst>
   <mc:AlternateContent xmlns:mc="http://schemas.openxmlformats.org/markup-compatibility/2006">
-    <mc:Choice xmlns:p14="http://schemas.microsoft.com/office/powerpoint/2010/main" xmlns="" Requires="p14">
+    <mc:Choice xmlns="" xmlns:p14="http://schemas.microsoft.com/office/powerpoint/2010/main" Requires="p14">
       <p:transition spd="slow" p14:dur="2000">
         <p14:ferris dir="l"/>
       </p:transition>
@@ -15095,7 +15095,7 @@
     </p:spTree>
     <p:extLst>
       <p:ext uri="{BB962C8B-B14F-4D97-AF65-F5344CB8AC3E}">
-        <p14:creationId xmlns:p14="http://schemas.microsoft.com/office/powerpoint/2010/main" xmlns="" val="3270928020"/>
+        <p14:creationId xmlns="" xmlns:p14="http://schemas.microsoft.com/office/powerpoint/2010/main" val="3270928020"/>
       </p:ext>
     </p:extLst>
   </p:cSld>
@@ -15103,7 +15103,7 @@
     <a:masterClrMapping/>
   </p:clrMapOvr>
   <mc:AlternateContent xmlns:mc="http://schemas.openxmlformats.org/markup-compatibility/2006">
-    <mc:Choice xmlns:p14="http://schemas.microsoft.com/office/powerpoint/2010/main" xmlns="" Requires="p14">
+    <mc:Choice xmlns="" xmlns:p14="http://schemas.microsoft.com/office/powerpoint/2010/main" Requires="p14">
       <p:transition spd="slow" p14:dur="2000">
         <p14:ferris dir="l"/>
       </p:transition>
@@ -15215,7 +15215,7 @@
     </p:spTree>
     <p:extLst>
       <p:ext uri="{BB962C8B-B14F-4D97-AF65-F5344CB8AC3E}">
-        <p14:creationId xmlns:p14="http://schemas.microsoft.com/office/powerpoint/2010/main" xmlns="" val="3402630883"/>
+        <p14:creationId xmlns="" xmlns:p14="http://schemas.microsoft.com/office/powerpoint/2010/main" val="3402630883"/>
       </p:ext>
     </p:extLst>
   </p:cSld>
@@ -15223,7 +15223,7 @@
     <a:masterClrMapping/>
   </p:clrMapOvr>
   <mc:AlternateContent xmlns:mc="http://schemas.openxmlformats.org/markup-compatibility/2006">
-    <mc:Choice xmlns:p14="http://schemas.microsoft.com/office/powerpoint/2010/main" xmlns="" Requires="p14">
+    <mc:Choice xmlns="" xmlns:p14="http://schemas.microsoft.com/office/powerpoint/2010/main" Requires="p14">
       <p:transition spd="slow" p14:dur="2000">
         <p14:ferris dir="l"/>
       </p:transition>
@@ -15369,7 +15369,7 @@
     </p:spTree>
     <p:extLst>
       <p:ext uri="{BB962C8B-B14F-4D97-AF65-F5344CB8AC3E}">
-        <p14:creationId xmlns:p14="http://schemas.microsoft.com/office/powerpoint/2010/main" xmlns="" val="448605758"/>
+        <p14:creationId xmlns="" xmlns:p14="http://schemas.microsoft.com/office/powerpoint/2010/main" val="448605758"/>
       </p:ext>
     </p:extLst>
   </p:cSld>
@@ -15377,7 +15377,7 @@
     <a:masterClrMapping/>
   </p:clrMapOvr>
   <mc:AlternateContent xmlns:mc="http://schemas.openxmlformats.org/markup-compatibility/2006">
-    <mc:Choice xmlns:p14="http://schemas.microsoft.com/office/powerpoint/2010/main" xmlns="" Requires="p14">
+    <mc:Choice xmlns="" xmlns:p14="http://schemas.microsoft.com/office/powerpoint/2010/main" Requires="p14">
       <p:transition spd="slow" p14:dur="2000">
         <p14:ferris dir="l"/>
       </p:transition>
@@ -15483,7 +15483,7 @@
     </p:spTree>
     <p:extLst>
       <p:ext uri="{BB962C8B-B14F-4D97-AF65-F5344CB8AC3E}">
-        <p14:creationId xmlns:p14="http://schemas.microsoft.com/office/powerpoint/2010/main" xmlns="" val="2857799541"/>
+        <p14:creationId xmlns="" xmlns:p14="http://schemas.microsoft.com/office/powerpoint/2010/main" val="2857799541"/>
       </p:ext>
     </p:extLst>
   </p:cSld>
@@ -15491,7 +15491,7 @@
     <a:masterClrMapping/>
   </p:clrMapOvr>
   <mc:AlternateContent xmlns:mc="http://schemas.openxmlformats.org/markup-compatibility/2006">
-    <mc:Choice xmlns:p14="http://schemas.microsoft.com/office/powerpoint/2010/main" xmlns="" Requires="p14">
+    <mc:Choice xmlns="" xmlns:p14="http://schemas.microsoft.com/office/powerpoint/2010/main" Requires="p14">
       <p:transition spd="slow" p14:dur="2000">
         <p14:ferris dir="l"/>
       </p:transition>
@@ -15564,11 +15564,7 @@
           <a:p>
             <a:r>
               <a:rPr lang="en-US" dirty="0" smtClean="0"/>
-              <a:t>API documentation on </a:t>
-            </a:r>
-            <a:r>
-              <a:rPr lang="en-US" dirty="0" smtClean="0"/>
-              <a:t>Wiki</a:t>
+              <a:t>API documentation on Wiki</a:t>
             </a:r>
           </a:p>
           <a:p>
@@ -15576,7 +15572,6 @@
               <a:rPr lang="en-US" dirty="0" smtClean="0"/>
               <a:t>Based on Model-View-Controller Architecture</a:t>
             </a:r>
-            <a:endParaRPr lang="en-US" dirty="0" smtClean="0"/>
           </a:p>
           <a:p>
             <a:r>
@@ -15669,7 +15664,7 @@
     </p:spTree>
     <p:extLst>
       <p:ext uri="{BB962C8B-B14F-4D97-AF65-F5344CB8AC3E}">
-        <p14:creationId xmlns:p14="http://schemas.microsoft.com/office/powerpoint/2010/main" xmlns="" val="2323190142"/>
+        <p14:creationId xmlns="" xmlns:p14="http://schemas.microsoft.com/office/powerpoint/2010/main" val="2323190142"/>
       </p:ext>
     </p:extLst>
   </p:cSld>
@@ -15677,7 +15672,7 @@
     <a:masterClrMapping/>
   </p:clrMapOvr>
   <mc:AlternateContent xmlns:mc="http://schemas.openxmlformats.org/markup-compatibility/2006">
-    <mc:Choice xmlns:p14="http://schemas.microsoft.com/office/powerpoint/2010/main" xmlns="" Requires="p14">
+    <mc:Choice xmlns="" xmlns:p14="http://schemas.microsoft.com/office/powerpoint/2010/main" Requires="p14">
       <p:transition spd="slow" p14:dur="2000">
         <p14:ferris dir="l"/>
       </p:transition>
@@ -15759,7 +15754,7 @@
     </p:spTree>
     <p:extLst>
       <p:ext uri="{BB962C8B-B14F-4D97-AF65-F5344CB8AC3E}">
-        <p14:creationId xmlns:p14="http://schemas.microsoft.com/office/powerpoint/2010/main" xmlns="" val="581599888"/>
+        <p14:creationId xmlns="" xmlns:p14="http://schemas.microsoft.com/office/powerpoint/2010/main" val="581599888"/>
       </p:ext>
     </p:extLst>
   </p:cSld>
@@ -15767,7 +15762,7 @@
     <a:masterClrMapping/>
   </p:clrMapOvr>
   <mc:AlternateContent xmlns:mc="http://schemas.openxmlformats.org/markup-compatibility/2006">
-    <mc:Choice xmlns:p14="http://schemas.microsoft.com/office/powerpoint/2010/main" xmlns="" Requires="p14">
+    <mc:Choice xmlns="" xmlns:p14="http://schemas.microsoft.com/office/powerpoint/2010/main" Requires="p14">
       <p:transition spd="slow" p14:dur="2000">
         <p14:ferris dir="l"/>
       </p:transition>
@@ -15831,19 +15826,112 @@
             <p:ph idx="1"/>
           </p:nvPr>
         </p:nvSpPr>
-        <p:spPr/>
+        <p:spPr>
+          <a:xfrm>
+            <a:off x="685800" y="1600200"/>
+            <a:ext cx="7772400" cy="4267199"/>
+          </a:xfrm>
+        </p:spPr>
         <p:txBody>
-          <a:bodyPr/>
+          <a:bodyPr>
+            <a:normAutofit fontScale="92500" lnSpcReduction="20000"/>
+          </a:bodyPr>
           <a:lstStyle/>
           <a:p>
-            <a:endParaRPr lang="en-US"/>
+            <a:r>
+              <a:rPr lang="en-US" dirty="0" smtClean="0"/>
+              <a:t>SQL database vs. No-SQL document storage</a:t>
+            </a:r>
+          </a:p>
+          <a:p>
+            <a:pPr lvl="1"/>
+            <a:r>
+              <a:rPr lang="en-US" dirty="0" smtClean="0"/>
+              <a:t>Considered using Mongo DB to store the application data for the project</a:t>
+            </a:r>
+          </a:p>
+          <a:p>
+            <a:pPr lvl="1"/>
+            <a:r>
+              <a:rPr lang="en-US" dirty="0" smtClean="0"/>
+              <a:t>Decided to stick to SQL instead as we began to realize that the data for the application was chiefly relational.</a:t>
+            </a:r>
+          </a:p>
+          <a:p>
+            <a:endParaRPr lang="en-US" dirty="0" smtClean="0"/>
+          </a:p>
+          <a:p>
+            <a:r>
+              <a:rPr lang="en-US" dirty="0" smtClean="0"/>
+              <a:t>Mobile application with Desktop Companion</a:t>
+            </a:r>
+          </a:p>
+          <a:p>
+            <a:pPr lvl="1"/>
+            <a:r>
+              <a:rPr lang="en-US" dirty="0" smtClean="0"/>
+              <a:t>&lt;insert good reason here&gt;</a:t>
+            </a:r>
+          </a:p>
+          <a:p>
+            <a:endParaRPr lang="en-US" dirty="0" smtClean="0"/>
+          </a:p>
+          <a:p>
+            <a:r>
+              <a:rPr lang="en-US" dirty="0" smtClean="0"/>
+              <a:t>MWF</a:t>
+            </a:r>
+          </a:p>
+          <a:p>
+            <a:pPr lvl="1"/>
+            <a:r>
+              <a:rPr lang="en-US" dirty="0" smtClean="0"/>
+              <a:t> </a:t>
+            </a:r>
+            <a:r>
+              <a:rPr lang="en-US" dirty="0" smtClean="0"/>
+              <a:t>&lt;insert good reason here&gt;</a:t>
+            </a:r>
+          </a:p>
+          <a:p>
+            <a:pPr lvl="1"/>
+            <a:endParaRPr lang="en-US" dirty="0" smtClean="0"/>
+          </a:p>
+          <a:p>
+            <a:r>
+              <a:rPr lang="en-US" dirty="0" smtClean="0"/>
+              <a:t>Active Record Design Pattern</a:t>
+            </a:r>
+          </a:p>
+          <a:p>
+            <a:pPr lvl="1"/>
+            <a:r>
+              <a:rPr lang="en-US" dirty="0" smtClean="0"/>
+              <a:t>Used in the implementation of the PHP API calls.</a:t>
+            </a:r>
+          </a:p>
+          <a:p>
+            <a:pPr lvl="1"/>
+            <a:r>
+              <a:rPr lang="en-US" dirty="0" smtClean="0"/>
+              <a:t>Provided readability and ease of use when it came to interactions with the database.</a:t>
+            </a:r>
+          </a:p>
+          <a:p>
+            <a:endParaRPr lang="en-US" dirty="0" smtClean="0"/>
+          </a:p>
+          <a:p>
+            <a:endParaRPr lang="en-US" dirty="0" smtClean="0"/>
+          </a:p>
+          <a:p>
+            <a:endParaRPr lang="en-US" dirty="0" smtClean="0"/>
           </a:p>
         </p:txBody>
       </p:sp>
     </p:spTree>
     <p:extLst>
       <p:ext uri="{BB962C8B-B14F-4D97-AF65-F5344CB8AC3E}">
-        <p14:creationId xmlns:p14="http://schemas.microsoft.com/office/powerpoint/2010/main" xmlns="" val="424291153"/>
+        <p14:creationId xmlns="" xmlns:p14="http://schemas.microsoft.com/office/powerpoint/2010/main" val="424291153"/>
       </p:ext>
     </p:extLst>
   </p:cSld>
@@ -15851,7 +15939,7 @@
     <a:masterClrMapping/>
   </p:clrMapOvr>
   <mc:AlternateContent xmlns:mc="http://schemas.openxmlformats.org/markup-compatibility/2006">
-    <mc:Choice xmlns:p14="http://schemas.microsoft.com/office/powerpoint/2010/main" xmlns="" Requires="p14">
+    <mc:Choice xmlns="" xmlns:p14="http://schemas.microsoft.com/office/powerpoint/2010/main" Requires="p14">
       <p:transition spd="slow" p14:dur="2000">
         <p14:ferris dir="l"/>
       </p:transition>
@@ -15927,7 +16015,7 @@
     </p:spTree>
     <p:extLst>
       <p:ext uri="{BB962C8B-B14F-4D97-AF65-F5344CB8AC3E}">
-        <p14:creationId xmlns:p14="http://schemas.microsoft.com/office/powerpoint/2010/main" xmlns="" val="2293241035"/>
+        <p14:creationId xmlns="" xmlns:p14="http://schemas.microsoft.com/office/powerpoint/2010/main" val="2293241035"/>
       </p:ext>
     </p:extLst>
   </p:cSld>
@@ -15935,7 +16023,7 @@
     <a:masterClrMapping/>
   </p:clrMapOvr>
   <mc:AlternateContent xmlns:mc="http://schemas.openxmlformats.org/markup-compatibility/2006">
-    <mc:Choice xmlns:p14="http://schemas.microsoft.com/office/powerpoint/2010/main" xmlns="" Requires="p14">
+    <mc:Choice xmlns="" xmlns:p14="http://schemas.microsoft.com/office/powerpoint/2010/main" Requires="p14">
       <p:transition spd="slow" p14:dur="2000">
         <p14:ferris dir="l"/>
       </p:transition>
@@ -16001,10 +16089,94 @@
         </p:nvSpPr>
         <p:spPr/>
         <p:txBody>
-          <a:bodyPr/>
+          <a:bodyPr>
+            <a:normAutofit fontScale="92500" lnSpcReduction="10000"/>
+          </a:bodyPr>
           <a:lstStyle/>
           <a:p>
-            <a:endParaRPr lang="en-US"/>
+            <a:r>
+              <a:rPr lang="en-US" dirty="0" err="1" smtClean="0"/>
+              <a:t>Qunit</a:t>
+            </a:r>
+            <a:endParaRPr lang="en-US" dirty="0" smtClean="0"/>
+          </a:p>
+          <a:p>
+            <a:pPr lvl="1"/>
+            <a:r>
+              <a:rPr lang="en-US" dirty="0" smtClean="0"/>
+              <a:t>Automated unit testing was developed through the use of </a:t>
+            </a:r>
+            <a:r>
+              <a:rPr lang="en-US" dirty="0" err="1" smtClean="0"/>
+              <a:t>Qunit</a:t>
+            </a:r>
+            <a:r>
+              <a:rPr lang="en-US" dirty="0" smtClean="0"/>
+              <a:t>, a </a:t>
+            </a:r>
+            <a:r>
+              <a:rPr lang="en-US" dirty="0" err="1" smtClean="0"/>
+              <a:t>javascript</a:t>
+            </a:r>
+            <a:r>
+              <a:rPr lang="en-US" dirty="0" smtClean="0"/>
+              <a:t> test suite.</a:t>
+            </a:r>
+          </a:p>
+          <a:p>
+            <a:pPr lvl="1"/>
+            <a:r>
+              <a:rPr lang="en-US" dirty="0" smtClean="0"/>
+              <a:t>Has modules divided into error handling and happy path scenarios</a:t>
+            </a:r>
+          </a:p>
+          <a:p>
+            <a:pPr lvl="1"/>
+            <a:r>
+              <a:rPr lang="en-US" dirty="0" smtClean="0"/>
+              <a:t>Provides easy URL interface that explains what tests passed or failed and why.</a:t>
+            </a:r>
+          </a:p>
+          <a:p>
+            <a:endParaRPr lang="en-US" dirty="0" smtClean="0"/>
+          </a:p>
+          <a:p>
+            <a:r>
+              <a:rPr lang="en-US" dirty="0" smtClean="0"/>
+              <a:t>Manuel Functional Tests</a:t>
+            </a:r>
+          </a:p>
+          <a:p>
+            <a:pPr lvl="1"/>
+            <a:r>
+              <a:rPr lang="en-US" dirty="0" smtClean="0"/>
+              <a:t>Manuel tests by team members and friends using the application were the main source for our functional tests.</a:t>
+            </a:r>
+          </a:p>
+          <a:p>
+            <a:endParaRPr lang="en-US" dirty="0" smtClean="0"/>
+          </a:p>
+          <a:p>
+            <a:r>
+              <a:rPr lang="en-US" dirty="0" err="1" smtClean="0"/>
+              <a:t>Github</a:t>
+            </a:r>
+            <a:r>
+              <a:rPr lang="en-US" dirty="0" smtClean="0"/>
+              <a:t> Issue tracking and Assignment</a:t>
+            </a:r>
+          </a:p>
+          <a:p>
+            <a:pPr lvl="1"/>
+            <a:r>
+              <a:rPr lang="en-US" dirty="0" err="1" smtClean="0"/>
+              <a:t>Github</a:t>
+            </a:r>
+            <a:r>
+              <a:rPr lang="en-US" dirty="0" smtClean="0"/>
+              <a:t> provides a way to document found issues in a project, and project participants can ask questions or get assigned to figuring out the problem</a:t>
+            </a:r>
+            <a:endParaRPr lang="en-US" dirty="0"/>
           </a:p>
         </p:txBody>
       </p:sp>
@@ -16014,7 +16186,7 @@
     <a:masterClrMapping/>
   </p:clrMapOvr>
   <mc:AlternateContent xmlns:mc="http://schemas.openxmlformats.org/markup-compatibility/2006">
-    <mc:Choice xmlns:p14="http://schemas.microsoft.com/office/powerpoint/2010/main" xmlns="" Requires="p14">
+    <mc:Choice xmlns="" xmlns:p14="http://schemas.microsoft.com/office/powerpoint/2010/main" Requires="p14">
       <p:transition spd="slow" p14:dur="2000">
         <p14:ferris dir="l"/>
       </p:transition>
@@ -16198,7 +16370,7 @@
     <a:masterClrMapping/>
   </p:clrMapOvr>
   <mc:AlternateContent xmlns:mc="http://schemas.openxmlformats.org/markup-compatibility/2006">
-    <mc:Choice xmlns:p14="http://schemas.microsoft.com/office/powerpoint/2010/main" xmlns="" Requires="p14">
+    <mc:Choice xmlns="" xmlns:p14="http://schemas.microsoft.com/office/powerpoint/2010/main" Requires="p14">
       <p:transition spd="slow" p14:dur="2000">
         <p14:ferris dir="l"/>
       </p:transition>
@@ -16280,11 +16452,11 @@
             <a:pPr lvl="1"/>
             <a:r>
               <a:rPr lang="en-US" dirty="0" smtClean="0"/>
-              <a:t>E.g. Google Maps, Twitter, and </a:t>
-            </a:r>
-            <a:r>
-              <a:rPr lang="en-US" dirty="0" err="1" smtClean="0"/>
-              <a:t>Myspace</a:t>
+              <a:t>E.g. Google Maps, Twitter</a:t>
+            </a:r>
+            <a:r>
+              <a:rPr lang="en-US" dirty="0" smtClean="0"/>
+              <a:t>,</a:t>
             </a:r>
             <a:endParaRPr lang="en-US" dirty="0" smtClean="0"/>
           </a:p>
@@ -16395,7 +16567,7 @@
     <a:masterClrMapping/>
   </p:clrMapOvr>
   <mc:AlternateContent xmlns:mc="http://schemas.openxmlformats.org/markup-compatibility/2006">
-    <mc:Choice xmlns:p14="http://schemas.microsoft.com/office/powerpoint/2010/main" xmlns="" Requires="p14">
+    <mc:Choice xmlns="" xmlns:p14="http://schemas.microsoft.com/office/powerpoint/2010/main" Requires="p14">
       <p:transition spd="slow" p14:dur="2000">
         <p14:ferris dir="l"/>
       </p:transition>
@@ -16525,7 +16697,7 @@
     </p:spTree>
     <p:extLst>
       <p:ext uri="{BB962C8B-B14F-4D97-AF65-F5344CB8AC3E}">
-        <p14:creationId xmlns:p14="http://schemas.microsoft.com/office/powerpoint/2010/main" xmlns="" val="1469798109"/>
+        <p14:creationId xmlns="" xmlns:p14="http://schemas.microsoft.com/office/powerpoint/2010/main" val="1469798109"/>
       </p:ext>
     </p:extLst>
   </p:cSld>
@@ -16533,7 +16705,7 @@
     <a:masterClrMapping/>
   </p:clrMapOvr>
   <mc:AlternateContent xmlns:mc="http://schemas.openxmlformats.org/markup-compatibility/2006">
-    <mc:Choice xmlns:p14="http://schemas.microsoft.com/office/powerpoint/2010/main" xmlns="" Requires="p14">
+    <mc:Choice xmlns="" xmlns:p14="http://schemas.microsoft.com/office/powerpoint/2010/main" Requires="p14">
       <p:transition spd="slow" p14:dur="2000">
         <p14:ferris dir="l"/>
       </p:transition>
@@ -16641,7 +16813,7 @@
     </p:spTree>
     <p:extLst>
       <p:ext uri="{BB962C8B-B14F-4D97-AF65-F5344CB8AC3E}">
-        <p14:creationId xmlns:p14="http://schemas.microsoft.com/office/powerpoint/2010/main" xmlns="" val="2418521225"/>
+        <p14:creationId xmlns="" xmlns:p14="http://schemas.microsoft.com/office/powerpoint/2010/main" val="2418521225"/>
       </p:ext>
     </p:extLst>
   </p:cSld>
@@ -16649,7 +16821,7 @@
     <a:masterClrMapping/>
   </p:clrMapOvr>
   <mc:AlternateContent xmlns:mc="http://schemas.openxmlformats.org/markup-compatibility/2006">
-    <mc:Choice xmlns:p14="http://schemas.microsoft.com/office/powerpoint/2010/main" xmlns="" Requires="p14">
+    <mc:Choice xmlns="" xmlns:p14="http://schemas.microsoft.com/office/powerpoint/2010/main" Requires="p14">
       <p:transition spd="slow" p14:dur="2000">
         <p14:ferris dir="l"/>
       </p:transition>
@@ -16819,7 +16991,7 @@
     </p:spTree>
     <p:extLst>
       <p:ext uri="{BB962C8B-B14F-4D97-AF65-F5344CB8AC3E}">
-        <p14:creationId xmlns:p14="http://schemas.microsoft.com/office/powerpoint/2010/main" xmlns="" val="2901881089"/>
+        <p14:creationId xmlns="" xmlns:p14="http://schemas.microsoft.com/office/powerpoint/2010/main" val="2901881089"/>
       </p:ext>
     </p:extLst>
   </p:cSld>
@@ -16827,7 +16999,7 @@
     <a:masterClrMapping/>
   </p:clrMapOvr>
   <mc:AlternateContent xmlns:mc="http://schemas.openxmlformats.org/markup-compatibility/2006">
-    <mc:Choice xmlns:p14="http://schemas.microsoft.com/office/powerpoint/2010/main" xmlns="" Requires="p14">
+    <mc:Choice xmlns="" xmlns:p14="http://schemas.microsoft.com/office/powerpoint/2010/main" Requires="p14">
       <p:transition spd="slow" p14:dur="2000">
         <p14:ferris dir="l"/>
       </p:transition>
@@ -16938,29 +17110,19 @@
           <a:p>
             <a:pPr lvl="1"/>
             <a:r>
-              <a:rPr lang="en-US" dirty="0" smtClean="0"/>
+              <a:rPr lang="en-US" dirty="0" err="1" smtClean="0"/>
               <a:t>Facebook</a:t>
             </a:r>
-          </a:p>
-          <a:p>
-            <a:pPr lvl="1"/>
-            <a:r>
-              <a:rPr lang="en-US" dirty="0" smtClean="0"/>
-              <a:t>Google Maps</a:t>
-            </a:r>
-          </a:p>
-          <a:p>
-            <a:pPr lvl="1"/>
-            <a:r>
-              <a:rPr lang="en-US" dirty="0" smtClean="0"/>
-              <a:t>Twitter</a:t>
-            </a:r>
-            <a:endParaRPr lang="en-US" dirty="0"/>
-          </a:p>
-          <a:p>
+            <a:endParaRPr lang="en-US" dirty="0" smtClean="0"/>
+          </a:p>
+          <a:p>
+            <a:r>
+              <a:rPr lang="en-US" b="1" dirty="0" smtClean="0"/>
+              <a:t>User </a:t>
+            </a:r>
             <a:r>
               <a:rPr lang="en-US" b="1" dirty="0"/>
-              <a:t>User interface </a:t>
+              <a:t>interface </a:t>
             </a:r>
             <a:r>
               <a:rPr lang="en-US" b="1" dirty="0" smtClean="0"/>
@@ -16989,7 +17151,7 @@
     </p:spTree>
     <p:extLst>
       <p:ext uri="{BB962C8B-B14F-4D97-AF65-F5344CB8AC3E}">
-        <p14:creationId xmlns:p14="http://schemas.microsoft.com/office/powerpoint/2010/main" xmlns="" val="3668074173"/>
+        <p14:creationId xmlns="" xmlns:p14="http://schemas.microsoft.com/office/powerpoint/2010/main" val="3668074173"/>
       </p:ext>
     </p:extLst>
   </p:cSld>
@@ -16997,7 +17159,7 @@
     <a:masterClrMapping/>
   </p:clrMapOvr>
   <mc:AlternateContent xmlns:mc="http://schemas.openxmlformats.org/markup-compatibility/2006">
-    <mc:Choice xmlns:p14="http://schemas.microsoft.com/office/powerpoint/2010/main" xmlns="" Requires="p14">
+    <mc:Choice xmlns="" xmlns:p14="http://schemas.microsoft.com/office/powerpoint/2010/main" Requires="p14">
       <p:transition spd="slow" p14:dur="2000">
         <p14:ferris dir="l"/>
       </p:transition>
@@ -17126,7 +17288,7 @@
     </p:spTree>
     <p:extLst>
       <p:ext uri="{BB962C8B-B14F-4D97-AF65-F5344CB8AC3E}">
-        <p14:creationId xmlns:p14="http://schemas.microsoft.com/office/powerpoint/2010/main" xmlns="" val="2018697858"/>
+        <p14:creationId xmlns="" xmlns:p14="http://schemas.microsoft.com/office/powerpoint/2010/main" val="2018697858"/>
       </p:ext>
     </p:extLst>
   </p:cSld>
@@ -17134,7 +17296,7 @@
     <a:masterClrMapping/>
   </p:clrMapOvr>
   <mc:AlternateContent xmlns:mc="http://schemas.openxmlformats.org/markup-compatibility/2006">
-    <mc:Choice xmlns:p14="http://schemas.microsoft.com/office/powerpoint/2010/main" xmlns="" Requires="p14">
+    <mc:Choice xmlns="" xmlns:p14="http://schemas.microsoft.com/office/powerpoint/2010/main" Requires="p14">
       <p:transition spd="slow" p14:dur="2000">
         <p14:ferris dir="l"/>
       </p:transition>
@@ -17285,7 +17447,7 @@
     </p:spTree>
     <p:extLst>
       <p:ext uri="{BB962C8B-B14F-4D97-AF65-F5344CB8AC3E}">
-        <p14:creationId xmlns:p14="http://schemas.microsoft.com/office/powerpoint/2010/main" xmlns="" val="1159455994"/>
+        <p14:creationId xmlns="" xmlns:p14="http://schemas.microsoft.com/office/powerpoint/2010/main" val="1159455994"/>
       </p:ext>
     </p:extLst>
   </p:cSld>
@@ -17293,7 +17455,7 @@
     <a:masterClrMapping/>
   </p:clrMapOvr>
   <mc:AlternateContent xmlns:mc="http://schemas.openxmlformats.org/markup-compatibility/2006">
-    <mc:Choice xmlns:p14="http://schemas.microsoft.com/office/powerpoint/2010/main" xmlns="" Requires="p14">
+    <mc:Choice xmlns="" xmlns:p14="http://schemas.microsoft.com/office/powerpoint/2010/main" Requires="p14">
       <p:transition spd="slow" p14:dur="2000">
         <p14:ferris dir="l"/>
       </p:transition>
@@ -17426,7 +17588,7 @@
     </p:spTree>
     <p:extLst>
       <p:ext uri="{BB962C8B-B14F-4D97-AF65-F5344CB8AC3E}">
-        <p14:creationId xmlns:p14="http://schemas.microsoft.com/office/powerpoint/2010/main" xmlns="" val="2043556417"/>
+        <p14:creationId xmlns="" xmlns:p14="http://schemas.microsoft.com/office/powerpoint/2010/main" val="2043556417"/>
       </p:ext>
     </p:extLst>
   </p:cSld>
@@ -17434,7 +17596,7 @@
     <a:masterClrMapping/>
   </p:clrMapOvr>
   <mc:AlternateContent xmlns:mc="http://schemas.openxmlformats.org/markup-compatibility/2006">
-    <mc:Choice xmlns:p14="http://schemas.microsoft.com/office/powerpoint/2010/main" xmlns="" Requires="p14">
+    <mc:Choice xmlns="" xmlns:p14="http://schemas.microsoft.com/office/powerpoint/2010/main" Requires="p14">
       <p:transition spd="slow" p14:dur="2000">
         <p14:ferris dir="l"/>
       </p:transition>
@@ -17584,7 +17746,7 @@
     </p:spTree>
     <p:extLst>
       <p:ext uri="{BB962C8B-B14F-4D97-AF65-F5344CB8AC3E}">
-        <p14:creationId xmlns:p14="http://schemas.microsoft.com/office/powerpoint/2010/main" xmlns="" val="269415945"/>
+        <p14:creationId xmlns="" xmlns:p14="http://schemas.microsoft.com/office/powerpoint/2010/main" val="269415945"/>
       </p:ext>
     </p:extLst>
   </p:cSld>
@@ -17592,7 +17754,7 @@
     <a:masterClrMapping/>
   </p:clrMapOvr>
   <mc:AlternateContent xmlns:mc="http://schemas.openxmlformats.org/markup-compatibility/2006">
-    <mc:Choice xmlns:p14="http://schemas.microsoft.com/office/powerpoint/2010/main" xmlns="" Requires="p14">
+    <mc:Choice xmlns="" xmlns:p14="http://schemas.microsoft.com/office/powerpoint/2010/main" Requires="p14">
       <p:transition spd="slow" p14:dur="2000">
         <p14:ferris dir="l"/>
       </p:transition>
@@ -17698,7 +17860,7 @@
     </p:spTree>
     <p:extLst>
       <p:ext uri="{BB962C8B-B14F-4D97-AF65-F5344CB8AC3E}">
-        <p14:creationId xmlns:p14="http://schemas.microsoft.com/office/powerpoint/2010/main" xmlns="" val="4140326256"/>
+        <p14:creationId xmlns="" xmlns:p14="http://schemas.microsoft.com/office/powerpoint/2010/main" val="4140326256"/>
       </p:ext>
     </p:extLst>
   </p:cSld>
@@ -17706,7 +17868,7 @@
     <a:masterClrMapping/>
   </p:clrMapOvr>
   <mc:AlternateContent xmlns:mc="http://schemas.openxmlformats.org/markup-compatibility/2006">
-    <mc:Choice xmlns:p14="http://schemas.microsoft.com/office/powerpoint/2010/main" xmlns="" Requires="p14">
+    <mc:Choice xmlns="" xmlns:p14="http://schemas.microsoft.com/office/powerpoint/2010/main" Requires="p14">
       <p:transition spd="slow" p14:dur="2000">
         <p14:ferris dir="l"/>
       </p:transition>
@@ -17780,7 +17942,7 @@
           <a:blip r:embed="rId2" cstate="print">
             <a:extLst>
               <a:ext uri="{28A0092B-C50C-407E-A947-70E740481C1C}">
-                <a14:useLocalDpi xmlns:a14="http://schemas.microsoft.com/office/drawing/2010/main" xmlns="" val="0"/>
+                <a14:useLocalDpi xmlns="" xmlns:a14="http://schemas.microsoft.com/office/drawing/2010/main" val="0"/>
               </a:ext>
             </a:extLst>
           </a:blip>
@@ -17803,14 +17965,14 @@
           <a:effectLst/>
           <a:extLst>
             <a:ext uri="{909E8E84-426E-40DD-AFC4-6F175D3DCCD1}">
-              <a14:hiddenFill xmlns:a14="http://schemas.microsoft.com/office/drawing/2010/main" xmlns="">
+              <a14:hiddenFill xmlns="" xmlns:a14="http://schemas.microsoft.com/office/drawing/2010/main">
                 <a:solidFill>
                   <a:schemeClr val="accent1"/>
                 </a:solidFill>
               </a14:hiddenFill>
             </a:ext>
             <a:ext uri="{91240B29-F687-4F45-9708-019B960494DF}">
-              <a14:hiddenLine xmlns:a14="http://schemas.microsoft.com/office/drawing/2010/main" xmlns="" w="9525">
+              <a14:hiddenLine xmlns="" xmlns:a14="http://schemas.microsoft.com/office/drawing/2010/main" w="9525">
                 <a:solidFill>
                   <a:schemeClr val="tx1"/>
                 </a:solidFill>
@@ -17820,7 +17982,7 @@
               </a14:hiddenLine>
             </a:ext>
             <a:ext uri="{AF507438-7753-43E0-B8FC-AC1667EBCBE1}">
-              <a14:hiddenEffects xmlns:a14="http://schemas.microsoft.com/office/drawing/2010/main" xmlns="">
+              <a14:hiddenEffects xmlns="" xmlns:a14="http://schemas.microsoft.com/office/drawing/2010/main">
                 <a:effectLst>
                   <a:outerShdw dist="35921" dir="2700000" algn="ctr" rotWithShape="0">
                     <a:schemeClr val="bg2"/>
@@ -17834,7 +17996,7 @@
     </p:spTree>
     <p:extLst>
       <p:ext uri="{BB962C8B-B14F-4D97-AF65-F5344CB8AC3E}">
-        <p14:creationId xmlns:p14="http://schemas.microsoft.com/office/powerpoint/2010/main" xmlns="" val="2701624253"/>
+        <p14:creationId xmlns="" xmlns:p14="http://schemas.microsoft.com/office/powerpoint/2010/main" val="2701624253"/>
       </p:ext>
     </p:extLst>
   </p:cSld>
@@ -17842,7 +18004,7 @@
     <a:masterClrMapping/>
   </p:clrMapOvr>
   <mc:AlternateContent xmlns:mc="http://schemas.openxmlformats.org/markup-compatibility/2006">
-    <mc:Choice xmlns:p14="http://schemas.microsoft.com/office/powerpoint/2010/main" xmlns="" Requires="p14">
+    <mc:Choice xmlns="" xmlns:p14="http://schemas.microsoft.com/office/powerpoint/2010/main" Requires="p14">
       <p:transition spd="slow" p14:dur="2000">
         <p14:ferris dir="l"/>
       </p:transition>

</xml_diff>

<commit_message>
(Wade) Fixed lots of stuff from mid-term section of presentation, added stuff for front end, testing and issue tracker, etc. Only part that needs to be done still is desktop.
</commit_message>
<xml_diff>
--- a/doc/final_presentation.pptx
+++ b/doc/final_presentation.pptx
@@ -5,7 +5,7 @@
     <p:sldMasterId id="2147483672" r:id="rId1"/>
   </p:sldMasterIdLst>
   <p:notesMasterIdLst>
-    <p:notesMasterId r:id="rId23"/>
+    <p:notesMasterId r:id="rId26"/>
   </p:notesMasterIdLst>
   <p:sldIdLst>
     <p:sldId id="256" r:id="rId2"/>
@@ -24,11 +24,14 @@
     <p:sldId id="275" r:id="rId15"/>
     <p:sldId id="279" r:id="rId16"/>
     <p:sldId id="280" r:id="rId17"/>
-    <p:sldId id="276" r:id="rId18"/>
-    <p:sldId id="278" r:id="rId19"/>
-    <p:sldId id="277" r:id="rId20"/>
-    <p:sldId id="270" r:id="rId21"/>
-    <p:sldId id="273" r:id="rId22"/>
+    <p:sldId id="283" r:id="rId18"/>
+    <p:sldId id="281" r:id="rId19"/>
+    <p:sldId id="276" r:id="rId20"/>
+    <p:sldId id="284" r:id="rId21"/>
+    <p:sldId id="278" r:id="rId22"/>
+    <p:sldId id="277" r:id="rId23"/>
+    <p:sldId id="270" r:id="rId24"/>
+    <p:sldId id="273" r:id="rId25"/>
   </p:sldIdLst>
   <p:sldSz cx="9144000" cy="6858000" type="screen4x3"/>
   <p:notesSz cx="6858000" cy="9144000"/>
@@ -213,7 +216,7 @@
             <a:fld id="{B02F4689-6D44-45C5-936E-453627548D96}" type="datetimeFigureOut">
               <a:rPr lang="en-US" smtClean="0"/>
               <a:pPr/>
-              <a:t>12/1/2011</a:t>
+              <a:t>12/2/2011</a:t>
             </a:fld>
             <a:endParaRPr lang="en-US"/>
           </a:p>
@@ -382,7 +385,7 @@
     </p:spTree>
     <p:extLst>
       <p:ext uri="{BB962C8B-B14F-4D97-AF65-F5344CB8AC3E}">
-        <p14:creationId xmlns="" xmlns:p14="http://schemas.microsoft.com/office/powerpoint/2010/main" val="3494936748"/>
+        <p14:creationId xmlns:p14="http://schemas.microsoft.com/office/powerpoint/2010/main" xmlns="" val="3494936748"/>
       </p:ext>
     </p:extLst>
   </p:cSld>
@@ -565,7 +568,7 @@
     </p:spTree>
     <p:extLst>
       <p:ext uri="{BB962C8B-B14F-4D97-AF65-F5344CB8AC3E}">
-        <p14:creationId xmlns="" xmlns:p14="http://schemas.microsoft.com/office/powerpoint/2010/main" val="1767483421"/>
+        <p14:creationId xmlns:p14="http://schemas.microsoft.com/office/powerpoint/2010/main" xmlns="" val="1767483421"/>
       </p:ext>
     </p:extLst>
   </p:cSld>
@@ -649,7 +652,7 @@
             <a:fld id="{1A6845E6-538C-49EA-A830-9072524FC492}" type="slidenum">
               <a:rPr lang="en-US" smtClean="0"/>
               <a:pPr/>
-              <a:t>20</a:t>
+              <a:t>23</a:t>
             </a:fld>
             <a:endParaRPr lang="en-US"/>
           </a:p>
@@ -658,7 +661,7 @@
     </p:spTree>
     <p:extLst>
       <p:ext uri="{BB962C8B-B14F-4D97-AF65-F5344CB8AC3E}">
-        <p14:creationId xmlns="" xmlns:p14="http://schemas.microsoft.com/office/powerpoint/2010/main" val="387822502"/>
+        <p14:creationId xmlns:p14="http://schemas.microsoft.com/office/powerpoint/2010/main" xmlns="" val="387822502"/>
       </p:ext>
     </p:extLst>
   </p:cSld>
@@ -2207,7 +2210,7 @@
             <a:fld id="{B1B3241A-CC88-40CB-A269-FC6B849E1631}" type="datetimeFigureOut">
               <a:rPr lang="en-US" smtClean="0"/>
               <a:pPr/>
-              <a:t>12/1/2011</a:t>
+              <a:t>12/2/2011</a:t>
             </a:fld>
             <a:endParaRPr lang="en-US"/>
           </a:p>
@@ -2264,7 +2267,7 @@
     <a:masterClrMapping/>
   </p:clrMapOvr>
   <mc:AlternateContent xmlns:mc="http://schemas.openxmlformats.org/markup-compatibility/2006">
-    <mc:Choice xmlns="" xmlns:p14="http://schemas.microsoft.com/office/powerpoint/2010/main" Requires="p14">
+    <mc:Choice xmlns:p14="http://schemas.microsoft.com/office/powerpoint/2010/main" xmlns="" Requires="p14">
       <p:transition spd="slow" p14:dur="2000">
         <p14:ferris dir="l"/>
       </p:transition>
@@ -3326,7 +3329,7 @@
             <a:fld id="{B1B3241A-CC88-40CB-A269-FC6B849E1631}" type="datetimeFigureOut">
               <a:rPr lang="en-US" smtClean="0"/>
               <a:pPr/>
-              <a:t>12/1/2011</a:t>
+              <a:t>12/2/2011</a:t>
             </a:fld>
             <a:endParaRPr lang="en-US"/>
           </a:p>
@@ -3381,7 +3384,7 @@
     <a:masterClrMapping/>
   </p:clrMapOvr>
   <mc:AlternateContent xmlns:mc="http://schemas.openxmlformats.org/markup-compatibility/2006">
-    <mc:Choice xmlns="" xmlns:p14="http://schemas.microsoft.com/office/powerpoint/2010/main" Requires="p14">
+    <mc:Choice xmlns:p14="http://schemas.microsoft.com/office/powerpoint/2010/main" xmlns="" Requires="p14">
       <p:transition spd="slow" p14:dur="2000">
         <p14:ferris dir="l"/>
       </p:transition>
@@ -4453,7 +4456,7 @@
             <a:fld id="{B1B3241A-CC88-40CB-A269-FC6B849E1631}" type="datetimeFigureOut">
               <a:rPr lang="en-US" smtClean="0"/>
               <a:pPr/>
-              <a:t>12/1/2011</a:t>
+              <a:t>12/2/2011</a:t>
             </a:fld>
             <a:endParaRPr lang="en-US"/>
           </a:p>
@@ -4508,7 +4511,7 @@
     <a:masterClrMapping/>
   </p:clrMapOvr>
   <mc:AlternateContent xmlns:mc="http://schemas.openxmlformats.org/markup-compatibility/2006">
-    <mc:Choice xmlns="" xmlns:p14="http://schemas.microsoft.com/office/powerpoint/2010/main" Requires="p14">
+    <mc:Choice xmlns:p14="http://schemas.microsoft.com/office/powerpoint/2010/main" xmlns="" Requires="p14">
       <p:transition spd="slow" p14:dur="2000">
         <p14:ferris dir="l"/>
       </p:transition>
@@ -5575,7 +5578,7 @@
             <a:fld id="{B1B3241A-CC88-40CB-A269-FC6B849E1631}" type="datetimeFigureOut">
               <a:rPr lang="en-US" smtClean="0"/>
               <a:pPr/>
-              <a:t>12/1/2011</a:t>
+              <a:t>12/2/2011</a:t>
             </a:fld>
             <a:endParaRPr lang="en-US"/>
           </a:p>
@@ -5630,7 +5633,7 @@
     <a:masterClrMapping/>
   </p:clrMapOvr>
   <mc:AlternateContent xmlns:mc="http://schemas.openxmlformats.org/markup-compatibility/2006">
-    <mc:Choice xmlns="" xmlns:p14="http://schemas.microsoft.com/office/powerpoint/2010/main" Requires="p14">
+    <mc:Choice xmlns:p14="http://schemas.microsoft.com/office/powerpoint/2010/main" xmlns="" Requires="p14">
       <p:transition spd="slow" p14:dur="2000">
         <p14:ferris dir="l"/>
       </p:transition>
@@ -7182,7 +7185,7 @@
             <a:fld id="{B1B3241A-CC88-40CB-A269-FC6B849E1631}" type="datetimeFigureOut">
               <a:rPr lang="en-US" smtClean="0"/>
               <a:pPr/>
-              <a:t>12/1/2011</a:t>
+              <a:t>12/2/2011</a:t>
             </a:fld>
             <a:endParaRPr lang="en-US"/>
           </a:p>
@@ -7237,7 +7240,7 @@
     <a:masterClrMapping/>
   </p:clrMapOvr>
   <mc:AlternateContent xmlns:mc="http://schemas.openxmlformats.org/markup-compatibility/2006">
-    <mc:Choice xmlns="" xmlns:p14="http://schemas.microsoft.com/office/powerpoint/2010/main" Requires="p14">
+    <mc:Choice xmlns:p14="http://schemas.microsoft.com/office/powerpoint/2010/main" xmlns="" Requires="p14">
       <p:transition spd="slow" p14:dur="2000">
         <p14:ferris dir="l"/>
       </p:transition>
@@ -8254,7 +8257,7 @@
             <a:fld id="{B1B3241A-CC88-40CB-A269-FC6B849E1631}" type="datetimeFigureOut">
               <a:rPr lang="en-US" smtClean="0"/>
               <a:pPr/>
-              <a:t>12/1/2011</a:t>
+              <a:t>12/2/2011</a:t>
             </a:fld>
             <a:endParaRPr lang="en-US"/>
           </a:p>
@@ -8423,7 +8426,7 @@
     <a:masterClrMapping/>
   </p:clrMapOvr>
   <mc:AlternateContent xmlns:mc="http://schemas.openxmlformats.org/markup-compatibility/2006">
-    <mc:Choice xmlns="" xmlns:p14="http://schemas.microsoft.com/office/powerpoint/2010/main" Requires="p14">
+    <mc:Choice xmlns:p14="http://schemas.microsoft.com/office/powerpoint/2010/main" xmlns="" Requires="p14">
       <p:transition spd="slow" p14:dur="2000">
         <p14:ferris dir="l"/>
       </p:transition>
@@ -9595,7 +9598,7 @@
             <a:fld id="{B1B3241A-CC88-40CB-A269-FC6B849E1631}" type="datetimeFigureOut">
               <a:rPr lang="en-US" smtClean="0"/>
               <a:pPr/>
-              <a:t>12/1/2011</a:t>
+              <a:t>12/2/2011</a:t>
             </a:fld>
             <a:endParaRPr lang="en-US"/>
           </a:p>
@@ -9764,7 +9767,7 @@
     <a:masterClrMapping/>
   </p:clrMapOvr>
   <mc:AlternateContent xmlns:mc="http://schemas.openxmlformats.org/markup-compatibility/2006">
-    <mc:Choice xmlns="" xmlns:p14="http://schemas.microsoft.com/office/powerpoint/2010/main" Requires="p14">
+    <mc:Choice xmlns:p14="http://schemas.microsoft.com/office/powerpoint/2010/main" xmlns="" Requires="p14">
       <p:transition spd="slow" p14:dur="2000">
         <p14:ferris dir="l"/>
       </p:transition>
@@ -10746,7 +10749,7 @@
             <a:fld id="{B1B3241A-CC88-40CB-A269-FC6B849E1631}" type="datetimeFigureOut">
               <a:rPr lang="en-US" smtClean="0"/>
               <a:pPr/>
-              <a:t>12/1/2011</a:t>
+              <a:t>12/2/2011</a:t>
             </a:fld>
             <a:endParaRPr lang="en-US"/>
           </a:p>
@@ -10801,7 +10804,7 @@
     <a:masterClrMapping/>
   </p:clrMapOvr>
   <mc:AlternateContent xmlns:mc="http://schemas.openxmlformats.org/markup-compatibility/2006">
-    <mc:Choice xmlns="" xmlns:p14="http://schemas.microsoft.com/office/powerpoint/2010/main" Requires="p14">
+    <mc:Choice xmlns:p14="http://schemas.microsoft.com/office/powerpoint/2010/main" xmlns="" Requires="p14">
       <p:transition spd="slow" p14:dur="2000">
         <p14:ferris dir="l"/>
       </p:transition>
@@ -11816,7 +11819,7 @@
             <a:fld id="{B1B3241A-CC88-40CB-A269-FC6B849E1631}" type="datetimeFigureOut">
               <a:rPr lang="en-US" smtClean="0"/>
               <a:pPr/>
-              <a:t>12/1/2011</a:t>
+              <a:t>12/2/2011</a:t>
             </a:fld>
             <a:endParaRPr lang="en-US"/>
           </a:p>
@@ -11871,7 +11874,7 @@
     <a:masterClrMapping/>
   </p:clrMapOvr>
   <mc:AlternateContent xmlns:mc="http://schemas.openxmlformats.org/markup-compatibility/2006">
-    <mc:Choice xmlns="" xmlns:p14="http://schemas.microsoft.com/office/powerpoint/2010/main" Requires="p14">
+    <mc:Choice xmlns:p14="http://schemas.microsoft.com/office/powerpoint/2010/main" xmlns="" Requires="p14">
       <p:transition spd="slow" p14:dur="2000">
         <p14:ferris dir="l"/>
       </p:transition>
@@ -12868,7 +12871,7 @@
             <a:fld id="{B1B3241A-CC88-40CB-A269-FC6B849E1631}" type="datetimeFigureOut">
               <a:rPr lang="en-US" smtClean="0"/>
               <a:pPr/>
-              <a:t>12/1/2011</a:t>
+              <a:t>12/2/2011</a:t>
             </a:fld>
             <a:endParaRPr lang="en-US"/>
           </a:p>
@@ -13036,7 +13039,7 @@
     <a:masterClrMapping/>
   </p:clrMapOvr>
   <mc:AlternateContent xmlns:mc="http://schemas.openxmlformats.org/markup-compatibility/2006">
-    <mc:Choice xmlns="" xmlns:p14="http://schemas.microsoft.com/office/powerpoint/2010/main" Requires="p14">
+    <mc:Choice xmlns:p14="http://schemas.microsoft.com/office/powerpoint/2010/main" xmlns="" Requires="p14">
       <p:transition spd="slow" p14:dur="2000">
         <p14:ferris dir="l"/>
       </p:transition>
@@ -14117,7 +14120,7 @@
             <a:fld id="{B1B3241A-CC88-40CB-A269-FC6B849E1631}" type="datetimeFigureOut">
               <a:rPr lang="en-US" smtClean="0"/>
               <a:pPr/>
-              <a:t>12/1/2011</a:t>
+              <a:t>12/2/2011</a:t>
             </a:fld>
             <a:endParaRPr lang="en-US"/>
           </a:p>
@@ -14266,7 +14269,7 @@
     <a:masterClrMapping/>
   </p:clrMapOvr>
   <mc:AlternateContent xmlns:mc="http://schemas.openxmlformats.org/markup-compatibility/2006">
-    <mc:Choice xmlns="" xmlns:p14="http://schemas.microsoft.com/office/powerpoint/2010/main" Requires="p14">
+    <mc:Choice xmlns:p14="http://schemas.microsoft.com/office/powerpoint/2010/main" xmlns="" Requires="p14">
       <p:transition spd="slow" p14:dur="2000">
         <p14:ferris dir="l"/>
       </p:transition>
@@ -14484,7 +14487,7 @@
             <a:fld id="{B1B3241A-CC88-40CB-A269-FC6B849E1631}" type="datetimeFigureOut">
               <a:rPr lang="en-US" smtClean="0"/>
               <a:pPr/>
-              <a:t>12/1/2011</a:t>
+              <a:t>12/2/2011</a:t>
             </a:fld>
             <a:endParaRPr lang="en-US"/>
           </a:p>
@@ -14582,7 +14585,7 @@
     <p:sldLayoutId id="2147483683" r:id="rId11"/>
   </p:sldLayoutIdLst>
   <mc:AlternateContent xmlns:mc="http://schemas.openxmlformats.org/markup-compatibility/2006">
-    <mc:Choice xmlns="" xmlns:p14="http://schemas.microsoft.com/office/powerpoint/2010/main" Requires="p14">
+    <mc:Choice xmlns:p14="http://schemas.microsoft.com/office/powerpoint/2010/main" xmlns="" Requires="p14">
       <p:transition spd="slow" p14:dur="2000">
         <p14:ferris dir="l"/>
       </p:transition>
@@ -15095,7 +15098,7 @@
     </p:spTree>
     <p:extLst>
       <p:ext uri="{BB962C8B-B14F-4D97-AF65-F5344CB8AC3E}">
-        <p14:creationId xmlns="" xmlns:p14="http://schemas.microsoft.com/office/powerpoint/2010/main" val="3270928020"/>
+        <p14:creationId xmlns:p14="http://schemas.microsoft.com/office/powerpoint/2010/main" xmlns="" val="3270928020"/>
       </p:ext>
     </p:extLst>
   </p:cSld>
@@ -15103,7 +15106,7 @@
     <a:masterClrMapping/>
   </p:clrMapOvr>
   <mc:AlternateContent xmlns:mc="http://schemas.openxmlformats.org/markup-compatibility/2006">
-    <mc:Choice xmlns="" xmlns:p14="http://schemas.microsoft.com/office/powerpoint/2010/main" Requires="p14">
+    <mc:Choice xmlns:p14="http://schemas.microsoft.com/office/powerpoint/2010/main" xmlns="" Requires="p14">
       <p:transition spd="slow" p14:dur="2000">
         <p14:ferris dir="l"/>
       </p:transition>
@@ -15185,7 +15188,15 @@
           <a:p>
             <a:r>
               <a:rPr lang="en-US" sz="2400" dirty="0"/>
-              <a:t>The front end client utilizing JavaScript will issue AJAX requests to the server which after committing appropriate queries will return query results in JSON format wrapped in an HTTP response. </a:t>
+              <a:t>The front end client utilizing JavaScript will issue AJAX requests to the server which after committing appropriate queries will return </a:t>
+            </a:r>
+            <a:r>
+              <a:rPr lang="en-US" sz="2400" dirty="0" smtClean="0"/>
+              <a:t>results </a:t>
+            </a:r>
+            <a:r>
+              <a:rPr lang="en-US" sz="2400" dirty="0"/>
+              <a:t>in JSON format wrapped in an HTTP response. </a:t>
             </a:r>
           </a:p>
           <a:p>
@@ -15215,7 +15226,7 @@
     </p:spTree>
     <p:extLst>
       <p:ext uri="{BB962C8B-B14F-4D97-AF65-F5344CB8AC3E}">
-        <p14:creationId xmlns="" xmlns:p14="http://schemas.microsoft.com/office/powerpoint/2010/main" val="3402630883"/>
+        <p14:creationId xmlns:p14="http://schemas.microsoft.com/office/powerpoint/2010/main" xmlns="" val="3402630883"/>
       </p:ext>
     </p:extLst>
   </p:cSld>
@@ -15223,7 +15234,7 @@
     <a:masterClrMapping/>
   </p:clrMapOvr>
   <mc:AlternateContent xmlns:mc="http://schemas.openxmlformats.org/markup-compatibility/2006">
-    <mc:Choice xmlns="" xmlns:p14="http://schemas.microsoft.com/office/powerpoint/2010/main" Requires="p14">
+    <mc:Choice xmlns:p14="http://schemas.microsoft.com/office/powerpoint/2010/main" xmlns="" Requires="p14">
       <p:transition spd="slow" p14:dur="2000">
         <p14:ferris dir="l"/>
       </p:transition>
@@ -15369,7 +15380,7 @@
     </p:spTree>
     <p:extLst>
       <p:ext uri="{BB962C8B-B14F-4D97-AF65-F5344CB8AC3E}">
-        <p14:creationId xmlns="" xmlns:p14="http://schemas.microsoft.com/office/powerpoint/2010/main" val="448605758"/>
+        <p14:creationId xmlns:p14="http://schemas.microsoft.com/office/powerpoint/2010/main" xmlns="" val="448605758"/>
       </p:ext>
     </p:extLst>
   </p:cSld>
@@ -15377,7 +15388,7 @@
     <a:masterClrMapping/>
   </p:clrMapOvr>
   <mc:AlternateContent xmlns:mc="http://schemas.openxmlformats.org/markup-compatibility/2006">
-    <mc:Choice xmlns="" xmlns:p14="http://schemas.microsoft.com/office/powerpoint/2010/main" Requires="p14">
+    <mc:Choice xmlns:p14="http://schemas.microsoft.com/office/powerpoint/2010/main" xmlns="" Requires="p14">
       <p:transition spd="slow" p14:dur="2000">
         <p14:ferris dir="l"/>
       </p:transition>
@@ -15483,7 +15494,7 @@
     </p:spTree>
     <p:extLst>
       <p:ext uri="{BB962C8B-B14F-4D97-AF65-F5344CB8AC3E}">
-        <p14:creationId xmlns="" xmlns:p14="http://schemas.microsoft.com/office/powerpoint/2010/main" val="2857799541"/>
+        <p14:creationId xmlns:p14="http://schemas.microsoft.com/office/powerpoint/2010/main" xmlns="" val="2857799541"/>
       </p:ext>
     </p:extLst>
   </p:cSld>
@@ -15491,7 +15502,7 @@
     <a:masterClrMapping/>
   </p:clrMapOvr>
   <mc:AlternateContent xmlns:mc="http://schemas.openxmlformats.org/markup-compatibility/2006">
-    <mc:Choice xmlns="" xmlns:p14="http://schemas.microsoft.com/office/powerpoint/2010/main" Requires="p14">
+    <mc:Choice xmlns:p14="http://schemas.microsoft.com/office/powerpoint/2010/main" xmlns="" Requires="p14">
       <p:transition spd="slow" p14:dur="2000">
         <p14:ferris dir="l"/>
       </p:transition>
@@ -15664,7 +15675,7 @@
     </p:spTree>
     <p:extLst>
       <p:ext uri="{BB962C8B-B14F-4D97-AF65-F5344CB8AC3E}">
-        <p14:creationId xmlns="" xmlns:p14="http://schemas.microsoft.com/office/powerpoint/2010/main" val="2323190142"/>
+        <p14:creationId xmlns:p14="http://schemas.microsoft.com/office/powerpoint/2010/main" xmlns="" val="2323190142"/>
       </p:ext>
     </p:extLst>
   </p:cSld>
@@ -15672,7 +15683,7 @@
     <a:masterClrMapping/>
   </p:clrMapOvr>
   <mc:AlternateContent xmlns:mc="http://schemas.openxmlformats.org/markup-compatibility/2006">
-    <mc:Choice xmlns="" xmlns:p14="http://schemas.microsoft.com/office/powerpoint/2010/main" Requires="p14">
+    <mc:Choice xmlns:p14="http://schemas.microsoft.com/office/powerpoint/2010/main" xmlns="" Requires="p14">
       <p:transition spd="slow" p14:dur="2000">
         <p14:ferris dir="l"/>
       </p:transition>
@@ -15754,7 +15765,7 @@
     </p:spTree>
     <p:extLst>
       <p:ext uri="{BB962C8B-B14F-4D97-AF65-F5344CB8AC3E}">
-        <p14:creationId xmlns="" xmlns:p14="http://schemas.microsoft.com/office/powerpoint/2010/main" val="581599888"/>
+        <p14:creationId xmlns:p14="http://schemas.microsoft.com/office/powerpoint/2010/main" xmlns="" val="581599888"/>
       </p:ext>
     </p:extLst>
   </p:cSld>
@@ -15762,7 +15773,7 @@
     <a:masterClrMapping/>
   </p:clrMapOvr>
   <mc:AlternateContent xmlns:mc="http://schemas.openxmlformats.org/markup-compatibility/2006">
-    <mc:Choice xmlns="" xmlns:p14="http://schemas.microsoft.com/office/powerpoint/2010/main" Requires="p14">
+    <mc:Choice xmlns:p14="http://schemas.microsoft.com/office/powerpoint/2010/main" xmlns="" Requires="p14">
       <p:transition spd="slow" p14:dur="2000">
         <p14:ferris dir="l"/>
       </p:transition>
@@ -15826,104 +15837,59 @@
             <p:ph idx="1"/>
           </p:nvPr>
         </p:nvSpPr>
-        <p:spPr>
-          <a:xfrm>
-            <a:off x="685800" y="1600200"/>
-            <a:ext cx="7772400" cy="4267199"/>
-          </a:xfrm>
-        </p:spPr>
+        <p:spPr/>
         <p:txBody>
-          <a:bodyPr>
-            <a:normAutofit fontScale="92500" lnSpcReduction="20000"/>
-          </a:bodyPr>
+          <a:bodyPr/>
           <a:lstStyle/>
           <a:p>
             <a:r>
               <a:rPr lang="en-US" dirty="0" smtClean="0"/>
-              <a:t>SQL database vs. No-SQL document storage</a:t>
+              <a:t>Creation of auto-complete system based on user typing instead of a long list of manually selectable options.</a:t>
             </a:r>
           </a:p>
           <a:p>
             <a:pPr lvl="1"/>
             <a:r>
               <a:rPr lang="en-US" dirty="0" smtClean="0"/>
-              <a:t>Considered using Mongo DB to store the application data for the project</a:t>
+              <a:t>Used for choosing tags on a new message or friends to invite to a group.</a:t>
             </a:r>
           </a:p>
           <a:p>
             <a:pPr lvl="1"/>
             <a:r>
               <a:rPr lang="en-US" dirty="0" smtClean="0"/>
-              <a:t>Decided to stick to SQL instead as we began to realize that the data for the application was chiefly relational.</a:t>
-            </a:r>
-          </a:p>
-          <a:p>
+              <a:t>Trying to display all friends would create a huge list that would take forever to find who you wanted. Auto-complete system is extremely fast and efficient and can handle a huge number of friends</a:t>
+            </a:r>
+            <a:r>
+              <a:rPr lang="en-US" dirty="0" smtClean="0"/>
+              <a:t>.</a:t>
+            </a:r>
+          </a:p>
+          <a:p>
+            <a:r>
+              <a:rPr lang="en-US" dirty="0" smtClean="0"/>
+              <a:t>Desktop App</a:t>
+            </a:r>
             <a:endParaRPr lang="en-US" dirty="0" smtClean="0"/>
           </a:p>
           <a:p>
+            <a:pPr lvl="1"/>
             <a:r>
               <a:rPr lang="en-US" dirty="0" smtClean="0"/>
-              <a:t>Mobile application with Desktop Companion</a:t>
-            </a:r>
-          </a:p>
-          <a:p>
-            <a:pPr lvl="1"/>
+              <a:t>&lt;insert </a:t>
+            </a:r>
             <a:r>
               <a:rPr lang="en-US" dirty="0" smtClean="0"/>
-              <a:t>&lt;insert good reason here&gt;</a:t>
-            </a:r>
-          </a:p>
-          <a:p>
-            <a:endParaRPr lang="en-US" dirty="0" smtClean="0"/>
-          </a:p>
-          <a:p>
+              <a:t>stuff </a:t>
+            </a:r>
             <a:r>
               <a:rPr lang="en-US" dirty="0" smtClean="0"/>
-              <a:t>MWF</a:t>
-            </a:r>
-          </a:p>
-          <a:p>
-            <a:pPr lvl="1"/>
+              <a:t>here</a:t>
+            </a:r>
             <a:r>
               <a:rPr lang="en-US" dirty="0" smtClean="0"/>
-              <a:t> </a:t>
-            </a:r>
-            <a:r>
-              <a:rPr lang="en-US" dirty="0" smtClean="0"/>
-              <a:t>&lt;insert good reason here&gt;</a:t>
-            </a:r>
-          </a:p>
-          <a:p>
-            <a:pPr lvl="1"/>
-            <a:endParaRPr lang="en-US" dirty="0" smtClean="0"/>
-          </a:p>
-          <a:p>
-            <a:r>
-              <a:rPr lang="en-US" dirty="0" smtClean="0"/>
-              <a:t>Active Record Design Pattern</a:t>
-            </a:r>
-          </a:p>
-          <a:p>
-            <a:pPr lvl="1"/>
-            <a:r>
-              <a:rPr lang="en-US" dirty="0" smtClean="0"/>
-              <a:t>Used in the implementation of the PHP API calls.</a:t>
-            </a:r>
-          </a:p>
-          <a:p>
-            <a:pPr lvl="1"/>
-            <a:r>
-              <a:rPr lang="en-US" dirty="0" smtClean="0"/>
-              <a:t>Provided readability and ease of use when it came to interactions with the database.</a:t>
-            </a:r>
-          </a:p>
-          <a:p>
-            <a:endParaRPr lang="en-US" dirty="0" smtClean="0"/>
-          </a:p>
-          <a:p>
-            <a:endParaRPr lang="en-US" dirty="0" smtClean="0"/>
-          </a:p>
-          <a:p>
+              <a:t>&gt;</a:t>
+            </a:r>
             <a:endParaRPr lang="en-US" dirty="0" smtClean="0"/>
           </a:p>
         </p:txBody>
@@ -15931,7 +15897,7 @@
     </p:spTree>
     <p:extLst>
       <p:ext uri="{BB962C8B-B14F-4D97-AF65-F5344CB8AC3E}">
-        <p14:creationId xmlns="" xmlns:p14="http://schemas.microsoft.com/office/powerpoint/2010/main" val="424291153"/>
+        <p14:creationId xmlns:p14="http://schemas.microsoft.com/office/powerpoint/2010/main" xmlns="" val="424291153"/>
       </p:ext>
     </p:extLst>
   </p:cSld>
@@ -15939,7 +15905,7 @@
     <a:masterClrMapping/>
   </p:clrMapOvr>
   <mc:AlternateContent xmlns:mc="http://schemas.openxmlformats.org/markup-compatibility/2006">
-    <mc:Choice xmlns="" xmlns:p14="http://schemas.microsoft.com/office/powerpoint/2010/main" Requires="p14">
+    <mc:Choice xmlns:p14="http://schemas.microsoft.com/office/powerpoint/2010/main" xmlns="" Requires="p14">
       <p:transition spd="slow" p14:dur="2000">
         <p14:ferris dir="l"/>
       </p:transition>
@@ -16008,14 +15974,39 @@
           <a:bodyPr/>
           <a:lstStyle/>
           <a:p>
-            <a:endParaRPr lang="en-US"/>
+            <a:r>
+              <a:rPr lang="en-US" dirty="0" smtClean="0"/>
+              <a:t>Communication protocol done using AJAX instead of </a:t>
+            </a:r>
+            <a:r>
+              <a:rPr lang="en-US" dirty="0" err="1" smtClean="0"/>
+              <a:t>jQuery</a:t>
+            </a:r>
+            <a:r>
+              <a:rPr lang="en-US" dirty="0" smtClean="0"/>
+              <a:t> for communication between front and back end.</a:t>
+            </a:r>
+          </a:p>
+          <a:p>
+            <a:pPr lvl="1"/>
+            <a:r>
+              <a:rPr lang="en-US" dirty="0" smtClean="0"/>
+              <a:t>Allowed for a more light weight system with less unnecessary dependencies.</a:t>
+            </a:r>
+          </a:p>
+          <a:p>
+            <a:pPr lvl="1"/>
+            <a:r>
+              <a:rPr lang="en-US" dirty="0" smtClean="0"/>
+              <a:t>Extra work on the Communication Utility Component allowed for equivalent platform independent communication using standard AJAX.</a:t>
+            </a:r>
           </a:p>
         </p:txBody>
       </p:sp>
     </p:spTree>
     <p:extLst>
       <p:ext uri="{BB962C8B-B14F-4D97-AF65-F5344CB8AC3E}">
-        <p14:creationId xmlns="" xmlns:p14="http://schemas.microsoft.com/office/powerpoint/2010/main" val="2293241035"/>
+        <p14:creationId xmlns:p14="http://schemas.microsoft.com/office/powerpoint/2010/main" xmlns="" val="2293241035"/>
       </p:ext>
     </p:extLst>
   </p:cSld>
@@ -16023,7 +16014,7 @@
     <a:masterClrMapping/>
   </p:clrMapOvr>
   <mc:AlternateContent xmlns:mc="http://schemas.openxmlformats.org/markup-compatibility/2006">
-    <mc:Choice xmlns="" xmlns:p14="http://schemas.microsoft.com/office/powerpoint/2010/main" Requires="p14">
+    <mc:Choice xmlns:p14="http://schemas.microsoft.com/office/powerpoint/2010/main" xmlns="" Requires="p14">
       <p:transition spd="slow" p14:dur="2000">
         <p14:ferris dir="l"/>
       </p:transition>
@@ -16071,7 +16062,7 @@
           <a:p>
             <a:r>
               <a:rPr lang="en-US" dirty="0" smtClean="0"/>
-              <a:t>Testing and Debugging</a:t>
+              <a:t>Development decisions</a:t>
             </a:r>
             <a:endParaRPr lang="en-US" dirty="0"/>
           </a:p>
@@ -16087,106 +16078,89 @@
             <p:ph idx="1"/>
           </p:nvPr>
         </p:nvSpPr>
-        <p:spPr/>
+        <p:spPr>
+          <a:xfrm>
+            <a:off x="685800" y="1600200"/>
+            <a:ext cx="7772400" cy="4267199"/>
+          </a:xfrm>
+        </p:spPr>
         <p:txBody>
           <a:bodyPr>
-            <a:normAutofit fontScale="92500" lnSpcReduction="10000"/>
+            <a:normAutofit/>
           </a:bodyPr>
           <a:lstStyle/>
           <a:p>
             <a:r>
-              <a:rPr lang="en-US" dirty="0" err="1" smtClean="0"/>
-              <a:t>Qunit</a:t>
+              <a:rPr lang="en-US" dirty="0" smtClean="0"/>
+              <a:t>SQL database vs. No-SQL document storage</a:t>
+            </a:r>
+          </a:p>
+          <a:p>
+            <a:pPr lvl="1"/>
+            <a:r>
+              <a:rPr lang="en-US" dirty="0" smtClean="0"/>
+              <a:t>Considered using Mongo DB to store the application data for the project</a:t>
+            </a:r>
+          </a:p>
+          <a:p>
+            <a:pPr lvl="1"/>
+            <a:r>
+              <a:rPr lang="en-US" dirty="0" smtClean="0"/>
+              <a:t>Decided to stick to SQL instead as we began to realize that the data for the application was chiefly relational</a:t>
+            </a:r>
+            <a:r>
+              <a:rPr lang="en-US" dirty="0" smtClean="0"/>
+              <a:t>.</a:t>
             </a:r>
             <a:endParaRPr lang="en-US" dirty="0" smtClean="0"/>
           </a:p>
           <a:p>
+            <a:r>
+              <a:rPr lang="en-US" dirty="0" smtClean="0"/>
+              <a:t>Active </a:t>
+            </a:r>
+            <a:r>
+              <a:rPr lang="en-US" dirty="0" smtClean="0"/>
+              <a:t>Record Design Pattern</a:t>
+            </a:r>
+          </a:p>
+          <a:p>
             <a:pPr lvl="1"/>
             <a:r>
               <a:rPr lang="en-US" dirty="0" smtClean="0"/>
-              <a:t>Automated unit testing was developed through the use of </a:t>
-            </a:r>
-            <a:r>
-              <a:rPr lang="en-US" dirty="0" err="1" smtClean="0"/>
-              <a:t>Qunit</a:t>
-            </a:r>
+              <a:t>Used in the implementation of the PHP API calls.</a:t>
+            </a:r>
+          </a:p>
+          <a:p>
+            <a:pPr lvl="1"/>
             <a:r>
               <a:rPr lang="en-US" dirty="0" smtClean="0"/>
-              <a:t>, a </a:t>
-            </a:r>
-            <a:r>
-              <a:rPr lang="en-US" dirty="0" err="1" smtClean="0"/>
-              <a:t>javascript</a:t>
-            </a:r>
-            <a:r>
-              <a:rPr lang="en-US" dirty="0" smtClean="0"/>
-              <a:t> test suite.</a:t>
-            </a:r>
-          </a:p>
-          <a:p>
-            <a:pPr lvl="1"/>
-            <a:r>
-              <a:rPr lang="en-US" dirty="0" smtClean="0"/>
-              <a:t>Has modules divided into error handling and happy path scenarios</a:t>
-            </a:r>
-          </a:p>
-          <a:p>
-            <a:pPr lvl="1"/>
-            <a:r>
-              <a:rPr lang="en-US" dirty="0" smtClean="0"/>
-              <a:t>Provides easy URL interface that explains what tests passed or failed and why.</a:t>
+              <a:t>Provided readability and ease of use when it came to interactions with the database.</a:t>
             </a:r>
           </a:p>
           <a:p>
             <a:endParaRPr lang="en-US" dirty="0" smtClean="0"/>
           </a:p>
           <a:p>
-            <a:r>
-              <a:rPr lang="en-US" dirty="0" smtClean="0"/>
-              <a:t>Manuel Functional Tests</a:t>
-            </a:r>
-          </a:p>
-          <a:p>
-            <a:pPr lvl="1"/>
-            <a:r>
-              <a:rPr lang="en-US" dirty="0" smtClean="0"/>
-              <a:t>Manuel tests by team members and friends using the application were the main source for our functional tests.</a:t>
-            </a:r>
-          </a:p>
-          <a:p>
             <a:endParaRPr lang="en-US" dirty="0" smtClean="0"/>
           </a:p>
           <a:p>
-            <a:r>
-              <a:rPr lang="en-US" dirty="0" err="1" smtClean="0"/>
-              <a:t>Github</a:t>
-            </a:r>
-            <a:r>
-              <a:rPr lang="en-US" dirty="0" smtClean="0"/>
-              <a:t> Issue tracking and Assignment</a:t>
-            </a:r>
-          </a:p>
-          <a:p>
-            <a:pPr lvl="1"/>
-            <a:r>
-              <a:rPr lang="en-US" dirty="0" err="1" smtClean="0"/>
-              <a:t>Github</a:t>
-            </a:r>
-            <a:r>
-              <a:rPr lang="en-US" dirty="0" smtClean="0"/>
-              <a:t> provides a way to document found issues in a project, and project participants can ask questions or get assigned to figuring out the problem</a:t>
-            </a:r>
-            <a:endParaRPr lang="en-US" dirty="0"/>
+            <a:endParaRPr lang="en-US" dirty="0" smtClean="0"/>
           </a:p>
         </p:txBody>
       </p:sp>
     </p:spTree>
+    <p:extLst>
+      <p:ext uri="{BB962C8B-B14F-4D97-AF65-F5344CB8AC3E}">
+        <p14:creationId xmlns:p14="http://schemas.microsoft.com/office/powerpoint/2010/main" xmlns="" val="424291153"/>
+      </p:ext>
+    </p:extLst>
   </p:cSld>
   <p:clrMapOvr>
     <a:masterClrMapping/>
   </p:clrMapOvr>
   <mc:AlternateContent xmlns:mc="http://schemas.openxmlformats.org/markup-compatibility/2006">
-    <mc:Choice xmlns="" xmlns:p14="http://schemas.microsoft.com/office/powerpoint/2010/main" Requires="p14">
+    <mc:Choice xmlns:p14="http://schemas.microsoft.com/office/powerpoint/2010/main" xmlns="" Requires="p14">
       <p:transition spd="slow" p14:dur="2000">
         <p14:ferris dir="l"/>
       </p:transition>
@@ -16234,7 +16208,7 @@
           <a:p>
             <a:r>
               <a:rPr lang="en-US" dirty="0" smtClean="0"/>
-              <a:t>Main Challenges</a:t>
+              <a:t>Notable accomplishments</a:t>
             </a:r>
             <a:endParaRPr lang="en-US" dirty="0"/>
           </a:p>
@@ -16252,114 +16226,62 @@
         </p:nvSpPr>
         <p:spPr/>
         <p:txBody>
-          <a:bodyPr>
-            <a:normAutofit fontScale="85000" lnSpcReduction="20000"/>
-          </a:bodyPr>
+          <a:bodyPr/>
           <a:lstStyle/>
           <a:p>
             <a:r>
               <a:rPr lang="en-US" dirty="0" smtClean="0"/>
-              <a:t>Task delegation</a:t>
+              <a:t>Connected MWF Geo-Location Utility to sharing of Whoops to allow for geo-aware messaging in a platform independent manner.</a:t>
+            </a:r>
+          </a:p>
+          <a:p>
+            <a:r>
+              <a:rPr lang="en-US" dirty="0" smtClean="0"/>
+              <a:t>Loading users friends from the </a:t>
+            </a:r>
+            <a:r>
+              <a:rPr lang="en-US" dirty="0" err="1" smtClean="0"/>
+              <a:t>Facebook</a:t>
+            </a:r>
+            <a:r>
+              <a:rPr lang="en-US" dirty="0" smtClean="0"/>
+              <a:t> Graph API for usage in inviting new friends to a group.</a:t>
+            </a:r>
+          </a:p>
+          <a:p>
+            <a:r>
+              <a:rPr lang="en-US" dirty="0" smtClean="0"/>
+              <a:t>Creation of auto-complete system for ease of inviting new friends and applying existing tags.</a:t>
             </a:r>
           </a:p>
           <a:p>
             <a:pPr lvl="1"/>
             <a:r>
               <a:rPr lang="en-US" dirty="0" smtClean="0"/>
-              <a:t>Three different development teams: Desktop front-end, Mobile front-end, and Database</a:t>
-            </a:r>
-          </a:p>
-          <a:p>
-            <a:pPr lvl="1"/>
+              <a:t>Connecting auto-complete system to tag ids and </a:t>
+            </a:r>
+            <a:r>
+              <a:rPr lang="en-US" dirty="0" err="1" smtClean="0"/>
+              <a:t>Facebook</a:t>
+            </a:r>
             <a:r>
               <a:rPr lang="en-US" dirty="0" smtClean="0"/>
-              <a:t>Challenging before Whoop-Txt database fully implemented</a:t>
-            </a:r>
-          </a:p>
-          <a:p>
-            <a:pPr lvl="2"/>
+              <a:t> ids from Graph API for appropriate back end association.</a:t>
+            </a:r>
+          </a:p>
+          <a:p>
             <a:r>
               <a:rPr lang="en-US" dirty="0" smtClean="0"/>
-              <a:t>Front-end functionality implemented later in the quarter</a:t>
-            </a:r>
-          </a:p>
-          <a:p>
+              <a:t>Pulling </a:t>
+            </a:r>
+            <a:r>
+              <a:rPr lang="en-US" dirty="0" err="1" smtClean="0"/>
+              <a:t>Facebook</a:t>
+            </a:r>
             <a:r>
               <a:rPr lang="en-US" dirty="0" smtClean="0"/>
-              <a:t>Deciding on UI design</a:t>
-            </a:r>
-          </a:p>
-          <a:p>
-            <a:pPr lvl="1"/>
-            <a:r>
-              <a:rPr lang="en-US" dirty="0" smtClean="0"/>
-              <a:t>Goal: To make application visually pleasing and user-friendly</a:t>
-            </a:r>
-          </a:p>
-          <a:p>
-            <a:pPr lvl="1"/>
-            <a:r>
-              <a:rPr lang="en-US" dirty="0" smtClean="0"/>
-              <a:t>Different design ideas</a:t>
-            </a:r>
-          </a:p>
-          <a:p>
-            <a:r>
-              <a:rPr lang="en-US" dirty="0" smtClean="0"/>
-              <a:t>Integrating database with desktop and mobile front-end skeletons</a:t>
-            </a:r>
-          </a:p>
-          <a:p>
-            <a:pPr lvl="1"/>
-            <a:r>
-              <a:rPr lang="en-US" dirty="0" smtClean="0"/>
-              <a:t>Understanding how to communicate with the database</a:t>
-            </a:r>
-          </a:p>
-          <a:p>
-            <a:pPr lvl="2"/>
-            <a:r>
-              <a:rPr lang="en-US" dirty="0" smtClean="0"/>
-              <a:t>Solution: API documentation</a:t>
-            </a:r>
-          </a:p>
-          <a:p>
-            <a:pPr lvl="1"/>
-            <a:r>
-              <a:rPr lang="en-US" dirty="0" smtClean="0"/>
-              <a:t>Additional functionality needed to be added to database</a:t>
-            </a:r>
-          </a:p>
-          <a:p>
-            <a:pPr lvl="2"/>
-            <a:r>
-              <a:rPr lang="en-US" dirty="0" smtClean="0"/>
-              <a:t>Solution: Integration and development done concurrently</a:t>
-            </a:r>
-          </a:p>
-          <a:p>
-            <a:pPr lvl="1"/>
-            <a:r>
-              <a:rPr lang="en-US" dirty="0" smtClean="0"/>
-              <a:t>Coding errors</a:t>
-            </a:r>
-          </a:p>
-          <a:p>
-            <a:pPr lvl="2"/>
-            <a:r>
-              <a:rPr lang="en-US" dirty="0" smtClean="0"/>
-              <a:t>Solution: Creation of </a:t>
-            </a:r>
-            <a:r>
-              <a:rPr lang="en-US" dirty="0" err="1" smtClean="0"/>
-              <a:t>Github</a:t>
-            </a:r>
-            <a:r>
-              <a:rPr lang="en-US" dirty="0" smtClean="0"/>
-              <a:t> Issues Page</a:t>
-            </a:r>
-          </a:p>
-          <a:p>
+              <a:t> profile pictures for display next to messages.</a:t>
+            </a:r>
             <a:endParaRPr lang="en-US" dirty="0"/>
           </a:p>
         </p:txBody>
@@ -16370,7 +16292,7 @@
     <a:masterClrMapping/>
   </p:clrMapOvr>
   <mc:AlternateContent xmlns:mc="http://schemas.openxmlformats.org/markup-compatibility/2006">
-    <mc:Choice xmlns="" xmlns:p14="http://schemas.microsoft.com/office/powerpoint/2010/main" Requires="p14">
+    <mc:Choice xmlns:p14="http://schemas.microsoft.com/office/powerpoint/2010/main" xmlns="" Requires="p14">
       <p:transition spd="slow" p14:dur="2000">
         <p14:ferris dir="l"/>
       </p:transition>
@@ -16413,14 +16335,12 @@
         </p:nvSpPr>
         <p:spPr/>
         <p:txBody>
-          <a:bodyPr>
-            <a:normAutofit fontScale="90000"/>
-          </a:bodyPr>
+          <a:bodyPr/>
           <a:lstStyle/>
           <a:p>
             <a:r>
               <a:rPr lang="en-US" dirty="0" smtClean="0"/>
-              <a:t>Potential Future Functionality</a:t>
+              <a:t>Testing and Debugging</a:t>
             </a:r>
             <a:endParaRPr lang="en-US" dirty="0"/>
           </a:p>
@@ -16438,126 +16358,42 @@
         </p:nvSpPr>
         <p:spPr/>
         <p:txBody>
-          <a:bodyPr>
-            <a:normAutofit fontScale="92500" lnSpcReduction="20000"/>
-          </a:bodyPr>
+          <a:bodyPr/>
           <a:lstStyle/>
           <a:p>
             <a:r>
               <a:rPr lang="en-US" dirty="0" smtClean="0"/>
-              <a:t>Integration with other websites </a:t>
+              <a:t>Manual testing was done by many members of the team as features became available.</a:t>
             </a:r>
           </a:p>
           <a:p>
             <a:pPr lvl="1"/>
             <a:r>
               <a:rPr lang="en-US" dirty="0" smtClean="0"/>
-              <a:t>E.g. Google Maps, Twitter</a:t>
+              <a:t>Issues found were posted on the </a:t>
+            </a:r>
+            <a:r>
+              <a:rPr lang="en-US" dirty="0" err="1" smtClean="0"/>
+              <a:t>Github</a:t>
             </a:r>
             <a:r>
               <a:rPr lang="en-US" dirty="0" smtClean="0"/>
-              <a:t>,</a:t>
-            </a:r>
-            <a:endParaRPr lang="en-US" dirty="0" smtClean="0"/>
-          </a:p>
-          <a:p>
+              <a:t> Issue Tracker and assigned a label based on the group it was relevant to.</a:t>
+            </a:r>
+          </a:p>
+          <a:p>
+            <a:pPr lvl="1"/>
             <a:r>
               <a:rPr lang="en-US" dirty="0" smtClean="0"/>
-              <a:t>Refine User Interface</a:t>
+              <a:t>Members of this group could assign the task to an individual based on availability or who had worked on the target area.</a:t>
             </a:r>
           </a:p>
           <a:p>
             <a:pPr lvl="1"/>
             <a:r>
               <a:rPr lang="en-US" dirty="0" smtClean="0"/>
-              <a:t>Notification capability</a:t>
-            </a:r>
-          </a:p>
-          <a:p>
-            <a:pPr lvl="2"/>
-            <a:r>
-              <a:rPr lang="en-US" dirty="0" smtClean="0"/>
-              <a:t>Centralized page or inbox option to view new notifications</a:t>
-            </a:r>
-          </a:p>
-          <a:p>
-            <a:pPr lvl="2"/>
-            <a:r>
-              <a:rPr lang="en-US" dirty="0" err="1" smtClean="0"/>
-              <a:t>Facebook’s</a:t>
-            </a:r>
-            <a:r>
-              <a:rPr lang="en-US" dirty="0" smtClean="0"/>
-              <a:t> Request 2.0 to handle the sending of requests and invitations</a:t>
-            </a:r>
-          </a:p>
-          <a:p>
-            <a:pPr lvl="2"/>
-            <a:r>
-              <a:rPr lang="en-US" dirty="0" smtClean="0"/>
-              <a:t>Reason: more user friendly</a:t>
-            </a:r>
-          </a:p>
-          <a:p>
-            <a:pPr lvl="1"/>
-            <a:r>
-              <a:rPr lang="en-US" dirty="0" smtClean="0"/>
-              <a:t>Improvement of Group List Members</a:t>
-            </a:r>
-          </a:p>
-          <a:p>
-            <a:pPr lvl="2"/>
-            <a:r>
-              <a:rPr lang="en-US" dirty="0" smtClean="0"/>
-              <a:t>Include </a:t>
-            </a:r>
-            <a:r>
-              <a:rPr lang="en-US" dirty="0" err="1" smtClean="0"/>
-              <a:t>Facebook</a:t>
-            </a:r>
-            <a:r>
-              <a:rPr lang="en-US" dirty="0" smtClean="0"/>
-              <a:t> profiles in addition to the current names</a:t>
-            </a:r>
-          </a:p>
-          <a:p>
-            <a:r>
-              <a:rPr lang="en-US" dirty="0" smtClean="0"/>
-              <a:t>Posting Whoop-Txt information on </a:t>
-            </a:r>
-            <a:r>
-              <a:rPr lang="en-US" dirty="0" err="1" smtClean="0"/>
-              <a:t>Facebook</a:t>
-            </a:r>
-            <a:r>
-              <a:rPr lang="en-US" dirty="0" smtClean="0"/>
-              <a:t> Walls</a:t>
-            </a:r>
-          </a:p>
-          <a:p>
-            <a:pPr lvl="1"/>
-            <a:r>
-              <a:rPr lang="en-US" dirty="0" smtClean="0"/>
-              <a:t>Promotes application and notifies both Whoop-Txt and non-Whoop-Txt users</a:t>
-            </a:r>
-          </a:p>
-          <a:p>
-            <a:r>
-              <a:rPr lang="en-US" dirty="0" err="1" smtClean="0"/>
-              <a:t>PhoneGap</a:t>
-            </a:r>
-            <a:r>
-              <a:rPr lang="en-US" dirty="0" smtClean="0"/>
-              <a:t> application for mobile side</a:t>
-            </a:r>
-          </a:p>
-          <a:p>
-            <a:pPr lvl="1"/>
-            <a:r>
-              <a:rPr lang="en-US" dirty="0" smtClean="0"/>
-              <a:t>Allows access to web technologies and app stores</a:t>
-            </a:r>
-            <a:endParaRPr lang="en-US" dirty="0"/>
+              <a:t>Debugging could then be done by the most relevant person and once they felt it was done they posted a message on the Issue Tracker and the person who opened the issue could verify it was fixed and close it.</a:t>
+            </a:r>
           </a:p>
         </p:txBody>
       </p:sp>
@@ -16567,7 +16403,7 @@
     <a:masterClrMapping/>
   </p:clrMapOvr>
   <mc:AlternateContent xmlns:mc="http://schemas.openxmlformats.org/markup-compatibility/2006">
-    <mc:Choice xmlns="" xmlns:p14="http://schemas.microsoft.com/office/powerpoint/2010/main" Requires="p14">
+    <mc:Choice xmlns:p14="http://schemas.microsoft.com/office/powerpoint/2010/main" xmlns="" Requires="p14">
       <p:transition spd="slow" p14:dur="2000">
         <p14:ferris dir="l"/>
       </p:transition>
@@ -16697,7 +16533,7 @@
     </p:spTree>
     <p:extLst>
       <p:ext uri="{BB962C8B-B14F-4D97-AF65-F5344CB8AC3E}">
-        <p14:creationId xmlns="" xmlns:p14="http://schemas.microsoft.com/office/powerpoint/2010/main" val="1469798109"/>
+        <p14:creationId xmlns:p14="http://schemas.microsoft.com/office/powerpoint/2010/main" xmlns="" val="1469798109"/>
       </p:ext>
     </p:extLst>
   </p:cSld>
@@ -16705,7 +16541,7 @@
     <a:masterClrMapping/>
   </p:clrMapOvr>
   <mc:AlternateContent xmlns:mc="http://schemas.openxmlformats.org/markup-compatibility/2006">
-    <mc:Choice xmlns="" xmlns:p14="http://schemas.microsoft.com/office/powerpoint/2010/main" Requires="p14">
+    <mc:Choice xmlns:p14="http://schemas.microsoft.com/office/powerpoint/2010/main" xmlns="" Requires="p14">
       <p:transition spd="slow" p14:dur="2000">
         <p14:ferris dir="l"/>
       </p:transition>
@@ -16760,7 +16596,7 @@
           <a:p>
             <a:r>
               <a:rPr lang="en-US" dirty="0" smtClean="0"/>
-              <a:t>Demo</a:t>
+              <a:t>Testing and Debugging</a:t>
             </a:r>
             <a:endParaRPr lang="en-US" dirty="0"/>
           </a:p>
@@ -16778,50 +16614,80 @@
         </p:nvSpPr>
         <p:spPr/>
         <p:txBody>
-          <a:bodyPr/>
+          <a:bodyPr>
+            <a:normAutofit/>
+          </a:bodyPr>
           <a:lstStyle/>
           <a:p>
             <a:r>
-              <a:rPr lang="en-US" sz="2800" dirty="0"/>
-              <a:t>http</a:t>
-            </a:r>
-            <a:r>
-              <a:rPr lang="en-US" sz="2800" dirty="0" smtClean="0"/>
-              <a:t>://apps.facebook.com/whoop-txt</a:t>
-            </a:r>
-          </a:p>
-          <a:p>
-            <a:r>
-              <a:rPr lang="en-US" sz="2800" dirty="0" smtClean="0"/>
-              <a:t>Both </a:t>
-            </a:r>
-            <a:r>
-              <a:rPr lang="en-US" sz="2800" dirty="0"/>
-              <a:t>desktop and smartphone </a:t>
-            </a:r>
-            <a:r>
-              <a:rPr lang="en-US" sz="2800" dirty="0" smtClean="0"/>
-              <a:t>demonstrations</a:t>
-            </a:r>
-            <a:endParaRPr lang="en-US" sz="2800" dirty="0"/>
-          </a:p>
-          <a:p>
-            <a:endParaRPr lang="en-US" dirty="0"/>
+              <a:rPr lang="en-US" dirty="0" smtClean="0"/>
+              <a:t>Automated Testing</a:t>
+            </a:r>
+            <a:endParaRPr lang="en-US" dirty="0" smtClean="0"/>
+          </a:p>
+          <a:p>
+            <a:pPr lvl="1"/>
+            <a:r>
+              <a:rPr lang="en-US" dirty="0" smtClean="0"/>
+              <a:t>Automated </a:t>
+            </a:r>
+            <a:r>
+              <a:rPr lang="en-US" dirty="0" smtClean="0"/>
+              <a:t>unit </a:t>
+            </a:r>
+            <a:r>
+              <a:rPr lang="en-US" dirty="0" smtClean="0"/>
+              <a:t>testing was developed </a:t>
+            </a:r>
+            <a:r>
+              <a:rPr lang="en-US" dirty="0" smtClean="0"/>
+              <a:t>through the use of </a:t>
+            </a:r>
+            <a:r>
+              <a:rPr lang="en-US" dirty="0" err="1" smtClean="0"/>
+              <a:t>Qunit</a:t>
+            </a:r>
+            <a:r>
+              <a:rPr lang="en-US" dirty="0" smtClean="0"/>
+              <a:t>, a </a:t>
+            </a:r>
+            <a:r>
+              <a:rPr lang="en-US" dirty="0" err="1" smtClean="0"/>
+              <a:t>javascript</a:t>
+            </a:r>
+            <a:r>
+              <a:rPr lang="en-US" dirty="0" smtClean="0"/>
+              <a:t> test suite.</a:t>
+            </a:r>
+          </a:p>
+          <a:p>
+            <a:pPr lvl="1"/>
+            <a:r>
+              <a:rPr lang="en-US" dirty="0" smtClean="0"/>
+              <a:t>Has modules divided into error handling and happy path scenarios</a:t>
+            </a:r>
+          </a:p>
+          <a:p>
+            <a:pPr lvl="1"/>
+            <a:r>
+              <a:rPr lang="en-US" dirty="0" smtClean="0"/>
+              <a:t>Provides easy URL interface that explains what tests passed or failed and </a:t>
+            </a:r>
+            <a:r>
+              <a:rPr lang="en-US" dirty="0" smtClean="0"/>
+              <a:t>why</a:t>
+            </a:r>
+            <a:endParaRPr lang="en-US" dirty="0" smtClean="0"/>
           </a:p>
         </p:txBody>
       </p:sp>
     </p:spTree>
-    <p:extLst>
-      <p:ext uri="{BB962C8B-B14F-4D97-AF65-F5344CB8AC3E}">
-        <p14:creationId xmlns="" xmlns:p14="http://schemas.microsoft.com/office/powerpoint/2010/main" val="2418521225"/>
-      </p:ext>
-    </p:extLst>
   </p:cSld>
   <p:clrMapOvr>
     <a:masterClrMapping/>
   </p:clrMapOvr>
   <mc:AlternateContent xmlns:mc="http://schemas.openxmlformats.org/markup-compatibility/2006">
-    <mc:Choice xmlns="" xmlns:p14="http://schemas.microsoft.com/office/powerpoint/2010/main" Requires="p14">
+    <mc:Choice xmlns:p14="http://schemas.microsoft.com/office/powerpoint/2010/main" xmlns="" Requires="p14">
       <p:transition spd="slow" p14:dur="2000">
         <p14:ferris dir="l"/>
       </p:transition>
@@ -16869,6 +16735,496 @@
           <a:p>
             <a:r>
               <a:rPr lang="en-US" dirty="0" smtClean="0"/>
+              <a:t>Main Challenges</a:t>
+            </a:r>
+            <a:endParaRPr lang="en-US" dirty="0"/>
+          </a:p>
+        </p:txBody>
+      </p:sp>
+      <p:sp>
+        <p:nvSpPr>
+          <p:cNvPr id="3" name="Content Placeholder 2"/>
+          <p:cNvSpPr>
+            <a:spLocks noGrp="1"/>
+          </p:cNvSpPr>
+          <p:nvPr>
+            <p:ph idx="1"/>
+          </p:nvPr>
+        </p:nvSpPr>
+        <p:spPr/>
+        <p:txBody>
+          <a:bodyPr>
+            <a:normAutofit fontScale="85000" lnSpcReduction="20000"/>
+          </a:bodyPr>
+          <a:lstStyle/>
+          <a:p>
+            <a:r>
+              <a:rPr lang="en-US" dirty="0" smtClean="0"/>
+              <a:t>Task delegation</a:t>
+            </a:r>
+          </a:p>
+          <a:p>
+            <a:pPr lvl="1"/>
+            <a:r>
+              <a:rPr lang="en-US" dirty="0" smtClean="0"/>
+              <a:t>Three different development teams: Desktop front-end, Mobile front-end, and Database</a:t>
+            </a:r>
+          </a:p>
+          <a:p>
+            <a:pPr lvl="1"/>
+            <a:r>
+              <a:rPr lang="en-US" dirty="0" smtClean="0"/>
+              <a:t>Challenging before Whoop-Txt database fully implemented</a:t>
+            </a:r>
+          </a:p>
+          <a:p>
+            <a:pPr lvl="2"/>
+            <a:r>
+              <a:rPr lang="en-US" dirty="0" smtClean="0"/>
+              <a:t>Front-end functionality implemented later in the quarter</a:t>
+            </a:r>
+          </a:p>
+          <a:p>
+            <a:r>
+              <a:rPr lang="en-US" dirty="0" smtClean="0"/>
+              <a:t>Deciding on UI design</a:t>
+            </a:r>
+          </a:p>
+          <a:p>
+            <a:pPr lvl="1"/>
+            <a:r>
+              <a:rPr lang="en-US" dirty="0" smtClean="0"/>
+              <a:t>Goal: To make application visually pleasing and user-friendly</a:t>
+            </a:r>
+          </a:p>
+          <a:p>
+            <a:pPr lvl="1"/>
+            <a:r>
+              <a:rPr lang="en-US" dirty="0" smtClean="0"/>
+              <a:t>Different design ideas</a:t>
+            </a:r>
+          </a:p>
+          <a:p>
+            <a:r>
+              <a:rPr lang="en-US" dirty="0" smtClean="0"/>
+              <a:t>Integrating database with desktop and mobile front-end skeletons</a:t>
+            </a:r>
+          </a:p>
+          <a:p>
+            <a:pPr lvl="1"/>
+            <a:r>
+              <a:rPr lang="en-US" dirty="0" smtClean="0"/>
+              <a:t>Understanding how to communicate with the database</a:t>
+            </a:r>
+          </a:p>
+          <a:p>
+            <a:pPr lvl="2"/>
+            <a:r>
+              <a:rPr lang="en-US" dirty="0" smtClean="0"/>
+              <a:t>Solution: API documentation</a:t>
+            </a:r>
+          </a:p>
+          <a:p>
+            <a:pPr lvl="1"/>
+            <a:r>
+              <a:rPr lang="en-US" dirty="0" smtClean="0"/>
+              <a:t>Additional functionality needed to be added to database</a:t>
+            </a:r>
+          </a:p>
+          <a:p>
+            <a:pPr lvl="2"/>
+            <a:r>
+              <a:rPr lang="en-US" dirty="0" smtClean="0"/>
+              <a:t>Solution: Integration and development done concurrently</a:t>
+            </a:r>
+          </a:p>
+          <a:p>
+            <a:pPr lvl="1"/>
+            <a:r>
+              <a:rPr lang="en-US" dirty="0" smtClean="0"/>
+              <a:t>Coding errors</a:t>
+            </a:r>
+          </a:p>
+          <a:p>
+            <a:pPr lvl="2"/>
+            <a:r>
+              <a:rPr lang="en-US" dirty="0" smtClean="0"/>
+              <a:t>Solution: Creation of </a:t>
+            </a:r>
+            <a:r>
+              <a:rPr lang="en-US" dirty="0" err="1" smtClean="0"/>
+              <a:t>Github</a:t>
+            </a:r>
+            <a:r>
+              <a:rPr lang="en-US" dirty="0" smtClean="0"/>
+              <a:t> Issues Page</a:t>
+            </a:r>
+          </a:p>
+          <a:p>
+            <a:endParaRPr lang="en-US" dirty="0"/>
+          </a:p>
+        </p:txBody>
+      </p:sp>
+    </p:spTree>
+  </p:cSld>
+  <p:clrMapOvr>
+    <a:masterClrMapping/>
+  </p:clrMapOvr>
+  <mc:AlternateContent xmlns:mc="http://schemas.openxmlformats.org/markup-compatibility/2006">
+    <mc:Choice xmlns:p14="http://schemas.microsoft.com/office/powerpoint/2010/main" xmlns="" Requires="p14">
+      <p:transition spd="slow" p14:dur="2000">
+        <p14:ferris dir="l"/>
+      </p:transition>
+    </mc:Choice>
+    <mc:Fallback>
+      <p:transition spd="slow">
+        <p:fade/>
+      </p:transition>
+    </mc:Fallback>
+  </mc:AlternateContent>
+</p:sld>
+</file>
+
+<file path=ppt/slides/slide22.xml><?xml version="1.0" encoding="utf-8"?>
+<p:sld xmlns:a="http://schemas.openxmlformats.org/drawingml/2006/main" xmlns:r="http://schemas.openxmlformats.org/officeDocument/2006/relationships" xmlns:p="http://schemas.openxmlformats.org/presentationml/2006/main">
+  <p:cSld>
+    <p:spTree>
+      <p:nvGrpSpPr>
+        <p:cNvPr id="1" name=""/>
+        <p:cNvGrpSpPr/>
+        <p:nvPr/>
+      </p:nvGrpSpPr>
+      <p:grpSpPr>
+        <a:xfrm>
+          <a:off x="0" y="0"/>
+          <a:ext cx="0" cy="0"/>
+          <a:chOff x="0" y="0"/>
+          <a:chExt cx="0" cy="0"/>
+        </a:xfrm>
+      </p:grpSpPr>
+      <p:sp>
+        <p:nvSpPr>
+          <p:cNvPr id="2" name="Title 1"/>
+          <p:cNvSpPr>
+            <a:spLocks noGrp="1"/>
+          </p:cNvSpPr>
+          <p:nvPr>
+            <p:ph type="title"/>
+          </p:nvPr>
+        </p:nvSpPr>
+        <p:spPr/>
+        <p:txBody>
+          <a:bodyPr>
+            <a:normAutofit fontScale="90000"/>
+          </a:bodyPr>
+          <a:lstStyle/>
+          <a:p>
+            <a:r>
+              <a:rPr lang="en-US" dirty="0" smtClean="0"/>
+              <a:t>Potential Future Functionality</a:t>
+            </a:r>
+            <a:endParaRPr lang="en-US" dirty="0"/>
+          </a:p>
+        </p:txBody>
+      </p:sp>
+      <p:sp>
+        <p:nvSpPr>
+          <p:cNvPr id="3" name="Content Placeholder 2"/>
+          <p:cNvSpPr>
+            <a:spLocks noGrp="1"/>
+          </p:cNvSpPr>
+          <p:nvPr>
+            <p:ph idx="1"/>
+          </p:nvPr>
+        </p:nvSpPr>
+        <p:spPr/>
+        <p:txBody>
+          <a:bodyPr>
+            <a:normAutofit fontScale="92500" lnSpcReduction="20000"/>
+          </a:bodyPr>
+          <a:lstStyle/>
+          <a:p>
+            <a:r>
+              <a:rPr lang="en-US" dirty="0" smtClean="0"/>
+              <a:t>Integration with other websites </a:t>
+            </a:r>
+          </a:p>
+          <a:p>
+            <a:pPr lvl="1"/>
+            <a:r>
+              <a:rPr lang="en-US" dirty="0" smtClean="0"/>
+              <a:t>E.g. Google Maps, Twitter, and </a:t>
+            </a:r>
+            <a:r>
+              <a:rPr lang="en-US" dirty="0" err="1" smtClean="0"/>
+              <a:t>Myspace</a:t>
+            </a:r>
+            <a:endParaRPr lang="en-US" dirty="0" smtClean="0"/>
+          </a:p>
+          <a:p>
+            <a:r>
+              <a:rPr lang="en-US" dirty="0" smtClean="0"/>
+              <a:t>Refine User Interface</a:t>
+            </a:r>
+          </a:p>
+          <a:p>
+            <a:pPr lvl="1"/>
+            <a:r>
+              <a:rPr lang="en-US" dirty="0" smtClean="0"/>
+              <a:t>Notification capability</a:t>
+            </a:r>
+          </a:p>
+          <a:p>
+            <a:pPr lvl="2"/>
+            <a:r>
+              <a:rPr lang="en-US" dirty="0" smtClean="0"/>
+              <a:t>Centralized page or inbox option to view new notifications</a:t>
+            </a:r>
+          </a:p>
+          <a:p>
+            <a:pPr lvl="2"/>
+            <a:r>
+              <a:rPr lang="en-US" dirty="0" err="1" smtClean="0"/>
+              <a:t>Facebook’s</a:t>
+            </a:r>
+            <a:r>
+              <a:rPr lang="en-US" dirty="0" smtClean="0"/>
+              <a:t> Request 2.0 to handle the sending of requests and invitations</a:t>
+            </a:r>
+          </a:p>
+          <a:p>
+            <a:pPr lvl="2"/>
+            <a:r>
+              <a:rPr lang="en-US" dirty="0" smtClean="0"/>
+              <a:t>Reason: more user friendly</a:t>
+            </a:r>
+          </a:p>
+          <a:p>
+            <a:pPr lvl="1"/>
+            <a:r>
+              <a:rPr lang="en-US" dirty="0" smtClean="0"/>
+              <a:t>Improvement of Group List Members</a:t>
+            </a:r>
+          </a:p>
+          <a:p>
+            <a:pPr lvl="2"/>
+            <a:r>
+              <a:rPr lang="en-US" dirty="0" smtClean="0"/>
+              <a:t>Include </a:t>
+            </a:r>
+            <a:r>
+              <a:rPr lang="en-US" dirty="0" err="1" smtClean="0"/>
+              <a:t>Facebook</a:t>
+            </a:r>
+            <a:r>
+              <a:rPr lang="en-US" dirty="0" smtClean="0"/>
+              <a:t> profiles in addition to the current names</a:t>
+            </a:r>
+          </a:p>
+          <a:p>
+            <a:r>
+              <a:rPr lang="en-US" dirty="0" smtClean="0"/>
+              <a:t>Posting Whoop-Txt information on </a:t>
+            </a:r>
+            <a:r>
+              <a:rPr lang="en-US" dirty="0" err="1" smtClean="0"/>
+              <a:t>Facebook</a:t>
+            </a:r>
+            <a:r>
+              <a:rPr lang="en-US" dirty="0" smtClean="0"/>
+              <a:t> Walls</a:t>
+            </a:r>
+          </a:p>
+          <a:p>
+            <a:pPr lvl="1"/>
+            <a:r>
+              <a:rPr lang="en-US" dirty="0" smtClean="0"/>
+              <a:t>Promotes application and notifies both Whoop-Txt and non-Whoop-Txt users</a:t>
+            </a:r>
+          </a:p>
+          <a:p>
+            <a:r>
+              <a:rPr lang="en-US" dirty="0" err="1" smtClean="0"/>
+              <a:t>PhoneGap</a:t>
+            </a:r>
+            <a:r>
+              <a:rPr lang="en-US" dirty="0" smtClean="0"/>
+              <a:t> application for mobile side</a:t>
+            </a:r>
+          </a:p>
+          <a:p>
+            <a:pPr lvl="1"/>
+            <a:r>
+              <a:rPr lang="en-US" dirty="0" smtClean="0"/>
+              <a:t>Allows access to web technologies and app stores</a:t>
+            </a:r>
+            <a:endParaRPr lang="en-US" dirty="0"/>
+          </a:p>
+        </p:txBody>
+      </p:sp>
+    </p:spTree>
+  </p:cSld>
+  <p:clrMapOvr>
+    <a:masterClrMapping/>
+  </p:clrMapOvr>
+  <mc:AlternateContent xmlns:mc="http://schemas.openxmlformats.org/markup-compatibility/2006">
+    <mc:Choice xmlns:p14="http://schemas.microsoft.com/office/powerpoint/2010/main" xmlns="" Requires="p14">
+      <p:transition spd="slow" p14:dur="2000">
+        <p14:ferris dir="l"/>
+      </p:transition>
+    </mc:Choice>
+    <mc:Fallback>
+      <p:transition spd="slow">
+        <p:fade/>
+      </p:transition>
+    </mc:Fallback>
+  </mc:AlternateContent>
+</p:sld>
+</file>
+
+<file path=ppt/slides/slide23.xml><?xml version="1.0" encoding="utf-8"?>
+<p:sld xmlns:a="http://schemas.openxmlformats.org/drawingml/2006/main" xmlns:r="http://schemas.openxmlformats.org/officeDocument/2006/relationships" xmlns:p="http://schemas.openxmlformats.org/presentationml/2006/main">
+  <p:cSld>
+    <p:spTree>
+      <p:nvGrpSpPr>
+        <p:cNvPr id="1" name=""/>
+        <p:cNvGrpSpPr/>
+        <p:nvPr/>
+      </p:nvGrpSpPr>
+      <p:grpSpPr>
+        <a:xfrm>
+          <a:off x="0" y="0"/>
+          <a:ext cx="0" cy="0"/>
+          <a:chOff x="0" y="0"/>
+          <a:chExt cx="0" cy="0"/>
+        </a:xfrm>
+      </p:grpSpPr>
+      <p:sp>
+        <p:nvSpPr>
+          <p:cNvPr id="2" name="Title 1"/>
+          <p:cNvSpPr>
+            <a:spLocks noGrp="1"/>
+          </p:cNvSpPr>
+          <p:nvPr>
+            <p:ph type="title"/>
+          </p:nvPr>
+        </p:nvSpPr>
+        <p:spPr/>
+        <p:txBody>
+          <a:bodyPr/>
+          <a:lstStyle/>
+          <a:p>
+            <a:r>
+              <a:rPr lang="en-US" dirty="0" smtClean="0"/>
+              <a:t>Demo</a:t>
+            </a:r>
+            <a:endParaRPr lang="en-US" dirty="0"/>
+          </a:p>
+        </p:txBody>
+      </p:sp>
+      <p:sp>
+        <p:nvSpPr>
+          <p:cNvPr id="3" name="Content Placeholder 2"/>
+          <p:cNvSpPr>
+            <a:spLocks noGrp="1"/>
+          </p:cNvSpPr>
+          <p:nvPr>
+            <p:ph idx="1"/>
+          </p:nvPr>
+        </p:nvSpPr>
+        <p:spPr/>
+        <p:txBody>
+          <a:bodyPr/>
+          <a:lstStyle/>
+          <a:p>
+            <a:r>
+              <a:rPr lang="en-US" sz="2800" dirty="0"/>
+              <a:t>http</a:t>
+            </a:r>
+            <a:r>
+              <a:rPr lang="en-US" sz="2800" dirty="0" smtClean="0"/>
+              <a:t>://apps.facebook.com/whoop-txt</a:t>
+            </a:r>
+          </a:p>
+          <a:p>
+            <a:r>
+              <a:rPr lang="en-US" sz="2800" dirty="0" smtClean="0"/>
+              <a:t>Both </a:t>
+            </a:r>
+            <a:r>
+              <a:rPr lang="en-US" sz="2800" dirty="0"/>
+              <a:t>desktop and smartphone </a:t>
+            </a:r>
+            <a:r>
+              <a:rPr lang="en-US" sz="2800" dirty="0" smtClean="0"/>
+              <a:t>demonstrations</a:t>
+            </a:r>
+            <a:endParaRPr lang="en-US" sz="2800" dirty="0"/>
+          </a:p>
+          <a:p>
+            <a:endParaRPr lang="en-US" dirty="0"/>
+          </a:p>
+        </p:txBody>
+      </p:sp>
+    </p:spTree>
+    <p:extLst>
+      <p:ext uri="{BB962C8B-B14F-4D97-AF65-F5344CB8AC3E}">
+        <p14:creationId xmlns:p14="http://schemas.microsoft.com/office/powerpoint/2010/main" xmlns="" val="2418521225"/>
+      </p:ext>
+    </p:extLst>
+  </p:cSld>
+  <p:clrMapOvr>
+    <a:masterClrMapping/>
+  </p:clrMapOvr>
+  <mc:AlternateContent xmlns:mc="http://schemas.openxmlformats.org/markup-compatibility/2006">
+    <mc:Choice xmlns:p14="http://schemas.microsoft.com/office/powerpoint/2010/main" xmlns="" Requires="p14">
+      <p:transition spd="slow" p14:dur="2000">
+        <p14:ferris dir="l"/>
+      </p:transition>
+    </mc:Choice>
+    <mc:Fallback>
+      <p:transition spd="slow">
+        <p:fade/>
+      </p:transition>
+    </mc:Fallback>
+  </mc:AlternateContent>
+</p:sld>
+</file>
+
+<file path=ppt/slides/slide24.xml><?xml version="1.0" encoding="utf-8"?>
+<p:sld xmlns:a="http://schemas.openxmlformats.org/drawingml/2006/main" xmlns:r="http://schemas.openxmlformats.org/officeDocument/2006/relationships" xmlns:p="http://schemas.openxmlformats.org/presentationml/2006/main">
+  <p:cSld>
+    <p:spTree>
+      <p:nvGrpSpPr>
+        <p:cNvPr id="1" name=""/>
+        <p:cNvGrpSpPr/>
+        <p:nvPr/>
+      </p:nvGrpSpPr>
+      <p:grpSpPr>
+        <a:xfrm>
+          <a:off x="0" y="0"/>
+          <a:ext cx="0" cy="0"/>
+          <a:chOff x="0" y="0"/>
+          <a:chExt cx="0" cy="0"/>
+        </a:xfrm>
+      </p:grpSpPr>
+      <p:sp>
+        <p:nvSpPr>
+          <p:cNvPr id="2" name="Title 1"/>
+          <p:cNvSpPr>
+            <a:spLocks noGrp="1"/>
+          </p:cNvSpPr>
+          <p:nvPr>
+            <p:ph type="title"/>
+          </p:nvPr>
+        </p:nvSpPr>
+        <p:spPr/>
+        <p:txBody>
+          <a:bodyPr/>
+          <a:lstStyle/>
+          <a:p>
+            <a:r>
+              <a:rPr lang="en-US" dirty="0" smtClean="0"/>
               <a:t>The End</a:t>
             </a:r>
             <a:endParaRPr lang="en-US" dirty="0"/>
@@ -16991,7 +17347,7 @@
     </p:spTree>
     <p:extLst>
       <p:ext uri="{BB962C8B-B14F-4D97-AF65-F5344CB8AC3E}">
-        <p14:creationId xmlns="" xmlns:p14="http://schemas.microsoft.com/office/powerpoint/2010/main" val="2901881089"/>
+        <p14:creationId xmlns:p14="http://schemas.microsoft.com/office/powerpoint/2010/main" xmlns="" val="2901881089"/>
       </p:ext>
     </p:extLst>
   </p:cSld>
@@ -16999,7 +17355,7 @@
     <a:masterClrMapping/>
   </p:clrMapOvr>
   <mc:AlternateContent xmlns:mc="http://schemas.openxmlformats.org/markup-compatibility/2006">
-    <mc:Choice xmlns="" xmlns:p14="http://schemas.microsoft.com/office/powerpoint/2010/main" Requires="p14">
+    <mc:Choice xmlns:p14="http://schemas.microsoft.com/office/powerpoint/2010/main" xmlns="" Requires="p14">
       <p:transition spd="slow" p14:dur="2000">
         <p14:ferris dir="l"/>
       </p:transition>
@@ -17110,10 +17466,16 @@
           <a:p>
             <a:pPr lvl="1"/>
             <a:r>
-              <a:rPr lang="en-US" dirty="0" err="1" smtClean="0"/>
+              <a:rPr lang="en-US" dirty="0" smtClean="0"/>
               <a:t>Facebook</a:t>
             </a:r>
-            <a:endParaRPr lang="en-US" dirty="0" smtClean="0"/>
+          </a:p>
+          <a:p>
+            <a:pPr lvl="1"/>
+            <a:r>
+              <a:rPr lang="en-US" dirty="0" smtClean="0"/>
+              <a:t>Mobile Web Framework</a:t>
+            </a:r>
           </a:p>
           <a:p>
             <a:r>
@@ -17151,7 +17513,7 @@
     </p:spTree>
     <p:extLst>
       <p:ext uri="{BB962C8B-B14F-4D97-AF65-F5344CB8AC3E}">
-        <p14:creationId xmlns="" xmlns:p14="http://schemas.microsoft.com/office/powerpoint/2010/main" val="3668074173"/>
+        <p14:creationId xmlns:p14="http://schemas.microsoft.com/office/powerpoint/2010/main" xmlns="" val="3668074173"/>
       </p:ext>
     </p:extLst>
   </p:cSld>
@@ -17159,7 +17521,7 @@
     <a:masterClrMapping/>
   </p:clrMapOvr>
   <mc:AlternateContent xmlns:mc="http://schemas.openxmlformats.org/markup-compatibility/2006">
-    <mc:Choice xmlns="" xmlns:p14="http://schemas.microsoft.com/office/powerpoint/2010/main" Requires="p14">
+    <mc:Choice xmlns:p14="http://schemas.microsoft.com/office/powerpoint/2010/main" xmlns="" Requires="p14">
       <p:transition spd="slow" p14:dur="2000">
         <p14:ferris dir="l"/>
       </p:transition>
@@ -17288,7 +17650,7 @@
     </p:spTree>
     <p:extLst>
       <p:ext uri="{BB962C8B-B14F-4D97-AF65-F5344CB8AC3E}">
-        <p14:creationId xmlns="" xmlns:p14="http://schemas.microsoft.com/office/powerpoint/2010/main" val="2018697858"/>
+        <p14:creationId xmlns:p14="http://schemas.microsoft.com/office/powerpoint/2010/main" xmlns="" val="2018697858"/>
       </p:ext>
     </p:extLst>
   </p:cSld>
@@ -17296,7 +17658,7 @@
     <a:masterClrMapping/>
   </p:clrMapOvr>
   <mc:AlternateContent xmlns:mc="http://schemas.openxmlformats.org/markup-compatibility/2006">
-    <mc:Choice xmlns="" xmlns:p14="http://schemas.microsoft.com/office/powerpoint/2010/main" Requires="p14">
+    <mc:Choice xmlns:p14="http://schemas.microsoft.com/office/powerpoint/2010/main" xmlns="" Requires="p14">
       <p:transition spd="slow" p14:dur="2000">
         <p14:ferris dir="l"/>
       </p:transition>
@@ -17399,11 +17761,11 @@
             </a:r>
             <a:r>
               <a:rPr lang="en-US" sz="1800" dirty="0"/>
-              <a:t>able to select “Public” as a tag to share the post with all </a:t>
+              <a:t>able to select </a:t>
             </a:r>
             <a:r>
               <a:rPr lang="en-US" sz="1800" dirty="0" smtClean="0"/>
-              <a:t>of the members in the user’s Whoop-Txt application. </a:t>
+              <a:t>group tags to share the message with specified Whoop-Txt users based on the groups they are in.</a:t>
             </a:r>
             <a:endParaRPr lang="en-US" sz="1800" dirty="0"/>
           </a:p>
@@ -17419,26 +17781,19 @@
             </a:r>
             <a:r>
               <a:rPr lang="en-US" sz="1800" dirty="0"/>
-              <a:t>able to select “Nearby” as a tag to restrict </a:t>
+              <a:t>able to select “Nearby” as a tag to </a:t>
             </a:r>
             <a:r>
               <a:rPr lang="en-US" sz="1800" dirty="0" smtClean="0"/>
-              <a:t>sharing the post </a:t>
+              <a:t>allow other users within </a:t>
             </a:r>
             <a:r>
               <a:rPr lang="en-US" sz="1800" dirty="0"/>
-              <a:t>only to those within a certain physical distance calculated using </a:t>
+              <a:t>a certain physical distance calculated using </a:t>
             </a:r>
             <a:r>
               <a:rPr lang="en-US" sz="1800" dirty="0" smtClean="0"/>
-              <a:t>user’s geo-locations </a:t>
-            </a:r>
-          </a:p>
-          <a:p>
-            <a:pPr lvl="1"/>
-            <a:r>
-              <a:rPr lang="en-US" sz="1800" dirty="0" smtClean="0"/>
-              <a:t>The user will be able to select multiple groups they are part of and “Nearby” to share a post with members of the groups within the vicinity.</a:t>
+              <a:t>user’s geo-locations to see their message</a:t>
             </a:r>
             <a:endParaRPr lang="en-US" sz="1800" dirty="0"/>
           </a:p>
@@ -17447,7 +17802,7 @@
     </p:spTree>
     <p:extLst>
       <p:ext uri="{BB962C8B-B14F-4D97-AF65-F5344CB8AC3E}">
-        <p14:creationId xmlns="" xmlns:p14="http://schemas.microsoft.com/office/powerpoint/2010/main" val="1159455994"/>
+        <p14:creationId xmlns:p14="http://schemas.microsoft.com/office/powerpoint/2010/main" xmlns="" val="1159455994"/>
       </p:ext>
     </p:extLst>
   </p:cSld>
@@ -17455,7 +17810,7 @@
     <a:masterClrMapping/>
   </p:clrMapOvr>
   <mc:AlternateContent xmlns:mc="http://schemas.openxmlformats.org/markup-compatibility/2006">
-    <mc:Choice xmlns="" xmlns:p14="http://schemas.microsoft.com/office/powerpoint/2010/main" Requires="p14">
+    <mc:Choice xmlns:p14="http://schemas.microsoft.com/office/powerpoint/2010/main" xmlns="" Requires="p14">
       <p:transition spd="slow" p14:dur="2000">
         <p14:ferris dir="l"/>
       </p:transition>
@@ -17566,21 +17921,22 @@
             <a:pPr lvl="1"/>
             <a:r>
               <a:rPr lang="en-US" sz="1800" dirty="0"/>
-              <a:t>Select an individual post and view the post’s contents, group members, and the responses that have been shared by recipients of the post. </a:t>
+              <a:t>Select an individual post and view the post’s </a:t>
+            </a:r>
+            <a:r>
+              <a:rPr lang="en-US" sz="1800" dirty="0" smtClean="0"/>
+              <a:t>contents and the groups it was shared with.</a:t>
             </a:r>
           </a:p>
           <a:p>
             <a:pPr lvl="1"/>
             <a:r>
+              <a:rPr lang="en-US" sz="1800" dirty="0" smtClean="0"/>
+              <a:t>Re-share </a:t>
+            </a:r>
+            <a:r>
               <a:rPr lang="en-US" sz="1800" dirty="0"/>
-              <a:t>Share a reply to a post that will be visible by all of the recipients of the original post. </a:t>
-            </a:r>
-          </a:p>
-          <a:p>
-            <a:pPr lvl="1"/>
-            <a:r>
-              <a:rPr lang="en-US" sz="1800" dirty="0"/>
-              <a:t>Re-share a post they have received with the same tagging options and interface given to a new share. </a:t>
+              <a:t>a post they have received with the same tagging options and interface given to a new share. </a:t>
             </a:r>
           </a:p>
         </p:txBody>
@@ -17588,7 +17944,7 @@
     </p:spTree>
     <p:extLst>
       <p:ext uri="{BB962C8B-B14F-4D97-AF65-F5344CB8AC3E}">
-        <p14:creationId xmlns="" xmlns:p14="http://schemas.microsoft.com/office/powerpoint/2010/main" val="2043556417"/>
+        <p14:creationId xmlns:p14="http://schemas.microsoft.com/office/powerpoint/2010/main" xmlns="" val="2043556417"/>
       </p:ext>
     </p:extLst>
   </p:cSld>
@@ -17596,7 +17952,7 @@
     <a:masterClrMapping/>
   </p:clrMapOvr>
   <mc:AlternateContent xmlns:mc="http://schemas.openxmlformats.org/markup-compatibility/2006">
-    <mc:Choice xmlns="" xmlns:p14="http://schemas.microsoft.com/office/powerpoint/2010/main" Requires="p14">
+    <mc:Choice xmlns:p14="http://schemas.microsoft.com/office/powerpoint/2010/main" xmlns="" Requires="p14">
       <p:transition spd="slow" p14:dur="2000">
         <p14:ferris dir="l"/>
       </p:transition>
@@ -17667,7 +18023,12 @@
             <p:ph idx="1"/>
           </p:nvPr>
         </p:nvSpPr>
-        <p:spPr/>
+        <p:spPr>
+          <a:xfrm>
+            <a:off x="685800" y="1600200"/>
+            <a:ext cx="7772400" cy="3962399"/>
+          </a:xfrm>
+        </p:spPr>
         <p:txBody>
           <a:bodyPr>
             <a:normAutofit/>
@@ -17740,13 +18101,22 @@
               <a:rPr lang="en-US" dirty="0"/>
               <a:t>Groups - Directs you to the Groups Page. </a:t>
             </a:r>
+            <a:endParaRPr lang="en-US" dirty="0" smtClean="0"/>
+          </a:p>
+          <a:p>
+            <a:pPr lvl="2"/>
+            <a:r>
+              <a:rPr lang="en-US" dirty="0" smtClean="0"/>
+              <a:t>Invitations – Directs you to the Invitations Page.</a:t>
+            </a:r>
+            <a:endParaRPr lang="en-US" dirty="0"/>
           </a:p>
         </p:txBody>
       </p:sp>
     </p:spTree>
     <p:extLst>
       <p:ext uri="{BB962C8B-B14F-4D97-AF65-F5344CB8AC3E}">
-        <p14:creationId xmlns="" xmlns:p14="http://schemas.microsoft.com/office/powerpoint/2010/main" val="269415945"/>
+        <p14:creationId xmlns:p14="http://schemas.microsoft.com/office/powerpoint/2010/main" xmlns="" val="269415945"/>
       </p:ext>
     </p:extLst>
   </p:cSld>
@@ -17754,7 +18124,7 @@
     <a:masterClrMapping/>
   </p:clrMapOvr>
   <mc:AlternateContent xmlns:mc="http://schemas.openxmlformats.org/markup-compatibility/2006">
-    <mc:Choice xmlns="" xmlns:p14="http://schemas.microsoft.com/office/powerpoint/2010/main" Requires="p14">
+    <mc:Choice xmlns:p14="http://schemas.microsoft.com/office/powerpoint/2010/main" xmlns="" Requires="p14">
       <p:transition spd="slow" p14:dur="2000">
         <p14:ferris dir="l"/>
       </p:transition>
@@ -17839,8 +18209,13 @@
             <a:pPr lvl="1"/>
             <a:r>
               <a:rPr lang="en-US" dirty="0"/>
-              <a:t>Allows you to send posts to other Whoop-Txt users. The user will have the choice of explicitly selecting “tags” that will modify who will be able to see or be notified of this post or they can text people a certain distance away from them. </a:t>
-            </a:r>
+              <a:t>Allows you to send posts to other Whoop-Txt users. The user will have the choice of explicitly selecting “tags” that will modify who will be able to see or be notified of this post or they can text people a certain distance away from </a:t>
+            </a:r>
+            <a:r>
+              <a:rPr lang="en-US" dirty="0" smtClean="0"/>
+              <a:t>them using the Nearby tag.</a:t>
+            </a:r>
+            <a:endParaRPr lang="en-US" dirty="0"/>
           </a:p>
           <a:p>
             <a:r>
@@ -17860,7 +18235,7 @@
     </p:spTree>
     <p:extLst>
       <p:ext uri="{BB962C8B-B14F-4D97-AF65-F5344CB8AC3E}">
-        <p14:creationId xmlns="" xmlns:p14="http://schemas.microsoft.com/office/powerpoint/2010/main" val="4140326256"/>
+        <p14:creationId xmlns:p14="http://schemas.microsoft.com/office/powerpoint/2010/main" xmlns="" val="4140326256"/>
       </p:ext>
     </p:extLst>
   </p:cSld>
@@ -17868,7 +18243,7 @@
     <a:masterClrMapping/>
   </p:clrMapOvr>
   <mc:AlternateContent xmlns:mc="http://schemas.openxmlformats.org/markup-compatibility/2006">
-    <mc:Choice xmlns="" xmlns:p14="http://schemas.microsoft.com/office/powerpoint/2010/main" Requires="p14">
+    <mc:Choice xmlns:p14="http://schemas.microsoft.com/office/powerpoint/2010/main" xmlns="" Requires="p14">
       <p:transition spd="slow" p14:dur="2000">
         <p14:ferris dir="l"/>
       </p:transition>
@@ -17942,7 +18317,7 @@
           <a:blip r:embed="rId2" cstate="print">
             <a:extLst>
               <a:ext uri="{28A0092B-C50C-407E-A947-70E740481C1C}">
-                <a14:useLocalDpi xmlns="" xmlns:a14="http://schemas.microsoft.com/office/drawing/2010/main" val="0"/>
+                <a14:useLocalDpi xmlns:a14="http://schemas.microsoft.com/office/drawing/2010/main" xmlns="" val="0"/>
               </a:ext>
             </a:extLst>
           </a:blip>
@@ -17965,14 +18340,14 @@
           <a:effectLst/>
           <a:extLst>
             <a:ext uri="{909E8E84-426E-40DD-AFC4-6F175D3DCCD1}">
-              <a14:hiddenFill xmlns="" xmlns:a14="http://schemas.microsoft.com/office/drawing/2010/main">
+              <a14:hiddenFill xmlns:a14="http://schemas.microsoft.com/office/drawing/2010/main" xmlns="">
                 <a:solidFill>
                   <a:schemeClr val="accent1"/>
                 </a:solidFill>
               </a14:hiddenFill>
             </a:ext>
             <a:ext uri="{91240B29-F687-4F45-9708-019B960494DF}">
-              <a14:hiddenLine xmlns="" xmlns:a14="http://schemas.microsoft.com/office/drawing/2010/main" w="9525">
+              <a14:hiddenLine xmlns:a14="http://schemas.microsoft.com/office/drawing/2010/main" xmlns="" w="9525">
                 <a:solidFill>
                   <a:schemeClr val="tx1"/>
                 </a:solidFill>
@@ -17982,7 +18357,7 @@
               </a14:hiddenLine>
             </a:ext>
             <a:ext uri="{AF507438-7753-43E0-B8FC-AC1667EBCBE1}">
-              <a14:hiddenEffects xmlns="" xmlns:a14="http://schemas.microsoft.com/office/drawing/2010/main">
+              <a14:hiddenEffects xmlns:a14="http://schemas.microsoft.com/office/drawing/2010/main" xmlns="">
                 <a:effectLst>
                   <a:outerShdw dist="35921" dir="2700000" algn="ctr" rotWithShape="0">
                     <a:schemeClr val="bg2"/>
@@ -17996,7 +18371,7 @@
     </p:spTree>
     <p:extLst>
       <p:ext uri="{BB962C8B-B14F-4D97-AF65-F5344CB8AC3E}">
-        <p14:creationId xmlns="" xmlns:p14="http://schemas.microsoft.com/office/powerpoint/2010/main" val="2701624253"/>
+        <p14:creationId xmlns:p14="http://schemas.microsoft.com/office/powerpoint/2010/main" xmlns="" val="2701624253"/>
       </p:ext>
     </p:extLst>
   </p:cSld>
@@ -18004,7 +18379,7 @@
     <a:masterClrMapping/>
   </p:clrMapOvr>
   <mc:AlternateContent xmlns:mc="http://schemas.openxmlformats.org/markup-compatibility/2006">
-    <mc:Choice xmlns="" xmlns:p14="http://schemas.microsoft.com/office/powerpoint/2010/main" Requires="p14">
+    <mc:Choice xmlns:p14="http://schemas.microsoft.com/office/powerpoint/2010/main" xmlns="" Requires="p14">
       <p:transition spd="slow" p14:dur="2000">
         <p14:ferris dir="l"/>
       </p:transition>

</xml_diff>

<commit_message>
Uploaded the Desktop App related information onto the final presentation.
</commit_message>
<xml_diff>
--- a/doc/final_presentation.pptx
+++ b/doc/final_presentation.pptx
@@ -385,7 +385,7 @@
     </p:spTree>
     <p:extLst>
       <p:ext uri="{BB962C8B-B14F-4D97-AF65-F5344CB8AC3E}">
-        <p14:creationId xmlns:p14="http://schemas.microsoft.com/office/powerpoint/2010/main" xmlns="" val="3494936748"/>
+        <p14:creationId xmlns:p14="http://schemas.microsoft.com/office/powerpoint/2010/main" val="3494936748"/>
       </p:ext>
     </p:extLst>
   </p:cSld>
@@ -568,7 +568,7 @@
     </p:spTree>
     <p:extLst>
       <p:ext uri="{BB962C8B-B14F-4D97-AF65-F5344CB8AC3E}">
-        <p14:creationId xmlns:p14="http://schemas.microsoft.com/office/powerpoint/2010/main" xmlns="" val="1767483421"/>
+        <p14:creationId xmlns:p14="http://schemas.microsoft.com/office/powerpoint/2010/main" val="1767483421"/>
       </p:ext>
     </p:extLst>
   </p:cSld>
@@ -661,7 +661,7 @@
     </p:spTree>
     <p:extLst>
       <p:ext uri="{BB962C8B-B14F-4D97-AF65-F5344CB8AC3E}">
-        <p14:creationId xmlns:p14="http://schemas.microsoft.com/office/powerpoint/2010/main" xmlns="" val="387822502"/>
+        <p14:creationId xmlns:p14="http://schemas.microsoft.com/office/powerpoint/2010/main" val="387822502"/>
       </p:ext>
     </p:extLst>
   </p:cSld>
@@ -2266,13 +2266,13 @@
   <p:clrMapOvr>
     <a:masterClrMapping/>
   </p:clrMapOvr>
-  <mc:AlternateContent xmlns:mc="http://schemas.openxmlformats.org/markup-compatibility/2006">
-    <mc:Choice xmlns:p14="http://schemas.microsoft.com/office/powerpoint/2010/main" xmlns="" Requires="p14">
+  <mc:AlternateContent xmlns:mc="http://schemas.openxmlformats.org/markup-compatibility/2006" xmlns:p14="http://schemas.microsoft.com/office/powerpoint/2010/main">
+    <mc:Choice Requires="p14">
       <p:transition spd="slow" p14:dur="2000">
         <p14:ferris dir="l"/>
       </p:transition>
     </mc:Choice>
-    <mc:Fallback>
+    <mc:Fallback xmlns="">
       <p:transition spd="slow">
         <p:fade/>
       </p:transition>
@@ -3383,13 +3383,13 @@
   <p:clrMapOvr>
     <a:masterClrMapping/>
   </p:clrMapOvr>
-  <mc:AlternateContent xmlns:mc="http://schemas.openxmlformats.org/markup-compatibility/2006">
-    <mc:Choice xmlns:p14="http://schemas.microsoft.com/office/powerpoint/2010/main" xmlns="" Requires="p14">
+  <mc:AlternateContent xmlns:mc="http://schemas.openxmlformats.org/markup-compatibility/2006" xmlns:p14="http://schemas.microsoft.com/office/powerpoint/2010/main">
+    <mc:Choice Requires="p14">
       <p:transition spd="slow" p14:dur="2000">
         <p14:ferris dir="l"/>
       </p:transition>
     </mc:Choice>
-    <mc:Fallback>
+    <mc:Fallback xmlns="">
       <p:transition spd="slow">
         <p:fade/>
       </p:transition>
@@ -4510,13 +4510,13 @@
   <p:clrMapOvr>
     <a:masterClrMapping/>
   </p:clrMapOvr>
-  <mc:AlternateContent xmlns:mc="http://schemas.openxmlformats.org/markup-compatibility/2006">
-    <mc:Choice xmlns:p14="http://schemas.microsoft.com/office/powerpoint/2010/main" xmlns="" Requires="p14">
+  <mc:AlternateContent xmlns:mc="http://schemas.openxmlformats.org/markup-compatibility/2006" xmlns:p14="http://schemas.microsoft.com/office/powerpoint/2010/main">
+    <mc:Choice Requires="p14">
       <p:transition spd="slow" p14:dur="2000">
         <p14:ferris dir="l"/>
       </p:transition>
     </mc:Choice>
-    <mc:Fallback>
+    <mc:Fallback xmlns="">
       <p:transition spd="slow">
         <p:fade/>
       </p:transition>
@@ -5632,13 +5632,13 @@
   <p:clrMapOvr>
     <a:masterClrMapping/>
   </p:clrMapOvr>
-  <mc:AlternateContent xmlns:mc="http://schemas.openxmlformats.org/markup-compatibility/2006">
-    <mc:Choice xmlns:p14="http://schemas.microsoft.com/office/powerpoint/2010/main" xmlns="" Requires="p14">
+  <mc:AlternateContent xmlns:mc="http://schemas.openxmlformats.org/markup-compatibility/2006" xmlns:p14="http://schemas.microsoft.com/office/powerpoint/2010/main">
+    <mc:Choice Requires="p14">
       <p:transition spd="slow" p14:dur="2000">
         <p14:ferris dir="l"/>
       </p:transition>
     </mc:Choice>
-    <mc:Fallback>
+    <mc:Fallback xmlns="">
       <p:transition spd="slow">
         <p:fade/>
       </p:transition>
@@ -7239,13 +7239,13 @@
   <p:clrMapOvr>
     <a:masterClrMapping/>
   </p:clrMapOvr>
-  <mc:AlternateContent xmlns:mc="http://schemas.openxmlformats.org/markup-compatibility/2006">
-    <mc:Choice xmlns:p14="http://schemas.microsoft.com/office/powerpoint/2010/main" xmlns="" Requires="p14">
+  <mc:AlternateContent xmlns:mc="http://schemas.openxmlformats.org/markup-compatibility/2006" xmlns:p14="http://schemas.microsoft.com/office/powerpoint/2010/main">
+    <mc:Choice Requires="p14">
       <p:transition spd="slow" p14:dur="2000">
         <p14:ferris dir="l"/>
       </p:transition>
     </mc:Choice>
-    <mc:Fallback>
+    <mc:Fallback xmlns="">
       <p:transition spd="slow">
         <p:fade/>
       </p:transition>
@@ -8425,13 +8425,13 @@
   <p:clrMapOvr>
     <a:masterClrMapping/>
   </p:clrMapOvr>
-  <mc:AlternateContent xmlns:mc="http://schemas.openxmlformats.org/markup-compatibility/2006">
-    <mc:Choice xmlns:p14="http://schemas.microsoft.com/office/powerpoint/2010/main" xmlns="" Requires="p14">
+  <mc:AlternateContent xmlns:mc="http://schemas.openxmlformats.org/markup-compatibility/2006" xmlns:p14="http://schemas.microsoft.com/office/powerpoint/2010/main">
+    <mc:Choice Requires="p14">
       <p:transition spd="slow" p14:dur="2000">
         <p14:ferris dir="l"/>
       </p:transition>
     </mc:Choice>
-    <mc:Fallback>
+    <mc:Fallback xmlns="">
       <p:transition spd="slow">
         <p:fade/>
       </p:transition>
@@ -9766,13 +9766,13 @@
   <p:clrMapOvr>
     <a:masterClrMapping/>
   </p:clrMapOvr>
-  <mc:AlternateContent xmlns:mc="http://schemas.openxmlformats.org/markup-compatibility/2006">
-    <mc:Choice xmlns:p14="http://schemas.microsoft.com/office/powerpoint/2010/main" xmlns="" Requires="p14">
+  <mc:AlternateContent xmlns:mc="http://schemas.openxmlformats.org/markup-compatibility/2006" xmlns:p14="http://schemas.microsoft.com/office/powerpoint/2010/main">
+    <mc:Choice Requires="p14">
       <p:transition spd="slow" p14:dur="2000">
         <p14:ferris dir="l"/>
       </p:transition>
     </mc:Choice>
-    <mc:Fallback>
+    <mc:Fallback xmlns="">
       <p:transition spd="slow">
         <p:fade/>
       </p:transition>
@@ -10803,13 +10803,13 @@
   <p:clrMapOvr>
     <a:masterClrMapping/>
   </p:clrMapOvr>
-  <mc:AlternateContent xmlns:mc="http://schemas.openxmlformats.org/markup-compatibility/2006">
-    <mc:Choice xmlns:p14="http://schemas.microsoft.com/office/powerpoint/2010/main" xmlns="" Requires="p14">
+  <mc:AlternateContent xmlns:mc="http://schemas.openxmlformats.org/markup-compatibility/2006" xmlns:p14="http://schemas.microsoft.com/office/powerpoint/2010/main">
+    <mc:Choice Requires="p14">
       <p:transition spd="slow" p14:dur="2000">
         <p14:ferris dir="l"/>
       </p:transition>
     </mc:Choice>
-    <mc:Fallback>
+    <mc:Fallback xmlns="">
       <p:transition spd="slow">
         <p:fade/>
       </p:transition>
@@ -11873,13 +11873,13 @@
   <p:clrMapOvr>
     <a:masterClrMapping/>
   </p:clrMapOvr>
-  <mc:AlternateContent xmlns:mc="http://schemas.openxmlformats.org/markup-compatibility/2006">
-    <mc:Choice xmlns:p14="http://schemas.microsoft.com/office/powerpoint/2010/main" xmlns="" Requires="p14">
+  <mc:AlternateContent xmlns:mc="http://schemas.openxmlformats.org/markup-compatibility/2006" xmlns:p14="http://schemas.microsoft.com/office/powerpoint/2010/main">
+    <mc:Choice Requires="p14">
       <p:transition spd="slow" p14:dur="2000">
         <p14:ferris dir="l"/>
       </p:transition>
     </mc:Choice>
-    <mc:Fallback>
+    <mc:Fallback xmlns="">
       <p:transition spd="slow">
         <p:fade/>
       </p:transition>
@@ -13038,13 +13038,13 @@
   <p:clrMapOvr>
     <a:masterClrMapping/>
   </p:clrMapOvr>
-  <mc:AlternateContent xmlns:mc="http://schemas.openxmlformats.org/markup-compatibility/2006">
-    <mc:Choice xmlns:p14="http://schemas.microsoft.com/office/powerpoint/2010/main" xmlns="" Requires="p14">
+  <mc:AlternateContent xmlns:mc="http://schemas.openxmlformats.org/markup-compatibility/2006" xmlns:p14="http://schemas.microsoft.com/office/powerpoint/2010/main">
+    <mc:Choice Requires="p14">
       <p:transition spd="slow" p14:dur="2000">
         <p14:ferris dir="l"/>
       </p:transition>
     </mc:Choice>
-    <mc:Fallback>
+    <mc:Fallback xmlns="">
       <p:transition spd="slow">
         <p:fade/>
       </p:transition>
@@ -14268,13 +14268,13 @@
   <p:clrMapOvr>
     <a:masterClrMapping/>
   </p:clrMapOvr>
-  <mc:AlternateContent xmlns:mc="http://schemas.openxmlformats.org/markup-compatibility/2006">
-    <mc:Choice xmlns:p14="http://schemas.microsoft.com/office/powerpoint/2010/main" xmlns="" Requires="p14">
+  <mc:AlternateContent xmlns:mc="http://schemas.openxmlformats.org/markup-compatibility/2006" xmlns:p14="http://schemas.microsoft.com/office/powerpoint/2010/main">
+    <mc:Choice Requires="p14">
       <p:transition spd="slow" p14:dur="2000">
         <p14:ferris dir="l"/>
       </p:transition>
     </mc:Choice>
-    <mc:Fallback>
+    <mc:Fallback xmlns="">
       <p:transition spd="slow">
         <p:fade/>
       </p:transition>
@@ -14584,13 +14584,13 @@
     <p:sldLayoutId id="2147483682" r:id="rId10"/>
     <p:sldLayoutId id="2147483683" r:id="rId11"/>
   </p:sldLayoutIdLst>
-  <mc:AlternateContent xmlns:mc="http://schemas.openxmlformats.org/markup-compatibility/2006">
-    <mc:Choice xmlns:p14="http://schemas.microsoft.com/office/powerpoint/2010/main" xmlns="" Requires="p14">
+  <mc:AlternateContent xmlns:mc="http://schemas.openxmlformats.org/markup-compatibility/2006" xmlns:p14="http://schemas.microsoft.com/office/powerpoint/2010/main">
+    <mc:Choice Requires="p14">
       <p:transition spd="slow" p14:dur="2000">
         <p14:ferris dir="l"/>
       </p:transition>
     </mc:Choice>
-    <mc:Fallback>
+    <mc:Fallback xmlns="">
       <p:transition spd="slow">
         <p:fade/>
       </p:transition>
@@ -15098,20 +15098,20 @@
     </p:spTree>
     <p:extLst>
       <p:ext uri="{BB962C8B-B14F-4D97-AF65-F5344CB8AC3E}">
-        <p14:creationId xmlns:p14="http://schemas.microsoft.com/office/powerpoint/2010/main" xmlns="" val="3270928020"/>
+        <p14:creationId xmlns:p14="http://schemas.microsoft.com/office/powerpoint/2010/main" val="3270928020"/>
       </p:ext>
     </p:extLst>
   </p:cSld>
   <p:clrMapOvr>
     <a:masterClrMapping/>
   </p:clrMapOvr>
-  <mc:AlternateContent xmlns:mc="http://schemas.openxmlformats.org/markup-compatibility/2006">
-    <mc:Choice xmlns:p14="http://schemas.microsoft.com/office/powerpoint/2010/main" xmlns="" Requires="p14">
+  <mc:AlternateContent xmlns:mc="http://schemas.openxmlformats.org/markup-compatibility/2006" xmlns:p14="http://schemas.microsoft.com/office/powerpoint/2010/main">
+    <mc:Choice Requires="p14">
       <p:transition spd="slow" p14:dur="2000">
         <p14:ferris dir="l"/>
       </p:transition>
     </mc:Choice>
-    <mc:Fallback>
+    <mc:Fallback xmlns="">
       <p:transition spd="slow">
         <p:fade/>
       </p:transition>
@@ -15226,20 +15226,20 @@
     </p:spTree>
     <p:extLst>
       <p:ext uri="{BB962C8B-B14F-4D97-AF65-F5344CB8AC3E}">
-        <p14:creationId xmlns:p14="http://schemas.microsoft.com/office/powerpoint/2010/main" xmlns="" val="3402630883"/>
+        <p14:creationId xmlns:p14="http://schemas.microsoft.com/office/powerpoint/2010/main" val="3402630883"/>
       </p:ext>
     </p:extLst>
   </p:cSld>
   <p:clrMapOvr>
     <a:masterClrMapping/>
   </p:clrMapOvr>
-  <mc:AlternateContent xmlns:mc="http://schemas.openxmlformats.org/markup-compatibility/2006">
-    <mc:Choice xmlns:p14="http://schemas.microsoft.com/office/powerpoint/2010/main" xmlns="" Requires="p14">
+  <mc:AlternateContent xmlns:mc="http://schemas.openxmlformats.org/markup-compatibility/2006" xmlns:p14="http://schemas.microsoft.com/office/powerpoint/2010/main">
+    <mc:Choice Requires="p14">
       <p:transition spd="slow" p14:dur="2000">
         <p14:ferris dir="l"/>
       </p:transition>
     </mc:Choice>
-    <mc:Fallback>
+    <mc:Fallback xmlns="">
       <p:transition spd="slow">
         <p:fade/>
       </p:transition>
@@ -15380,20 +15380,20 @@
     </p:spTree>
     <p:extLst>
       <p:ext uri="{BB962C8B-B14F-4D97-AF65-F5344CB8AC3E}">
-        <p14:creationId xmlns:p14="http://schemas.microsoft.com/office/powerpoint/2010/main" xmlns="" val="448605758"/>
+        <p14:creationId xmlns:p14="http://schemas.microsoft.com/office/powerpoint/2010/main" val="448605758"/>
       </p:ext>
     </p:extLst>
   </p:cSld>
   <p:clrMapOvr>
     <a:masterClrMapping/>
   </p:clrMapOvr>
-  <mc:AlternateContent xmlns:mc="http://schemas.openxmlformats.org/markup-compatibility/2006">
-    <mc:Choice xmlns:p14="http://schemas.microsoft.com/office/powerpoint/2010/main" xmlns="" Requires="p14">
+  <mc:AlternateContent xmlns:mc="http://schemas.openxmlformats.org/markup-compatibility/2006" xmlns:p14="http://schemas.microsoft.com/office/powerpoint/2010/main">
+    <mc:Choice Requires="p14">
       <p:transition spd="slow" p14:dur="2000">
         <p14:ferris dir="l"/>
       </p:transition>
     </mc:Choice>
-    <mc:Fallback>
+    <mc:Fallback xmlns="">
       <p:transition spd="slow">
         <p:fade/>
       </p:transition>
@@ -15494,20 +15494,20 @@
     </p:spTree>
     <p:extLst>
       <p:ext uri="{BB962C8B-B14F-4D97-AF65-F5344CB8AC3E}">
-        <p14:creationId xmlns:p14="http://schemas.microsoft.com/office/powerpoint/2010/main" xmlns="" val="2857799541"/>
+        <p14:creationId xmlns:p14="http://schemas.microsoft.com/office/powerpoint/2010/main" val="2857799541"/>
       </p:ext>
     </p:extLst>
   </p:cSld>
   <p:clrMapOvr>
     <a:masterClrMapping/>
   </p:clrMapOvr>
-  <mc:AlternateContent xmlns:mc="http://schemas.openxmlformats.org/markup-compatibility/2006">
-    <mc:Choice xmlns:p14="http://schemas.microsoft.com/office/powerpoint/2010/main" xmlns="" Requires="p14">
+  <mc:AlternateContent xmlns:mc="http://schemas.openxmlformats.org/markup-compatibility/2006" xmlns:p14="http://schemas.microsoft.com/office/powerpoint/2010/main">
+    <mc:Choice Requires="p14">
       <p:transition spd="slow" p14:dur="2000">
         <p14:ferris dir="l"/>
       </p:transition>
     </mc:Choice>
-    <mc:Fallback>
+    <mc:Fallback xmlns="">
       <p:transition spd="slow">
         <p:fade/>
       </p:transition>
@@ -15675,20 +15675,20 @@
     </p:spTree>
     <p:extLst>
       <p:ext uri="{BB962C8B-B14F-4D97-AF65-F5344CB8AC3E}">
-        <p14:creationId xmlns:p14="http://schemas.microsoft.com/office/powerpoint/2010/main" xmlns="" val="2323190142"/>
+        <p14:creationId xmlns:p14="http://schemas.microsoft.com/office/powerpoint/2010/main" val="2323190142"/>
       </p:ext>
     </p:extLst>
   </p:cSld>
   <p:clrMapOvr>
     <a:masterClrMapping/>
   </p:clrMapOvr>
-  <mc:AlternateContent xmlns:mc="http://schemas.openxmlformats.org/markup-compatibility/2006">
-    <mc:Choice xmlns:p14="http://schemas.microsoft.com/office/powerpoint/2010/main" xmlns="" Requires="p14">
+  <mc:AlternateContent xmlns:mc="http://schemas.openxmlformats.org/markup-compatibility/2006" xmlns:p14="http://schemas.microsoft.com/office/powerpoint/2010/main">
+    <mc:Choice Requires="p14">
       <p:transition spd="slow" p14:dur="2000">
         <p14:ferris dir="l"/>
       </p:transition>
     </mc:Choice>
-    <mc:Fallback>
+    <mc:Fallback xmlns="">
       <p:transition spd="slow">
         <p:fade/>
       </p:transition>
@@ -15765,20 +15765,20 @@
     </p:spTree>
     <p:extLst>
       <p:ext uri="{BB962C8B-B14F-4D97-AF65-F5344CB8AC3E}">
-        <p14:creationId xmlns:p14="http://schemas.microsoft.com/office/powerpoint/2010/main" xmlns="" val="581599888"/>
+        <p14:creationId xmlns:p14="http://schemas.microsoft.com/office/powerpoint/2010/main" val="581599888"/>
       </p:ext>
     </p:extLst>
   </p:cSld>
   <p:clrMapOvr>
     <a:masterClrMapping/>
   </p:clrMapOvr>
-  <mc:AlternateContent xmlns:mc="http://schemas.openxmlformats.org/markup-compatibility/2006">
-    <mc:Choice xmlns:p14="http://schemas.microsoft.com/office/powerpoint/2010/main" xmlns="" Requires="p14">
+  <mc:AlternateContent xmlns:mc="http://schemas.openxmlformats.org/markup-compatibility/2006" xmlns:p14="http://schemas.microsoft.com/office/powerpoint/2010/main">
+    <mc:Choice Requires="p14">
       <p:transition spd="slow" p14:dur="2000">
         <p14:ferris dir="l"/>
       </p:transition>
     </mc:Choice>
-    <mc:Fallback>
+    <mc:Fallback xmlns="">
       <p:transition spd="slow">
         <p:fade/>
       </p:transition>
@@ -15839,7 +15839,9 @@
         </p:nvSpPr>
         <p:spPr/>
         <p:txBody>
-          <a:bodyPr/>
+          <a:bodyPr>
+            <a:normAutofit fontScale="92500"/>
+          </a:bodyPr>
           <a:lstStyle/>
           <a:p>
             <a:r>
@@ -15858,11 +15860,7 @@
             <a:pPr lvl="1"/>
             <a:r>
               <a:rPr lang="en-US" dirty="0" smtClean="0"/>
-              <a:t>Trying to display all friends would create a huge list that would take forever to find who you wanted. Auto-complete system is extremely fast and efficient and can handle a huge number of friends</a:t>
-            </a:r>
-            <a:r>
-              <a:rPr lang="en-US" dirty="0" smtClean="0"/>
-              <a:t>.</a:t>
+              <a:t>Trying to display all friends would create a huge list that would take forever to find who you wanted. Auto-complete system is extremely fast and efficient and can handle a huge number of friends.</a:t>
             </a:r>
           </a:p>
           <a:p>
@@ -15870,26 +15868,48 @@
               <a:rPr lang="en-US" dirty="0" smtClean="0"/>
               <a:t>Desktop App</a:t>
             </a:r>
-            <a:endParaRPr lang="en-US" dirty="0" smtClean="0"/>
           </a:p>
           <a:p>
             <a:pPr lvl="1"/>
             <a:r>
               <a:rPr lang="en-US" dirty="0" smtClean="0"/>
-              <a:t>&lt;insert </a:t>
-            </a:r>
-            <a:r>
-              <a:rPr lang="en-US" dirty="0" smtClean="0"/>
-              <a:t>stuff </a:t>
-            </a:r>
-            <a:r>
-              <a:rPr lang="en-US" dirty="0" smtClean="0"/>
-              <a:t>here</a:t>
-            </a:r>
-            <a:r>
-              <a:rPr lang="en-US" dirty="0" smtClean="0"/>
-              <a:t>&gt;</a:t>
-            </a:r>
+              <a:t>Users </a:t>
+            </a:r>
+            <a:r>
+              <a:rPr lang="en-US" dirty="0"/>
+              <a:t>can log on to the desktop application through Facebook</a:t>
+            </a:r>
+          </a:p>
+          <a:p>
+            <a:pPr lvl="1"/>
+            <a:r>
+              <a:rPr lang="en-US" dirty="0"/>
+              <a:t>User Interface:</a:t>
+            </a:r>
+          </a:p>
+          <a:p>
+            <a:pPr lvl="2"/>
+            <a:r>
+              <a:rPr lang="en-US" dirty="0"/>
+              <a:t>Index Page (Messages), Nearby Messages, Groups Page, Help Page, Report/Feedback, Private Policy</a:t>
+            </a:r>
+          </a:p>
+          <a:p>
+            <a:pPr lvl="1"/>
+            <a:r>
+              <a:rPr lang="en-US" dirty="0"/>
+              <a:t>Drop-Down display for groups and members in groups</a:t>
+            </a:r>
+          </a:p>
+          <a:p>
+            <a:pPr lvl="1"/>
+            <a:r>
+              <a:rPr lang="en-US" dirty="0"/>
+              <a:t>Help displays for first time users</a:t>
+            </a:r>
+          </a:p>
+          <a:p>
+            <a:pPr lvl="1"/>
             <a:endParaRPr lang="en-US" dirty="0" smtClean="0"/>
           </a:p>
         </p:txBody>
@@ -15897,20 +15917,20 @@
     </p:spTree>
     <p:extLst>
       <p:ext uri="{BB962C8B-B14F-4D97-AF65-F5344CB8AC3E}">
-        <p14:creationId xmlns:p14="http://schemas.microsoft.com/office/powerpoint/2010/main" xmlns="" val="424291153"/>
+        <p14:creationId xmlns:p14="http://schemas.microsoft.com/office/powerpoint/2010/main" val="424291153"/>
       </p:ext>
     </p:extLst>
   </p:cSld>
   <p:clrMapOvr>
     <a:masterClrMapping/>
   </p:clrMapOvr>
-  <mc:AlternateContent xmlns:mc="http://schemas.openxmlformats.org/markup-compatibility/2006">
-    <mc:Choice xmlns:p14="http://schemas.microsoft.com/office/powerpoint/2010/main" xmlns="" Requires="p14">
+  <mc:AlternateContent xmlns:mc="http://schemas.openxmlformats.org/markup-compatibility/2006" xmlns:p14="http://schemas.microsoft.com/office/powerpoint/2010/main">
+    <mc:Choice Requires="p14">
       <p:transition spd="slow" p14:dur="2000">
         <p14:ferris dir="l"/>
       </p:transition>
     </mc:Choice>
-    <mc:Fallback>
+    <mc:Fallback xmlns="">
       <p:transition spd="slow">
         <p:fade/>
       </p:transition>
@@ -16006,20 +16026,20 @@
     </p:spTree>
     <p:extLst>
       <p:ext uri="{BB962C8B-B14F-4D97-AF65-F5344CB8AC3E}">
-        <p14:creationId xmlns:p14="http://schemas.microsoft.com/office/powerpoint/2010/main" xmlns="" val="2293241035"/>
+        <p14:creationId xmlns:p14="http://schemas.microsoft.com/office/powerpoint/2010/main" val="2293241035"/>
       </p:ext>
     </p:extLst>
   </p:cSld>
   <p:clrMapOvr>
     <a:masterClrMapping/>
   </p:clrMapOvr>
-  <mc:AlternateContent xmlns:mc="http://schemas.openxmlformats.org/markup-compatibility/2006">
-    <mc:Choice xmlns:p14="http://schemas.microsoft.com/office/powerpoint/2010/main" xmlns="" Requires="p14">
+  <mc:AlternateContent xmlns:mc="http://schemas.openxmlformats.org/markup-compatibility/2006" xmlns:p14="http://schemas.microsoft.com/office/powerpoint/2010/main">
+    <mc:Choice Requires="p14">
       <p:transition spd="slow" p14:dur="2000">
         <p14:ferris dir="l"/>
       </p:transition>
     </mc:Choice>
-    <mc:Fallback>
+    <mc:Fallback xmlns="">
       <p:transition spd="slow">
         <p:fade/>
       </p:transition>
@@ -16106,22 +16126,13 @@
             <a:pPr lvl="1"/>
             <a:r>
               <a:rPr lang="en-US" dirty="0" smtClean="0"/>
-              <a:t>Decided to stick to SQL instead as we began to realize that the data for the application was chiefly relational</a:t>
-            </a:r>
+              <a:t>Decided to stick to SQL instead as we began to realize that the data for the application was chiefly relational.</a:t>
+            </a:r>
+          </a:p>
+          <a:p>
             <a:r>
               <a:rPr lang="en-US" dirty="0" smtClean="0"/>
-              <a:t>.</a:t>
-            </a:r>
-            <a:endParaRPr lang="en-US" dirty="0" smtClean="0"/>
-          </a:p>
-          <a:p>
-            <a:r>
-              <a:rPr lang="en-US" dirty="0" smtClean="0"/>
-              <a:t>Active </a:t>
-            </a:r>
-            <a:r>
-              <a:rPr lang="en-US" dirty="0" smtClean="0"/>
-              <a:t>Record Design Pattern</a:t>
+              <a:t>Active Record Design Pattern</a:t>
             </a:r>
           </a:p>
           <a:p>
@@ -16152,20 +16163,20 @@
     </p:spTree>
     <p:extLst>
       <p:ext uri="{BB962C8B-B14F-4D97-AF65-F5344CB8AC3E}">
-        <p14:creationId xmlns:p14="http://schemas.microsoft.com/office/powerpoint/2010/main" xmlns="" val="424291153"/>
+        <p14:creationId xmlns:p14="http://schemas.microsoft.com/office/powerpoint/2010/main" val="424291153"/>
       </p:ext>
     </p:extLst>
   </p:cSld>
   <p:clrMapOvr>
     <a:masterClrMapping/>
   </p:clrMapOvr>
-  <mc:AlternateContent xmlns:mc="http://schemas.openxmlformats.org/markup-compatibility/2006">
-    <mc:Choice xmlns:p14="http://schemas.microsoft.com/office/powerpoint/2010/main" xmlns="" Requires="p14">
+  <mc:AlternateContent xmlns:mc="http://schemas.openxmlformats.org/markup-compatibility/2006" xmlns:p14="http://schemas.microsoft.com/office/powerpoint/2010/main">
+    <mc:Choice Requires="p14">
       <p:transition spd="slow" p14:dur="2000">
         <p14:ferris dir="l"/>
       </p:transition>
     </mc:Choice>
-    <mc:Fallback>
+    <mc:Fallback xmlns="">
       <p:transition spd="slow">
         <p:fade/>
       </p:transition>
@@ -16291,13 +16302,13 @@
   <p:clrMapOvr>
     <a:masterClrMapping/>
   </p:clrMapOvr>
-  <mc:AlternateContent xmlns:mc="http://schemas.openxmlformats.org/markup-compatibility/2006">
-    <mc:Choice xmlns:p14="http://schemas.microsoft.com/office/powerpoint/2010/main" xmlns="" Requires="p14">
+  <mc:AlternateContent xmlns:mc="http://schemas.openxmlformats.org/markup-compatibility/2006" xmlns:p14="http://schemas.microsoft.com/office/powerpoint/2010/main">
+    <mc:Choice Requires="p14">
       <p:transition spd="slow" p14:dur="2000">
         <p14:ferris dir="l"/>
       </p:transition>
     </mc:Choice>
-    <mc:Fallback>
+    <mc:Fallback xmlns="">
       <p:transition spd="slow">
         <p:fade/>
       </p:transition>
@@ -16402,13 +16413,13 @@
   <p:clrMapOvr>
     <a:masterClrMapping/>
   </p:clrMapOvr>
-  <mc:AlternateContent xmlns:mc="http://schemas.openxmlformats.org/markup-compatibility/2006">
-    <mc:Choice xmlns:p14="http://schemas.microsoft.com/office/powerpoint/2010/main" xmlns="" Requires="p14">
+  <mc:AlternateContent xmlns:mc="http://schemas.openxmlformats.org/markup-compatibility/2006" xmlns:p14="http://schemas.microsoft.com/office/powerpoint/2010/main">
+    <mc:Choice Requires="p14">
       <p:transition spd="slow" p14:dur="2000">
         <p14:ferris dir="l"/>
       </p:transition>
     </mc:Choice>
-    <mc:Fallback>
+    <mc:Fallback xmlns="">
       <p:transition spd="slow">
         <p:fade/>
       </p:transition>
@@ -16533,20 +16544,20 @@
     </p:spTree>
     <p:extLst>
       <p:ext uri="{BB962C8B-B14F-4D97-AF65-F5344CB8AC3E}">
-        <p14:creationId xmlns:p14="http://schemas.microsoft.com/office/powerpoint/2010/main" xmlns="" val="1469798109"/>
+        <p14:creationId xmlns:p14="http://schemas.microsoft.com/office/powerpoint/2010/main" val="1469798109"/>
       </p:ext>
     </p:extLst>
   </p:cSld>
   <p:clrMapOvr>
     <a:masterClrMapping/>
   </p:clrMapOvr>
-  <mc:AlternateContent xmlns:mc="http://schemas.openxmlformats.org/markup-compatibility/2006">
-    <mc:Choice xmlns:p14="http://schemas.microsoft.com/office/powerpoint/2010/main" xmlns="" Requires="p14">
+  <mc:AlternateContent xmlns:mc="http://schemas.openxmlformats.org/markup-compatibility/2006" xmlns:p14="http://schemas.microsoft.com/office/powerpoint/2010/main">
+    <mc:Choice Requires="p14">
       <p:transition spd="slow" p14:dur="2000">
         <p14:ferris dir="l"/>
       </p:transition>
     </mc:Choice>
-    <mc:Fallback>
+    <mc:Fallback xmlns="">
       <p:transition spd="slow">
         <p:fade/>
       </p:transition>
@@ -16623,25 +16634,12 @@
               <a:rPr lang="en-US" dirty="0" smtClean="0"/>
               <a:t>Automated Testing</a:t>
             </a:r>
-            <a:endParaRPr lang="en-US" dirty="0" smtClean="0"/>
           </a:p>
           <a:p>
             <a:pPr lvl="1"/>
             <a:r>
               <a:rPr lang="en-US" dirty="0" smtClean="0"/>
-              <a:t>Automated </a:t>
-            </a:r>
-            <a:r>
-              <a:rPr lang="en-US" dirty="0" smtClean="0"/>
-              <a:t>unit </a:t>
-            </a:r>
-            <a:r>
-              <a:rPr lang="en-US" dirty="0" smtClean="0"/>
-              <a:t>testing was developed </a:t>
-            </a:r>
-            <a:r>
-              <a:rPr lang="en-US" dirty="0" smtClean="0"/>
-              <a:t>through the use of </a:t>
+              <a:t>Automated unit testing was developed through the use of </a:t>
             </a:r>
             <a:r>
               <a:rPr lang="en-US" dirty="0" err="1" smtClean="0"/>
@@ -16671,13 +16669,8 @@
             <a:pPr lvl="1"/>
             <a:r>
               <a:rPr lang="en-US" dirty="0" smtClean="0"/>
-              <a:t>Provides easy URL interface that explains what tests passed or failed and </a:t>
-            </a:r>
-            <a:r>
-              <a:rPr lang="en-US" dirty="0" smtClean="0"/>
-              <a:t>why</a:t>
-            </a:r>
-            <a:endParaRPr lang="en-US" dirty="0" smtClean="0"/>
+              <a:t>Provides easy URL interface that explains what tests passed or failed and why</a:t>
+            </a:r>
           </a:p>
         </p:txBody>
       </p:sp>
@@ -16686,13 +16679,13 @@
   <p:clrMapOvr>
     <a:masterClrMapping/>
   </p:clrMapOvr>
-  <mc:AlternateContent xmlns:mc="http://schemas.openxmlformats.org/markup-compatibility/2006">
-    <mc:Choice xmlns:p14="http://schemas.microsoft.com/office/powerpoint/2010/main" xmlns="" Requires="p14">
+  <mc:AlternateContent xmlns:mc="http://schemas.openxmlformats.org/markup-compatibility/2006" xmlns:p14="http://schemas.microsoft.com/office/powerpoint/2010/main">
+    <mc:Choice Requires="p14">
       <p:transition spd="slow" p14:dur="2000">
         <p14:ferris dir="l"/>
       </p:transition>
     </mc:Choice>
-    <mc:Fallback>
+    <mc:Fallback xmlns="">
       <p:transition spd="slow">
         <p:fade/>
       </p:transition>
@@ -16870,13 +16863,13 @@
   <p:clrMapOvr>
     <a:masterClrMapping/>
   </p:clrMapOvr>
-  <mc:AlternateContent xmlns:mc="http://schemas.openxmlformats.org/markup-compatibility/2006">
-    <mc:Choice xmlns:p14="http://schemas.microsoft.com/office/powerpoint/2010/main" xmlns="" Requires="p14">
+  <mc:AlternateContent xmlns:mc="http://schemas.openxmlformats.org/markup-compatibility/2006" xmlns:p14="http://schemas.microsoft.com/office/powerpoint/2010/main">
+    <mc:Choice Requires="p14">
       <p:transition spd="slow" p14:dur="2000">
         <p14:ferris dir="l"/>
       </p:transition>
     </mc:Choice>
-    <mc:Fallback>
+    <mc:Fallback xmlns="">
       <p:transition spd="slow">
         <p:fade/>
       </p:transition>
@@ -17067,13 +17060,13 @@
   <p:clrMapOvr>
     <a:masterClrMapping/>
   </p:clrMapOvr>
-  <mc:AlternateContent xmlns:mc="http://schemas.openxmlformats.org/markup-compatibility/2006">
-    <mc:Choice xmlns:p14="http://schemas.microsoft.com/office/powerpoint/2010/main" xmlns="" Requires="p14">
+  <mc:AlternateContent xmlns:mc="http://schemas.openxmlformats.org/markup-compatibility/2006" xmlns:p14="http://schemas.microsoft.com/office/powerpoint/2010/main">
+    <mc:Choice Requires="p14">
       <p:transition spd="slow" p14:dur="2000">
         <p14:ferris dir="l"/>
       </p:transition>
     </mc:Choice>
-    <mc:Fallback>
+    <mc:Fallback xmlns="">
       <p:transition spd="slow">
         <p:fade/>
       </p:transition>
@@ -17169,20 +17162,20 @@
     </p:spTree>
     <p:extLst>
       <p:ext uri="{BB962C8B-B14F-4D97-AF65-F5344CB8AC3E}">
-        <p14:creationId xmlns:p14="http://schemas.microsoft.com/office/powerpoint/2010/main" xmlns="" val="2418521225"/>
+        <p14:creationId xmlns:p14="http://schemas.microsoft.com/office/powerpoint/2010/main" val="2418521225"/>
       </p:ext>
     </p:extLst>
   </p:cSld>
   <p:clrMapOvr>
     <a:masterClrMapping/>
   </p:clrMapOvr>
-  <mc:AlternateContent xmlns:mc="http://schemas.openxmlformats.org/markup-compatibility/2006">
-    <mc:Choice xmlns:p14="http://schemas.microsoft.com/office/powerpoint/2010/main" xmlns="" Requires="p14">
+  <mc:AlternateContent xmlns:mc="http://schemas.openxmlformats.org/markup-compatibility/2006" xmlns:p14="http://schemas.microsoft.com/office/powerpoint/2010/main">
+    <mc:Choice Requires="p14">
       <p:transition spd="slow" p14:dur="2000">
         <p14:ferris dir="l"/>
       </p:transition>
     </mc:Choice>
-    <mc:Fallback>
+    <mc:Fallback xmlns="">
       <p:transition spd="slow">
         <p:fade/>
       </p:transition>
@@ -17347,20 +17340,20 @@
     </p:spTree>
     <p:extLst>
       <p:ext uri="{BB962C8B-B14F-4D97-AF65-F5344CB8AC3E}">
-        <p14:creationId xmlns:p14="http://schemas.microsoft.com/office/powerpoint/2010/main" xmlns="" val="2901881089"/>
+        <p14:creationId xmlns:p14="http://schemas.microsoft.com/office/powerpoint/2010/main" val="2901881089"/>
       </p:ext>
     </p:extLst>
   </p:cSld>
   <p:clrMapOvr>
     <a:masterClrMapping/>
   </p:clrMapOvr>
-  <mc:AlternateContent xmlns:mc="http://schemas.openxmlformats.org/markup-compatibility/2006">
-    <mc:Choice xmlns:p14="http://schemas.microsoft.com/office/powerpoint/2010/main" xmlns="" Requires="p14">
+  <mc:AlternateContent xmlns:mc="http://schemas.openxmlformats.org/markup-compatibility/2006" xmlns:p14="http://schemas.microsoft.com/office/powerpoint/2010/main">
+    <mc:Choice Requires="p14">
       <p:transition spd="slow" p14:dur="2000">
         <p14:ferris dir="l"/>
       </p:transition>
     </mc:Choice>
-    <mc:Fallback>
+    <mc:Fallback xmlns="">
       <p:transition spd="slow">
         <p:fade/>
       </p:transition>
@@ -17513,20 +17506,20 @@
     </p:spTree>
     <p:extLst>
       <p:ext uri="{BB962C8B-B14F-4D97-AF65-F5344CB8AC3E}">
-        <p14:creationId xmlns:p14="http://schemas.microsoft.com/office/powerpoint/2010/main" xmlns="" val="3668074173"/>
+        <p14:creationId xmlns:p14="http://schemas.microsoft.com/office/powerpoint/2010/main" val="3668074173"/>
       </p:ext>
     </p:extLst>
   </p:cSld>
   <p:clrMapOvr>
     <a:masterClrMapping/>
   </p:clrMapOvr>
-  <mc:AlternateContent xmlns:mc="http://schemas.openxmlformats.org/markup-compatibility/2006">
-    <mc:Choice xmlns:p14="http://schemas.microsoft.com/office/powerpoint/2010/main" xmlns="" Requires="p14">
+  <mc:AlternateContent xmlns:mc="http://schemas.openxmlformats.org/markup-compatibility/2006" xmlns:p14="http://schemas.microsoft.com/office/powerpoint/2010/main">
+    <mc:Choice Requires="p14">
       <p:transition spd="slow" p14:dur="2000">
         <p14:ferris dir="l"/>
       </p:transition>
     </mc:Choice>
-    <mc:Fallback>
+    <mc:Fallback xmlns="">
       <p:transition spd="slow">
         <p:fade/>
       </p:transition>
@@ -17650,20 +17643,20 @@
     </p:spTree>
     <p:extLst>
       <p:ext uri="{BB962C8B-B14F-4D97-AF65-F5344CB8AC3E}">
-        <p14:creationId xmlns:p14="http://schemas.microsoft.com/office/powerpoint/2010/main" xmlns="" val="2018697858"/>
+        <p14:creationId xmlns:p14="http://schemas.microsoft.com/office/powerpoint/2010/main" val="2018697858"/>
       </p:ext>
     </p:extLst>
   </p:cSld>
   <p:clrMapOvr>
     <a:masterClrMapping/>
   </p:clrMapOvr>
-  <mc:AlternateContent xmlns:mc="http://schemas.openxmlformats.org/markup-compatibility/2006">
-    <mc:Choice xmlns:p14="http://schemas.microsoft.com/office/powerpoint/2010/main" xmlns="" Requires="p14">
+  <mc:AlternateContent xmlns:mc="http://schemas.openxmlformats.org/markup-compatibility/2006" xmlns:p14="http://schemas.microsoft.com/office/powerpoint/2010/main">
+    <mc:Choice Requires="p14">
       <p:transition spd="slow" p14:dur="2000">
         <p14:ferris dir="l"/>
       </p:transition>
     </mc:Choice>
-    <mc:Fallback>
+    <mc:Fallback xmlns="">
       <p:transition spd="slow">
         <p:fade/>
       </p:transition>
@@ -17802,20 +17795,20 @@
     </p:spTree>
     <p:extLst>
       <p:ext uri="{BB962C8B-B14F-4D97-AF65-F5344CB8AC3E}">
-        <p14:creationId xmlns:p14="http://schemas.microsoft.com/office/powerpoint/2010/main" xmlns="" val="1159455994"/>
+        <p14:creationId xmlns:p14="http://schemas.microsoft.com/office/powerpoint/2010/main" val="1159455994"/>
       </p:ext>
     </p:extLst>
   </p:cSld>
   <p:clrMapOvr>
     <a:masterClrMapping/>
   </p:clrMapOvr>
-  <mc:AlternateContent xmlns:mc="http://schemas.openxmlformats.org/markup-compatibility/2006">
-    <mc:Choice xmlns:p14="http://schemas.microsoft.com/office/powerpoint/2010/main" xmlns="" Requires="p14">
+  <mc:AlternateContent xmlns:mc="http://schemas.openxmlformats.org/markup-compatibility/2006" xmlns:p14="http://schemas.microsoft.com/office/powerpoint/2010/main">
+    <mc:Choice Requires="p14">
       <p:transition spd="slow" p14:dur="2000">
         <p14:ferris dir="l"/>
       </p:transition>
     </mc:Choice>
-    <mc:Fallback>
+    <mc:Fallback xmlns="">
       <p:transition spd="slow">
         <p:fade/>
       </p:transition>
@@ -17944,20 +17937,20 @@
     </p:spTree>
     <p:extLst>
       <p:ext uri="{BB962C8B-B14F-4D97-AF65-F5344CB8AC3E}">
-        <p14:creationId xmlns:p14="http://schemas.microsoft.com/office/powerpoint/2010/main" xmlns="" val="2043556417"/>
+        <p14:creationId xmlns:p14="http://schemas.microsoft.com/office/powerpoint/2010/main" val="2043556417"/>
       </p:ext>
     </p:extLst>
   </p:cSld>
   <p:clrMapOvr>
     <a:masterClrMapping/>
   </p:clrMapOvr>
-  <mc:AlternateContent xmlns:mc="http://schemas.openxmlformats.org/markup-compatibility/2006">
-    <mc:Choice xmlns:p14="http://schemas.microsoft.com/office/powerpoint/2010/main" xmlns="" Requires="p14">
+  <mc:AlternateContent xmlns:mc="http://schemas.openxmlformats.org/markup-compatibility/2006" xmlns:p14="http://schemas.microsoft.com/office/powerpoint/2010/main">
+    <mc:Choice Requires="p14">
       <p:transition spd="slow" p14:dur="2000">
         <p14:ferris dir="l"/>
       </p:transition>
     </mc:Choice>
-    <mc:Fallback>
+    <mc:Fallback xmlns="">
       <p:transition spd="slow">
         <p:fade/>
       </p:transition>
@@ -18116,20 +18109,20 @@
     </p:spTree>
     <p:extLst>
       <p:ext uri="{BB962C8B-B14F-4D97-AF65-F5344CB8AC3E}">
-        <p14:creationId xmlns:p14="http://schemas.microsoft.com/office/powerpoint/2010/main" xmlns="" val="269415945"/>
+        <p14:creationId xmlns:p14="http://schemas.microsoft.com/office/powerpoint/2010/main" val="269415945"/>
       </p:ext>
     </p:extLst>
   </p:cSld>
   <p:clrMapOvr>
     <a:masterClrMapping/>
   </p:clrMapOvr>
-  <mc:AlternateContent xmlns:mc="http://schemas.openxmlformats.org/markup-compatibility/2006">
-    <mc:Choice xmlns:p14="http://schemas.microsoft.com/office/powerpoint/2010/main" xmlns="" Requires="p14">
+  <mc:AlternateContent xmlns:mc="http://schemas.openxmlformats.org/markup-compatibility/2006" xmlns:p14="http://schemas.microsoft.com/office/powerpoint/2010/main">
+    <mc:Choice Requires="p14">
       <p:transition spd="slow" p14:dur="2000">
         <p14:ferris dir="l"/>
       </p:transition>
     </mc:Choice>
-    <mc:Fallback>
+    <mc:Fallback xmlns="">
       <p:transition spd="slow">
         <p:fade/>
       </p:transition>
@@ -18235,20 +18228,20 @@
     </p:spTree>
     <p:extLst>
       <p:ext uri="{BB962C8B-B14F-4D97-AF65-F5344CB8AC3E}">
-        <p14:creationId xmlns:p14="http://schemas.microsoft.com/office/powerpoint/2010/main" xmlns="" val="4140326256"/>
+        <p14:creationId xmlns:p14="http://schemas.microsoft.com/office/powerpoint/2010/main" val="4140326256"/>
       </p:ext>
     </p:extLst>
   </p:cSld>
   <p:clrMapOvr>
     <a:masterClrMapping/>
   </p:clrMapOvr>
-  <mc:AlternateContent xmlns:mc="http://schemas.openxmlformats.org/markup-compatibility/2006">
-    <mc:Choice xmlns:p14="http://schemas.microsoft.com/office/powerpoint/2010/main" xmlns="" Requires="p14">
+  <mc:AlternateContent xmlns:mc="http://schemas.openxmlformats.org/markup-compatibility/2006" xmlns:p14="http://schemas.microsoft.com/office/powerpoint/2010/main">
+    <mc:Choice Requires="p14">
       <p:transition spd="slow" p14:dur="2000">
         <p14:ferris dir="l"/>
       </p:transition>
     </mc:Choice>
-    <mc:Fallback>
+    <mc:Fallback xmlns="">
       <p:transition spd="slow">
         <p:fade/>
       </p:transition>
@@ -18317,7 +18310,7 @@
           <a:blip r:embed="rId2" cstate="print">
             <a:extLst>
               <a:ext uri="{28A0092B-C50C-407E-A947-70E740481C1C}">
-                <a14:useLocalDpi xmlns:a14="http://schemas.microsoft.com/office/drawing/2010/main" xmlns="" val="0"/>
+                <a14:useLocalDpi xmlns:a14="http://schemas.microsoft.com/office/drawing/2010/main" val="0"/>
               </a:ext>
             </a:extLst>
           </a:blip>
@@ -18340,14 +18333,14 @@
           <a:effectLst/>
           <a:extLst>
             <a:ext uri="{909E8E84-426E-40DD-AFC4-6F175D3DCCD1}">
-              <a14:hiddenFill xmlns:a14="http://schemas.microsoft.com/office/drawing/2010/main" xmlns="">
+              <a14:hiddenFill xmlns:a14="http://schemas.microsoft.com/office/drawing/2010/main">
                 <a:solidFill>
                   <a:schemeClr val="accent1"/>
                 </a:solidFill>
               </a14:hiddenFill>
             </a:ext>
             <a:ext uri="{91240B29-F687-4F45-9708-019B960494DF}">
-              <a14:hiddenLine xmlns:a14="http://schemas.microsoft.com/office/drawing/2010/main" xmlns="" w="9525">
+              <a14:hiddenLine xmlns:a14="http://schemas.microsoft.com/office/drawing/2010/main" w="9525">
                 <a:solidFill>
                   <a:schemeClr val="tx1"/>
                 </a:solidFill>
@@ -18357,7 +18350,7 @@
               </a14:hiddenLine>
             </a:ext>
             <a:ext uri="{AF507438-7753-43E0-B8FC-AC1667EBCBE1}">
-              <a14:hiddenEffects xmlns:a14="http://schemas.microsoft.com/office/drawing/2010/main" xmlns="">
+              <a14:hiddenEffects xmlns:a14="http://schemas.microsoft.com/office/drawing/2010/main">
                 <a:effectLst>
                   <a:outerShdw dist="35921" dir="2700000" algn="ctr" rotWithShape="0">
                     <a:schemeClr val="bg2"/>
@@ -18371,20 +18364,20 @@
     </p:spTree>
     <p:extLst>
       <p:ext uri="{BB962C8B-B14F-4D97-AF65-F5344CB8AC3E}">
-        <p14:creationId xmlns:p14="http://schemas.microsoft.com/office/powerpoint/2010/main" xmlns="" val="2701624253"/>
+        <p14:creationId xmlns:p14="http://schemas.microsoft.com/office/powerpoint/2010/main" val="2701624253"/>
       </p:ext>
     </p:extLst>
   </p:cSld>
   <p:clrMapOvr>
     <a:masterClrMapping/>
   </p:clrMapOvr>
-  <mc:AlternateContent xmlns:mc="http://schemas.openxmlformats.org/markup-compatibility/2006">
-    <mc:Choice xmlns:p14="http://schemas.microsoft.com/office/powerpoint/2010/main" xmlns="" Requires="p14">
+  <mc:AlternateContent xmlns:mc="http://schemas.openxmlformats.org/markup-compatibility/2006" xmlns:p14="http://schemas.microsoft.com/office/powerpoint/2010/main">
+    <mc:Choice Requires="p14">
       <p:transition spd="slow" p14:dur="2000">
         <p14:ferris dir="l"/>
       </p:transition>
     </mc:Choice>
-    <mc:Fallback>
+    <mc:Fallback xmlns="">
       <p:transition spd="slow">
         <p:fade/>
       </p:transition>

</xml_diff>

<commit_message>
(Wade) Updated slides fixed some minor changes.
</commit_message>
<xml_diff>
--- a/doc/final_presentation.pptx
+++ b/doc/final_presentation.pptx
@@ -385,7 +385,7 @@
     </p:spTree>
     <p:extLst>
       <p:ext uri="{BB962C8B-B14F-4D97-AF65-F5344CB8AC3E}">
-        <p14:creationId xmlns:p14="http://schemas.microsoft.com/office/powerpoint/2010/main" val="3494936748"/>
+        <p14:creationId xmlns:p14="http://schemas.microsoft.com/office/powerpoint/2010/main" xmlns="" val="3494936748"/>
       </p:ext>
     </p:extLst>
   </p:cSld>
@@ -568,7 +568,7 @@
     </p:spTree>
     <p:extLst>
       <p:ext uri="{BB962C8B-B14F-4D97-AF65-F5344CB8AC3E}">
-        <p14:creationId xmlns:p14="http://schemas.microsoft.com/office/powerpoint/2010/main" val="1767483421"/>
+        <p14:creationId xmlns:p14="http://schemas.microsoft.com/office/powerpoint/2010/main" xmlns="" val="1767483421"/>
       </p:ext>
     </p:extLst>
   </p:cSld>
@@ -661,7 +661,7 @@
     </p:spTree>
     <p:extLst>
       <p:ext uri="{BB962C8B-B14F-4D97-AF65-F5344CB8AC3E}">
-        <p14:creationId xmlns:p14="http://schemas.microsoft.com/office/powerpoint/2010/main" val="387822502"/>
+        <p14:creationId xmlns:p14="http://schemas.microsoft.com/office/powerpoint/2010/main" xmlns="" val="387822502"/>
       </p:ext>
     </p:extLst>
   </p:cSld>
@@ -2266,13 +2266,13 @@
   <p:clrMapOvr>
     <a:masterClrMapping/>
   </p:clrMapOvr>
-  <mc:AlternateContent xmlns:mc="http://schemas.openxmlformats.org/markup-compatibility/2006" xmlns:p14="http://schemas.microsoft.com/office/powerpoint/2010/main">
-    <mc:Choice Requires="p14">
+  <mc:AlternateContent xmlns:mc="http://schemas.openxmlformats.org/markup-compatibility/2006">
+    <mc:Choice xmlns:p14="http://schemas.microsoft.com/office/powerpoint/2010/main" xmlns="" Requires="p14">
       <p:transition spd="slow" p14:dur="2000">
         <p14:ferris dir="l"/>
       </p:transition>
     </mc:Choice>
-    <mc:Fallback xmlns="">
+    <mc:Fallback>
       <p:transition spd="slow">
         <p:fade/>
       </p:transition>
@@ -3383,13 +3383,13 @@
   <p:clrMapOvr>
     <a:masterClrMapping/>
   </p:clrMapOvr>
-  <mc:AlternateContent xmlns:mc="http://schemas.openxmlformats.org/markup-compatibility/2006" xmlns:p14="http://schemas.microsoft.com/office/powerpoint/2010/main">
-    <mc:Choice Requires="p14">
+  <mc:AlternateContent xmlns:mc="http://schemas.openxmlformats.org/markup-compatibility/2006">
+    <mc:Choice xmlns:p14="http://schemas.microsoft.com/office/powerpoint/2010/main" xmlns="" Requires="p14">
       <p:transition spd="slow" p14:dur="2000">
         <p14:ferris dir="l"/>
       </p:transition>
     </mc:Choice>
-    <mc:Fallback xmlns="">
+    <mc:Fallback>
       <p:transition spd="slow">
         <p:fade/>
       </p:transition>
@@ -4510,13 +4510,13 @@
   <p:clrMapOvr>
     <a:masterClrMapping/>
   </p:clrMapOvr>
-  <mc:AlternateContent xmlns:mc="http://schemas.openxmlformats.org/markup-compatibility/2006" xmlns:p14="http://schemas.microsoft.com/office/powerpoint/2010/main">
-    <mc:Choice Requires="p14">
+  <mc:AlternateContent xmlns:mc="http://schemas.openxmlformats.org/markup-compatibility/2006">
+    <mc:Choice xmlns:p14="http://schemas.microsoft.com/office/powerpoint/2010/main" xmlns="" Requires="p14">
       <p:transition spd="slow" p14:dur="2000">
         <p14:ferris dir="l"/>
       </p:transition>
     </mc:Choice>
-    <mc:Fallback xmlns="">
+    <mc:Fallback>
       <p:transition spd="slow">
         <p:fade/>
       </p:transition>
@@ -5632,13 +5632,13 @@
   <p:clrMapOvr>
     <a:masterClrMapping/>
   </p:clrMapOvr>
-  <mc:AlternateContent xmlns:mc="http://schemas.openxmlformats.org/markup-compatibility/2006" xmlns:p14="http://schemas.microsoft.com/office/powerpoint/2010/main">
-    <mc:Choice Requires="p14">
+  <mc:AlternateContent xmlns:mc="http://schemas.openxmlformats.org/markup-compatibility/2006">
+    <mc:Choice xmlns:p14="http://schemas.microsoft.com/office/powerpoint/2010/main" xmlns="" Requires="p14">
       <p:transition spd="slow" p14:dur="2000">
         <p14:ferris dir="l"/>
       </p:transition>
     </mc:Choice>
-    <mc:Fallback xmlns="">
+    <mc:Fallback>
       <p:transition spd="slow">
         <p:fade/>
       </p:transition>
@@ -7239,13 +7239,13 @@
   <p:clrMapOvr>
     <a:masterClrMapping/>
   </p:clrMapOvr>
-  <mc:AlternateContent xmlns:mc="http://schemas.openxmlformats.org/markup-compatibility/2006" xmlns:p14="http://schemas.microsoft.com/office/powerpoint/2010/main">
-    <mc:Choice Requires="p14">
+  <mc:AlternateContent xmlns:mc="http://schemas.openxmlformats.org/markup-compatibility/2006">
+    <mc:Choice xmlns:p14="http://schemas.microsoft.com/office/powerpoint/2010/main" xmlns="" Requires="p14">
       <p:transition spd="slow" p14:dur="2000">
         <p14:ferris dir="l"/>
       </p:transition>
     </mc:Choice>
-    <mc:Fallback xmlns="">
+    <mc:Fallback>
       <p:transition spd="slow">
         <p:fade/>
       </p:transition>
@@ -8425,13 +8425,13 @@
   <p:clrMapOvr>
     <a:masterClrMapping/>
   </p:clrMapOvr>
-  <mc:AlternateContent xmlns:mc="http://schemas.openxmlformats.org/markup-compatibility/2006" xmlns:p14="http://schemas.microsoft.com/office/powerpoint/2010/main">
-    <mc:Choice Requires="p14">
+  <mc:AlternateContent xmlns:mc="http://schemas.openxmlformats.org/markup-compatibility/2006">
+    <mc:Choice xmlns:p14="http://schemas.microsoft.com/office/powerpoint/2010/main" xmlns="" Requires="p14">
       <p:transition spd="slow" p14:dur="2000">
         <p14:ferris dir="l"/>
       </p:transition>
     </mc:Choice>
-    <mc:Fallback xmlns="">
+    <mc:Fallback>
       <p:transition spd="slow">
         <p:fade/>
       </p:transition>
@@ -9766,13 +9766,13 @@
   <p:clrMapOvr>
     <a:masterClrMapping/>
   </p:clrMapOvr>
-  <mc:AlternateContent xmlns:mc="http://schemas.openxmlformats.org/markup-compatibility/2006" xmlns:p14="http://schemas.microsoft.com/office/powerpoint/2010/main">
-    <mc:Choice Requires="p14">
+  <mc:AlternateContent xmlns:mc="http://schemas.openxmlformats.org/markup-compatibility/2006">
+    <mc:Choice xmlns:p14="http://schemas.microsoft.com/office/powerpoint/2010/main" xmlns="" Requires="p14">
       <p:transition spd="slow" p14:dur="2000">
         <p14:ferris dir="l"/>
       </p:transition>
     </mc:Choice>
-    <mc:Fallback xmlns="">
+    <mc:Fallback>
       <p:transition spd="slow">
         <p:fade/>
       </p:transition>
@@ -10803,13 +10803,13 @@
   <p:clrMapOvr>
     <a:masterClrMapping/>
   </p:clrMapOvr>
-  <mc:AlternateContent xmlns:mc="http://schemas.openxmlformats.org/markup-compatibility/2006" xmlns:p14="http://schemas.microsoft.com/office/powerpoint/2010/main">
-    <mc:Choice Requires="p14">
+  <mc:AlternateContent xmlns:mc="http://schemas.openxmlformats.org/markup-compatibility/2006">
+    <mc:Choice xmlns:p14="http://schemas.microsoft.com/office/powerpoint/2010/main" xmlns="" Requires="p14">
       <p:transition spd="slow" p14:dur="2000">
         <p14:ferris dir="l"/>
       </p:transition>
     </mc:Choice>
-    <mc:Fallback xmlns="">
+    <mc:Fallback>
       <p:transition spd="slow">
         <p:fade/>
       </p:transition>
@@ -11873,13 +11873,13 @@
   <p:clrMapOvr>
     <a:masterClrMapping/>
   </p:clrMapOvr>
-  <mc:AlternateContent xmlns:mc="http://schemas.openxmlformats.org/markup-compatibility/2006" xmlns:p14="http://schemas.microsoft.com/office/powerpoint/2010/main">
-    <mc:Choice Requires="p14">
+  <mc:AlternateContent xmlns:mc="http://schemas.openxmlformats.org/markup-compatibility/2006">
+    <mc:Choice xmlns:p14="http://schemas.microsoft.com/office/powerpoint/2010/main" xmlns="" Requires="p14">
       <p:transition spd="slow" p14:dur="2000">
         <p14:ferris dir="l"/>
       </p:transition>
     </mc:Choice>
-    <mc:Fallback xmlns="">
+    <mc:Fallback>
       <p:transition spd="slow">
         <p:fade/>
       </p:transition>
@@ -13038,13 +13038,13 @@
   <p:clrMapOvr>
     <a:masterClrMapping/>
   </p:clrMapOvr>
-  <mc:AlternateContent xmlns:mc="http://schemas.openxmlformats.org/markup-compatibility/2006" xmlns:p14="http://schemas.microsoft.com/office/powerpoint/2010/main">
-    <mc:Choice Requires="p14">
+  <mc:AlternateContent xmlns:mc="http://schemas.openxmlformats.org/markup-compatibility/2006">
+    <mc:Choice xmlns:p14="http://schemas.microsoft.com/office/powerpoint/2010/main" xmlns="" Requires="p14">
       <p:transition spd="slow" p14:dur="2000">
         <p14:ferris dir="l"/>
       </p:transition>
     </mc:Choice>
-    <mc:Fallback xmlns="">
+    <mc:Fallback>
       <p:transition spd="slow">
         <p:fade/>
       </p:transition>
@@ -14268,13 +14268,13 @@
   <p:clrMapOvr>
     <a:masterClrMapping/>
   </p:clrMapOvr>
-  <mc:AlternateContent xmlns:mc="http://schemas.openxmlformats.org/markup-compatibility/2006" xmlns:p14="http://schemas.microsoft.com/office/powerpoint/2010/main">
-    <mc:Choice Requires="p14">
+  <mc:AlternateContent xmlns:mc="http://schemas.openxmlformats.org/markup-compatibility/2006">
+    <mc:Choice xmlns:p14="http://schemas.microsoft.com/office/powerpoint/2010/main" xmlns="" Requires="p14">
       <p:transition spd="slow" p14:dur="2000">
         <p14:ferris dir="l"/>
       </p:transition>
     </mc:Choice>
-    <mc:Fallback xmlns="">
+    <mc:Fallback>
       <p:transition spd="slow">
         <p:fade/>
       </p:transition>
@@ -14584,13 +14584,13 @@
     <p:sldLayoutId id="2147483682" r:id="rId10"/>
     <p:sldLayoutId id="2147483683" r:id="rId11"/>
   </p:sldLayoutIdLst>
-  <mc:AlternateContent xmlns:mc="http://schemas.openxmlformats.org/markup-compatibility/2006" xmlns:p14="http://schemas.microsoft.com/office/powerpoint/2010/main">
-    <mc:Choice Requires="p14">
+  <mc:AlternateContent xmlns:mc="http://schemas.openxmlformats.org/markup-compatibility/2006">
+    <mc:Choice xmlns:p14="http://schemas.microsoft.com/office/powerpoint/2010/main" xmlns="" Requires="p14">
       <p:transition spd="slow" p14:dur="2000">
         <p14:ferris dir="l"/>
       </p:transition>
     </mc:Choice>
-    <mc:Fallback xmlns="">
+    <mc:Fallback>
       <p:transition spd="slow">
         <p:fade/>
       </p:transition>
@@ -15098,20 +15098,20 @@
     </p:spTree>
     <p:extLst>
       <p:ext uri="{BB962C8B-B14F-4D97-AF65-F5344CB8AC3E}">
-        <p14:creationId xmlns:p14="http://schemas.microsoft.com/office/powerpoint/2010/main" val="3270928020"/>
+        <p14:creationId xmlns:p14="http://schemas.microsoft.com/office/powerpoint/2010/main" xmlns="" val="3270928020"/>
       </p:ext>
     </p:extLst>
   </p:cSld>
   <p:clrMapOvr>
     <a:masterClrMapping/>
   </p:clrMapOvr>
-  <mc:AlternateContent xmlns:mc="http://schemas.openxmlformats.org/markup-compatibility/2006" xmlns:p14="http://schemas.microsoft.com/office/powerpoint/2010/main">
-    <mc:Choice Requires="p14">
+  <mc:AlternateContent xmlns:mc="http://schemas.openxmlformats.org/markup-compatibility/2006">
+    <mc:Choice xmlns:p14="http://schemas.microsoft.com/office/powerpoint/2010/main" xmlns="" Requires="p14">
       <p:transition spd="slow" p14:dur="2000">
         <p14:ferris dir="l"/>
       </p:transition>
     </mc:Choice>
-    <mc:Fallback xmlns="">
+    <mc:Fallback>
       <p:transition spd="slow">
         <p:fade/>
       </p:transition>
@@ -15226,20 +15226,20 @@
     </p:spTree>
     <p:extLst>
       <p:ext uri="{BB962C8B-B14F-4D97-AF65-F5344CB8AC3E}">
-        <p14:creationId xmlns:p14="http://schemas.microsoft.com/office/powerpoint/2010/main" val="3402630883"/>
+        <p14:creationId xmlns:p14="http://schemas.microsoft.com/office/powerpoint/2010/main" xmlns="" val="3402630883"/>
       </p:ext>
     </p:extLst>
   </p:cSld>
   <p:clrMapOvr>
     <a:masterClrMapping/>
   </p:clrMapOvr>
-  <mc:AlternateContent xmlns:mc="http://schemas.openxmlformats.org/markup-compatibility/2006" xmlns:p14="http://schemas.microsoft.com/office/powerpoint/2010/main">
-    <mc:Choice Requires="p14">
+  <mc:AlternateContent xmlns:mc="http://schemas.openxmlformats.org/markup-compatibility/2006">
+    <mc:Choice xmlns:p14="http://schemas.microsoft.com/office/powerpoint/2010/main" xmlns="" Requires="p14">
       <p:transition spd="slow" p14:dur="2000">
         <p14:ferris dir="l"/>
       </p:transition>
     </mc:Choice>
-    <mc:Fallback xmlns="">
+    <mc:Fallback>
       <p:transition spd="slow">
         <p:fade/>
       </p:transition>
@@ -15380,20 +15380,20 @@
     </p:spTree>
     <p:extLst>
       <p:ext uri="{BB962C8B-B14F-4D97-AF65-F5344CB8AC3E}">
-        <p14:creationId xmlns:p14="http://schemas.microsoft.com/office/powerpoint/2010/main" val="448605758"/>
+        <p14:creationId xmlns:p14="http://schemas.microsoft.com/office/powerpoint/2010/main" xmlns="" val="448605758"/>
       </p:ext>
     </p:extLst>
   </p:cSld>
   <p:clrMapOvr>
     <a:masterClrMapping/>
   </p:clrMapOvr>
-  <mc:AlternateContent xmlns:mc="http://schemas.openxmlformats.org/markup-compatibility/2006" xmlns:p14="http://schemas.microsoft.com/office/powerpoint/2010/main">
-    <mc:Choice Requires="p14">
+  <mc:AlternateContent xmlns:mc="http://schemas.openxmlformats.org/markup-compatibility/2006">
+    <mc:Choice xmlns:p14="http://schemas.microsoft.com/office/powerpoint/2010/main" xmlns="" Requires="p14">
       <p:transition spd="slow" p14:dur="2000">
         <p14:ferris dir="l"/>
       </p:transition>
     </mc:Choice>
-    <mc:Fallback xmlns="">
+    <mc:Fallback>
       <p:transition spd="slow">
         <p:fade/>
       </p:transition>
@@ -15494,20 +15494,20 @@
     </p:spTree>
     <p:extLst>
       <p:ext uri="{BB962C8B-B14F-4D97-AF65-F5344CB8AC3E}">
-        <p14:creationId xmlns:p14="http://schemas.microsoft.com/office/powerpoint/2010/main" val="2857799541"/>
+        <p14:creationId xmlns:p14="http://schemas.microsoft.com/office/powerpoint/2010/main" xmlns="" val="2857799541"/>
       </p:ext>
     </p:extLst>
   </p:cSld>
   <p:clrMapOvr>
     <a:masterClrMapping/>
   </p:clrMapOvr>
-  <mc:AlternateContent xmlns:mc="http://schemas.openxmlformats.org/markup-compatibility/2006" xmlns:p14="http://schemas.microsoft.com/office/powerpoint/2010/main">
-    <mc:Choice Requires="p14">
+  <mc:AlternateContent xmlns:mc="http://schemas.openxmlformats.org/markup-compatibility/2006">
+    <mc:Choice xmlns:p14="http://schemas.microsoft.com/office/powerpoint/2010/main" xmlns="" Requires="p14">
       <p:transition spd="slow" p14:dur="2000">
         <p14:ferris dir="l"/>
       </p:transition>
     </mc:Choice>
-    <mc:Fallback xmlns="">
+    <mc:Fallback>
       <p:transition spd="slow">
         <p:fade/>
       </p:transition>
@@ -15675,20 +15675,20 @@
     </p:spTree>
     <p:extLst>
       <p:ext uri="{BB962C8B-B14F-4D97-AF65-F5344CB8AC3E}">
-        <p14:creationId xmlns:p14="http://schemas.microsoft.com/office/powerpoint/2010/main" val="2323190142"/>
+        <p14:creationId xmlns:p14="http://schemas.microsoft.com/office/powerpoint/2010/main" xmlns="" val="2323190142"/>
       </p:ext>
     </p:extLst>
   </p:cSld>
   <p:clrMapOvr>
     <a:masterClrMapping/>
   </p:clrMapOvr>
-  <mc:AlternateContent xmlns:mc="http://schemas.openxmlformats.org/markup-compatibility/2006" xmlns:p14="http://schemas.microsoft.com/office/powerpoint/2010/main">
-    <mc:Choice Requires="p14">
+  <mc:AlternateContent xmlns:mc="http://schemas.openxmlformats.org/markup-compatibility/2006">
+    <mc:Choice xmlns:p14="http://schemas.microsoft.com/office/powerpoint/2010/main" xmlns="" Requires="p14">
       <p:transition spd="slow" p14:dur="2000">
         <p14:ferris dir="l"/>
       </p:transition>
     </mc:Choice>
-    <mc:Fallback xmlns="">
+    <mc:Fallback>
       <p:transition spd="slow">
         <p:fade/>
       </p:transition>
@@ -15765,20 +15765,20 @@
     </p:spTree>
     <p:extLst>
       <p:ext uri="{BB962C8B-B14F-4D97-AF65-F5344CB8AC3E}">
-        <p14:creationId xmlns:p14="http://schemas.microsoft.com/office/powerpoint/2010/main" val="581599888"/>
+        <p14:creationId xmlns:p14="http://schemas.microsoft.com/office/powerpoint/2010/main" xmlns="" val="581599888"/>
       </p:ext>
     </p:extLst>
   </p:cSld>
   <p:clrMapOvr>
     <a:masterClrMapping/>
   </p:clrMapOvr>
-  <mc:AlternateContent xmlns:mc="http://schemas.openxmlformats.org/markup-compatibility/2006" xmlns:p14="http://schemas.microsoft.com/office/powerpoint/2010/main">
-    <mc:Choice Requires="p14">
+  <mc:AlternateContent xmlns:mc="http://schemas.openxmlformats.org/markup-compatibility/2006">
+    <mc:Choice xmlns:p14="http://schemas.microsoft.com/office/powerpoint/2010/main" xmlns="" Requires="p14">
       <p:transition spd="slow" p14:dur="2000">
         <p14:ferris dir="l"/>
       </p:transition>
     </mc:Choice>
-    <mc:Fallback xmlns="">
+    <mc:Fallback>
       <p:transition spd="slow">
         <p:fade/>
       </p:transition>
@@ -15860,51 +15860,55 @@
             <a:pPr lvl="1"/>
             <a:r>
               <a:rPr lang="en-US" dirty="0" smtClean="0"/>
-              <a:t>Trying to display all friends would create a huge list that would take forever to find who you wanted. Auto-complete system is extremely fast and efficient and can handle a huge number of friends.</a:t>
-            </a:r>
-          </a:p>
-          <a:p>
-            <a:r>
-              <a:rPr lang="en-US" dirty="0" smtClean="0"/>
+              <a:t>Trying to display all friends would create a huge list that would take forever to find who you wanted. Auto-complete system is extremely fast and efficient and can handle a huge number of </a:t>
+            </a:r>
+            <a:r>
+              <a:rPr lang="en-US" smtClean="0"/>
+              <a:t>friends</a:t>
+            </a:r>
+            <a:r>
+              <a:rPr lang="en-US" smtClean="0"/>
+              <a:t>.</a:t>
+            </a:r>
+          </a:p>
+          <a:p>
+            <a:r>
+              <a:rPr lang="en-US" smtClean="0"/>
               <a:t>Desktop App</a:t>
             </a:r>
           </a:p>
           <a:p>
             <a:pPr lvl="1"/>
             <a:r>
-              <a:rPr lang="en-US" dirty="0" smtClean="0"/>
-              <a:t>Users </a:t>
-            </a:r>
-            <a:r>
-              <a:rPr lang="en-US" dirty="0"/>
-              <a:t>can log on to the desktop application through Facebook</a:t>
+              <a:rPr lang="en-US" smtClean="0"/>
+              <a:t>Users can log on to the desktop application through Facebook</a:t>
             </a:r>
           </a:p>
           <a:p>
             <a:pPr lvl="1"/>
             <a:r>
-              <a:rPr lang="en-US" dirty="0"/>
+              <a:rPr lang="en-US" smtClean="0"/>
               <a:t>User Interface:</a:t>
             </a:r>
           </a:p>
           <a:p>
             <a:pPr lvl="2"/>
             <a:r>
-              <a:rPr lang="en-US" dirty="0"/>
+              <a:rPr lang="en-US" smtClean="0"/>
               <a:t>Index Page (Messages), Nearby Messages, Groups Page, Help Page, Report/Feedback, Private Policy</a:t>
             </a:r>
           </a:p>
           <a:p>
             <a:pPr lvl="1"/>
             <a:r>
-              <a:rPr lang="en-US" dirty="0"/>
+              <a:rPr lang="en-US" smtClean="0"/>
               <a:t>Drop-Down display for groups and members in groups</a:t>
             </a:r>
           </a:p>
           <a:p>
             <a:pPr lvl="1"/>
             <a:r>
-              <a:rPr lang="en-US" dirty="0"/>
+              <a:rPr lang="en-US" smtClean="0"/>
               <a:t>Help displays for first time users</a:t>
             </a:r>
           </a:p>
@@ -15917,20 +15921,20 @@
     </p:spTree>
     <p:extLst>
       <p:ext uri="{BB962C8B-B14F-4D97-AF65-F5344CB8AC3E}">
-        <p14:creationId xmlns:p14="http://schemas.microsoft.com/office/powerpoint/2010/main" val="424291153"/>
+        <p14:creationId xmlns:p14="http://schemas.microsoft.com/office/powerpoint/2010/main" xmlns="" val="424291153"/>
       </p:ext>
     </p:extLst>
   </p:cSld>
   <p:clrMapOvr>
     <a:masterClrMapping/>
   </p:clrMapOvr>
-  <mc:AlternateContent xmlns:mc="http://schemas.openxmlformats.org/markup-compatibility/2006" xmlns:p14="http://schemas.microsoft.com/office/powerpoint/2010/main">
-    <mc:Choice Requires="p14">
+  <mc:AlternateContent xmlns:mc="http://schemas.openxmlformats.org/markup-compatibility/2006">
+    <mc:Choice xmlns:p14="http://schemas.microsoft.com/office/powerpoint/2010/main" xmlns="" Requires="p14">
       <p:transition spd="slow" p14:dur="2000">
         <p14:ferris dir="l"/>
       </p:transition>
     </mc:Choice>
-    <mc:Fallback xmlns="">
+    <mc:Fallback>
       <p:transition spd="slow">
         <p:fade/>
       </p:transition>
@@ -16026,20 +16030,20 @@
     </p:spTree>
     <p:extLst>
       <p:ext uri="{BB962C8B-B14F-4D97-AF65-F5344CB8AC3E}">
-        <p14:creationId xmlns:p14="http://schemas.microsoft.com/office/powerpoint/2010/main" val="2293241035"/>
+        <p14:creationId xmlns:p14="http://schemas.microsoft.com/office/powerpoint/2010/main" xmlns="" val="2293241035"/>
       </p:ext>
     </p:extLst>
   </p:cSld>
   <p:clrMapOvr>
     <a:masterClrMapping/>
   </p:clrMapOvr>
-  <mc:AlternateContent xmlns:mc="http://schemas.openxmlformats.org/markup-compatibility/2006" xmlns:p14="http://schemas.microsoft.com/office/powerpoint/2010/main">
-    <mc:Choice Requires="p14">
+  <mc:AlternateContent xmlns:mc="http://schemas.openxmlformats.org/markup-compatibility/2006">
+    <mc:Choice xmlns:p14="http://schemas.microsoft.com/office/powerpoint/2010/main" xmlns="" Requires="p14">
       <p:transition spd="slow" p14:dur="2000">
         <p14:ferris dir="l"/>
       </p:transition>
     </mc:Choice>
-    <mc:Fallback xmlns="">
+    <mc:Fallback>
       <p:transition spd="slow">
         <p:fade/>
       </p:transition>
@@ -16163,20 +16167,20 @@
     </p:spTree>
     <p:extLst>
       <p:ext uri="{BB962C8B-B14F-4D97-AF65-F5344CB8AC3E}">
-        <p14:creationId xmlns:p14="http://schemas.microsoft.com/office/powerpoint/2010/main" val="424291153"/>
+        <p14:creationId xmlns:p14="http://schemas.microsoft.com/office/powerpoint/2010/main" xmlns="" val="424291153"/>
       </p:ext>
     </p:extLst>
   </p:cSld>
   <p:clrMapOvr>
     <a:masterClrMapping/>
   </p:clrMapOvr>
-  <mc:AlternateContent xmlns:mc="http://schemas.openxmlformats.org/markup-compatibility/2006" xmlns:p14="http://schemas.microsoft.com/office/powerpoint/2010/main">
-    <mc:Choice Requires="p14">
+  <mc:AlternateContent xmlns:mc="http://schemas.openxmlformats.org/markup-compatibility/2006">
+    <mc:Choice xmlns:p14="http://schemas.microsoft.com/office/powerpoint/2010/main" xmlns="" Requires="p14">
       <p:transition spd="slow" p14:dur="2000">
         <p14:ferris dir="l"/>
       </p:transition>
     </mc:Choice>
-    <mc:Fallback xmlns="">
+    <mc:Fallback>
       <p:transition spd="slow">
         <p:fade/>
       </p:transition>
@@ -16302,13 +16306,13 @@
   <p:clrMapOvr>
     <a:masterClrMapping/>
   </p:clrMapOvr>
-  <mc:AlternateContent xmlns:mc="http://schemas.openxmlformats.org/markup-compatibility/2006" xmlns:p14="http://schemas.microsoft.com/office/powerpoint/2010/main">
-    <mc:Choice Requires="p14">
+  <mc:AlternateContent xmlns:mc="http://schemas.openxmlformats.org/markup-compatibility/2006">
+    <mc:Choice xmlns:p14="http://schemas.microsoft.com/office/powerpoint/2010/main" xmlns="" Requires="p14">
       <p:transition spd="slow" p14:dur="2000">
         <p14:ferris dir="l"/>
       </p:transition>
     </mc:Choice>
-    <mc:Fallback xmlns="">
+    <mc:Fallback>
       <p:transition spd="slow">
         <p:fade/>
       </p:transition>
@@ -16413,13 +16417,13 @@
   <p:clrMapOvr>
     <a:masterClrMapping/>
   </p:clrMapOvr>
-  <mc:AlternateContent xmlns:mc="http://schemas.openxmlformats.org/markup-compatibility/2006" xmlns:p14="http://schemas.microsoft.com/office/powerpoint/2010/main">
-    <mc:Choice Requires="p14">
+  <mc:AlternateContent xmlns:mc="http://schemas.openxmlformats.org/markup-compatibility/2006">
+    <mc:Choice xmlns:p14="http://schemas.microsoft.com/office/powerpoint/2010/main" xmlns="" Requires="p14">
       <p:transition spd="slow" p14:dur="2000">
         <p14:ferris dir="l"/>
       </p:transition>
     </mc:Choice>
-    <mc:Fallback xmlns="">
+    <mc:Fallback>
       <p:transition spd="slow">
         <p:fade/>
       </p:transition>
@@ -16527,7 +16531,15 @@
             </a:r>
             <a:r>
               <a:rPr lang="en-US" sz="2000" dirty="0" smtClean="0"/>
-              <a:t>text others within a certain user-defined </a:t>
+              <a:t>text others within a </a:t>
+            </a:r>
+            <a:r>
+              <a:rPr lang="en-US" sz="2000" dirty="0" smtClean="0"/>
+              <a:t>nearby</a:t>
+            </a:r>
+            <a:r>
+              <a:rPr lang="en-US" sz="2000" dirty="0" smtClean="0"/>
+              <a:t> </a:t>
             </a:r>
             <a:r>
               <a:rPr lang="en-US" sz="2000" dirty="0"/>
@@ -16544,20 +16556,20 @@
     </p:spTree>
     <p:extLst>
       <p:ext uri="{BB962C8B-B14F-4D97-AF65-F5344CB8AC3E}">
-        <p14:creationId xmlns:p14="http://schemas.microsoft.com/office/powerpoint/2010/main" val="1469798109"/>
+        <p14:creationId xmlns:p14="http://schemas.microsoft.com/office/powerpoint/2010/main" xmlns="" val="1469798109"/>
       </p:ext>
     </p:extLst>
   </p:cSld>
   <p:clrMapOvr>
     <a:masterClrMapping/>
   </p:clrMapOvr>
-  <mc:AlternateContent xmlns:mc="http://schemas.openxmlformats.org/markup-compatibility/2006" xmlns:p14="http://schemas.microsoft.com/office/powerpoint/2010/main">
-    <mc:Choice Requires="p14">
+  <mc:AlternateContent xmlns:mc="http://schemas.openxmlformats.org/markup-compatibility/2006">
+    <mc:Choice xmlns:p14="http://schemas.microsoft.com/office/powerpoint/2010/main" xmlns="" Requires="p14">
       <p:transition spd="slow" p14:dur="2000">
         <p14:ferris dir="l"/>
       </p:transition>
     </mc:Choice>
-    <mc:Fallback xmlns="">
+    <mc:Fallback>
       <p:transition spd="slow">
         <p:fade/>
       </p:transition>
@@ -16679,13 +16691,13 @@
   <p:clrMapOvr>
     <a:masterClrMapping/>
   </p:clrMapOvr>
-  <mc:AlternateContent xmlns:mc="http://schemas.openxmlformats.org/markup-compatibility/2006" xmlns:p14="http://schemas.microsoft.com/office/powerpoint/2010/main">
-    <mc:Choice Requires="p14">
+  <mc:AlternateContent xmlns:mc="http://schemas.openxmlformats.org/markup-compatibility/2006">
+    <mc:Choice xmlns:p14="http://schemas.microsoft.com/office/powerpoint/2010/main" xmlns="" Requires="p14">
       <p:transition spd="slow" p14:dur="2000">
         <p14:ferris dir="l"/>
       </p:transition>
     </mc:Choice>
-    <mc:Fallback xmlns="">
+    <mc:Fallback>
       <p:transition spd="slow">
         <p:fade/>
       </p:transition>
@@ -16863,13 +16875,13 @@
   <p:clrMapOvr>
     <a:masterClrMapping/>
   </p:clrMapOvr>
-  <mc:AlternateContent xmlns:mc="http://schemas.openxmlformats.org/markup-compatibility/2006" xmlns:p14="http://schemas.microsoft.com/office/powerpoint/2010/main">
-    <mc:Choice Requires="p14">
+  <mc:AlternateContent xmlns:mc="http://schemas.openxmlformats.org/markup-compatibility/2006">
+    <mc:Choice xmlns:p14="http://schemas.microsoft.com/office/powerpoint/2010/main" xmlns="" Requires="p14">
       <p:transition spd="slow" p14:dur="2000">
         <p14:ferris dir="l"/>
       </p:transition>
     </mc:Choice>
-    <mc:Fallback xmlns="">
+    <mc:Fallback>
       <p:transition spd="slow">
         <p:fade/>
       </p:transition>
@@ -17060,13 +17072,13 @@
   <p:clrMapOvr>
     <a:masterClrMapping/>
   </p:clrMapOvr>
-  <mc:AlternateContent xmlns:mc="http://schemas.openxmlformats.org/markup-compatibility/2006" xmlns:p14="http://schemas.microsoft.com/office/powerpoint/2010/main">
-    <mc:Choice Requires="p14">
+  <mc:AlternateContent xmlns:mc="http://schemas.openxmlformats.org/markup-compatibility/2006">
+    <mc:Choice xmlns:p14="http://schemas.microsoft.com/office/powerpoint/2010/main" xmlns="" Requires="p14">
       <p:transition spd="slow" p14:dur="2000">
         <p14:ferris dir="l"/>
       </p:transition>
     </mc:Choice>
-    <mc:Fallback xmlns="">
+    <mc:Fallback>
       <p:transition spd="slow">
         <p:fade/>
       </p:transition>
@@ -17162,20 +17174,20 @@
     </p:spTree>
     <p:extLst>
       <p:ext uri="{BB962C8B-B14F-4D97-AF65-F5344CB8AC3E}">
-        <p14:creationId xmlns:p14="http://schemas.microsoft.com/office/powerpoint/2010/main" val="2418521225"/>
+        <p14:creationId xmlns:p14="http://schemas.microsoft.com/office/powerpoint/2010/main" xmlns="" val="2418521225"/>
       </p:ext>
     </p:extLst>
   </p:cSld>
   <p:clrMapOvr>
     <a:masterClrMapping/>
   </p:clrMapOvr>
-  <mc:AlternateContent xmlns:mc="http://schemas.openxmlformats.org/markup-compatibility/2006" xmlns:p14="http://schemas.microsoft.com/office/powerpoint/2010/main">
-    <mc:Choice Requires="p14">
+  <mc:AlternateContent xmlns:mc="http://schemas.openxmlformats.org/markup-compatibility/2006">
+    <mc:Choice xmlns:p14="http://schemas.microsoft.com/office/powerpoint/2010/main" xmlns="" Requires="p14">
       <p:transition spd="slow" p14:dur="2000">
         <p14:ferris dir="l"/>
       </p:transition>
     </mc:Choice>
-    <mc:Fallback xmlns="">
+    <mc:Fallback>
       <p:transition spd="slow">
         <p:fade/>
       </p:transition>
@@ -17340,20 +17352,20 @@
     </p:spTree>
     <p:extLst>
       <p:ext uri="{BB962C8B-B14F-4D97-AF65-F5344CB8AC3E}">
-        <p14:creationId xmlns:p14="http://schemas.microsoft.com/office/powerpoint/2010/main" val="2901881089"/>
+        <p14:creationId xmlns:p14="http://schemas.microsoft.com/office/powerpoint/2010/main" xmlns="" val="2901881089"/>
       </p:ext>
     </p:extLst>
   </p:cSld>
   <p:clrMapOvr>
     <a:masterClrMapping/>
   </p:clrMapOvr>
-  <mc:AlternateContent xmlns:mc="http://schemas.openxmlformats.org/markup-compatibility/2006" xmlns:p14="http://schemas.microsoft.com/office/powerpoint/2010/main">
-    <mc:Choice Requires="p14">
+  <mc:AlternateContent xmlns:mc="http://schemas.openxmlformats.org/markup-compatibility/2006">
+    <mc:Choice xmlns:p14="http://schemas.microsoft.com/office/powerpoint/2010/main" xmlns="" Requires="p14">
       <p:transition spd="slow" p14:dur="2000">
         <p14:ferris dir="l"/>
       </p:transition>
     </mc:Choice>
-    <mc:Fallback xmlns="">
+    <mc:Fallback>
       <p:transition spd="slow">
         <p:fade/>
       </p:transition>
@@ -17440,15 +17452,25 @@
             <a:pPr lvl="1"/>
             <a:r>
               <a:rPr lang="en-US" dirty="0"/>
-              <a:t>Whoop Sharing</a:t>
-            </a:r>
+              <a:t>Whoop </a:t>
+            </a:r>
+            <a:r>
+              <a:rPr lang="en-US" dirty="0" smtClean="0"/>
+              <a:t>sharing</a:t>
+            </a:r>
+            <a:endParaRPr lang="en-US" dirty="0"/>
           </a:p>
           <a:p>
             <a:pPr lvl="1"/>
             <a:r>
               <a:rPr lang="en-US" dirty="0"/>
-              <a:t>Whoop-Txt conversation list</a:t>
-            </a:r>
+              <a:t>Whoop-Txt </a:t>
+            </a:r>
+            <a:r>
+              <a:rPr lang="en-US" dirty="0" smtClean="0"/>
+              <a:t> message list</a:t>
+            </a:r>
+            <a:endParaRPr lang="en-US" dirty="0"/>
           </a:p>
           <a:p>
             <a:r>
@@ -17506,20 +17528,20 @@
     </p:spTree>
     <p:extLst>
       <p:ext uri="{BB962C8B-B14F-4D97-AF65-F5344CB8AC3E}">
-        <p14:creationId xmlns:p14="http://schemas.microsoft.com/office/powerpoint/2010/main" val="3668074173"/>
+        <p14:creationId xmlns:p14="http://schemas.microsoft.com/office/powerpoint/2010/main" xmlns="" val="3668074173"/>
       </p:ext>
     </p:extLst>
   </p:cSld>
   <p:clrMapOvr>
     <a:masterClrMapping/>
   </p:clrMapOvr>
-  <mc:AlternateContent xmlns:mc="http://schemas.openxmlformats.org/markup-compatibility/2006" xmlns:p14="http://schemas.microsoft.com/office/powerpoint/2010/main">
-    <mc:Choice Requires="p14">
+  <mc:AlternateContent xmlns:mc="http://schemas.openxmlformats.org/markup-compatibility/2006">
+    <mc:Choice xmlns:p14="http://schemas.microsoft.com/office/powerpoint/2010/main" xmlns="" Requires="p14">
       <p:transition spd="slow" p14:dur="2000">
         <p14:ferris dir="l"/>
       </p:transition>
     </mc:Choice>
-    <mc:Fallback xmlns="">
+    <mc:Fallback>
       <p:transition spd="slow">
         <p:fade/>
       </p:transition>
@@ -17643,20 +17665,20 @@
     </p:spTree>
     <p:extLst>
       <p:ext uri="{BB962C8B-B14F-4D97-AF65-F5344CB8AC3E}">
-        <p14:creationId xmlns:p14="http://schemas.microsoft.com/office/powerpoint/2010/main" val="2018697858"/>
+        <p14:creationId xmlns:p14="http://schemas.microsoft.com/office/powerpoint/2010/main" xmlns="" val="2018697858"/>
       </p:ext>
     </p:extLst>
   </p:cSld>
   <p:clrMapOvr>
     <a:masterClrMapping/>
   </p:clrMapOvr>
-  <mc:AlternateContent xmlns:mc="http://schemas.openxmlformats.org/markup-compatibility/2006" xmlns:p14="http://schemas.microsoft.com/office/powerpoint/2010/main">
-    <mc:Choice Requires="p14">
+  <mc:AlternateContent xmlns:mc="http://schemas.openxmlformats.org/markup-compatibility/2006">
+    <mc:Choice xmlns:p14="http://schemas.microsoft.com/office/powerpoint/2010/main" xmlns="" Requires="p14">
       <p:transition spd="slow" p14:dur="2000">
         <p14:ferris dir="l"/>
       </p:transition>
     </mc:Choice>
-    <mc:Fallback xmlns="">
+    <mc:Fallback>
       <p:transition spd="slow">
         <p:fade/>
       </p:transition>
@@ -17786,7 +17808,11 @@
             </a:r>
             <a:r>
               <a:rPr lang="en-US" sz="1800" dirty="0" smtClean="0"/>
-              <a:t>user’s geo-locations to see their message</a:t>
+              <a:t>user’s geo-locations to see their </a:t>
+            </a:r>
+            <a:r>
+              <a:rPr lang="en-US" sz="1800" dirty="0" smtClean="0"/>
+              <a:t>message.</a:t>
             </a:r>
             <a:endParaRPr lang="en-US" sz="1800" dirty="0"/>
           </a:p>
@@ -17795,20 +17821,20 @@
     </p:spTree>
     <p:extLst>
       <p:ext uri="{BB962C8B-B14F-4D97-AF65-F5344CB8AC3E}">
-        <p14:creationId xmlns:p14="http://schemas.microsoft.com/office/powerpoint/2010/main" val="1159455994"/>
+        <p14:creationId xmlns:p14="http://schemas.microsoft.com/office/powerpoint/2010/main" xmlns="" val="1159455994"/>
       </p:ext>
     </p:extLst>
   </p:cSld>
   <p:clrMapOvr>
     <a:masterClrMapping/>
   </p:clrMapOvr>
-  <mc:AlternateContent xmlns:mc="http://schemas.openxmlformats.org/markup-compatibility/2006" xmlns:p14="http://schemas.microsoft.com/office/powerpoint/2010/main">
-    <mc:Choice Requires="p14">
+  <mc:AlternateContent xmlns:mc="http://schemas.openxmlformats.org/markup-compatibility/2006">
+    <mc:Choice xmlns:p14="http://schemas.microsoft.com/office/powerpoint/2010/main" xmlns="" Requires="p14">
       <p:transition spd="slow" p14:dur="2000">
         <p14:ferris dir="l"/>
       </p:transition>
     </mc:Choice>
-    <mc:Fallback xmlns="">
+    <mc:Fallback>
       <p:transition spd="slow">
         <p:fade/>
       </p:transition>
@@ -17937,20 +17963,20 @@
     </p:spTree>
     <p:extLst>
       <p:ext uri="{BB962C8B-B14F-4D97-AF65-F5344CB8AC3E}">
-        <p14:creationId xmlns:p14="http://schemas.microsoft.com/office/powerpoint/2010/main" val="2043556417"/>
+        <p14:creationId xmlns:p14="http://schemas.microsoft.com/office/powerpoint/2010/main" xmlns="" val="2043556417"/>
       </p:ext>
     </p:extLst>
   </p:cSld>
   <p:clrMapOvr>
     <a:masterClrMapping/>
   </p:clrMapOvr>
-  <mc:AlternateContent xmlns:mc="http://schemas.openxmlformats.org/markup-compatibility/2006" xmlns:p14="http://schemas.microsoft.com/office/powerpoint/2010/main">
-    <mc:Choice Requires="p14">
+  <mc:AlternateContent xmlns:mc="http://schemas.openxmlformats.org/markup-compatibility/2006">
+    <mc:Choice xmlns:p14="http://schemas.microsoft.com/office/powerpoint/2010/main" xmlns="" Requires="p14">
       <p:transition spd="slow" p14:dur="2000">
         <p14:ferris dir="l"/>
       </p:transition>
     </mc:Choice>
-    <mc:Fallback xmlns="">
+    <mc:Fallback>
       <p:transition spd="slow">
         <p:fade/>
       </p:transition>
@@ -18109,20 +18135,20 @@
     </p:spTree>
     <p:extLst>
       <p:ext uri="{BB962C8B-B14F-4D97-AF65-F5344CB8AC3E}">
-        <p14:creationId xmlns:p14="http://schemas.microsoft.com/office/powerpoint/2010/main" val="269415945"/>
+        <p14:creationId xmlns:p14="http://schemas.microsoft.com/office/powerpoint/2010/main" xmlns="" val="269415945"/>
       </p:ext>
     </p:extLst>
   </p:cSld>
   <p:clrMapOvr>
     <a:masterClrMapping/>
   </p:clrMapOvr>
-  <mc:AlternateContent xmlns:mc="http://schemas.openxmlformats.org/markup-compatibility/2006" xmlns:p14="http://schemas.microsoft.com/office/powerpoint/2010/main">
-    <mc:Choice Requires="p14">
+  <mc:AlternateContent xmlns:mc="http://schemas.openxmlformats.org/markup-compatibility/2006">
+    <mc:Choice xmlns:p14="http://schemas.microsoft.com/office/powerpoint/2010/main" xmlns="" Requires="p14">
       <p:transition spd="slow" p14:dur="2000">
         <p14:ferris dir="l"/>
       </p:transition>
     </mc:Choice>
-    <mc:Fallback xmlns="">
+    <mc:Fallback>
       <p:transition spd="slow">
         <p:fade/>
       </p:transition>
@@ -18228,20 +18254,20 @@
     </p:spTree>
     <p:extLst>
       <p:ext uri="{BB962C8B-B14F-4D97-AF65-F5344CB8AC3E}">
-        <p14:creationId xmlns:p14="http://schemas.microsoft.com/office/powerpoint/2010/main" val="4140326256"/>
+        <p14:creationId xmlns:p14="http://schemas.microsoft.com/office/powerpoint/2010/main" xmlns="" val="4140326256"/>
       </p:ext>
     </p:extLst>
   </p:cSld>
   <p:clrMapOvr>
     <a:masterClrMapping/>
   </p:clrMapOvr>
-  <mc:AlternateContent xmlns:mc="http://schemas.openxmlformats.org/markup-compatibility/2006" xmlns:p14="http://schemas.microsoft.com/office/powerpoint/2010/main">
-    <mc:Choice Requires="p14">
+  <mc:AlternateContent xmlns:mc="http://schemas.openxmlformats.org/markup-compatibility/2006">
+    <mc:Choice xmlns:p14="http://schemas.microsoft.com/office/powerpoint/2010/main" xmlns="" Requires="p14">
       <p:transition spd="slow" p14:dur="2000">
         <p14:ferris dir="l"/>
       </p:transition>
     </mc:Choice>
-    <mc:Fallback xmlns="">
+    <mc:Fallback>
       <p:transition spd="slow">
         <p:fade/>
       </p:transition>
@@ -18310,7 +18336,7 @@
           <a:blip r:embed="rId2" cstate="print">
             <a:extLst>
               <a:ext uri="{28A0092B-C50C-407E-A947-70E740481C1C}">
-                <a14:useLocalDpi xmlns:a14="http://schemas.microsoft.com/office/drawing/2010/main" val="0"/>
+                <a14:useLocalDpi xmlns:a14="http://schemas.microsoft.com/office/drawing/2010/main" xmlns="" val="0"/>
               </a:ext>
             </a:extLst>
           </a:blip>
@@ -18333,14 +18359,14 @@
           <a:effectLst/>
           <a:extLst>
             <a:ext uri="{909E8E84-426E-40DD-AFC4-6F175D3DCCD1}">
-              <a14:hiddenFill xmlns:a14="http://schemas.microsoft.com/office/drawing/2010/main">
+              <a14:hiddenFill xmlns:a14="http://schemas.microsoft.com/office/drawing/2010/main" xmlns="">
                 <a:solidFill>
                   <a:schemeClr val="accent1"/>
                 </a:solidFill>
               </a14:hiddenFill>
             </a:ext>
             <a:ext uri="{91240B29-F687-4F45-9708-019B960494DF}">
-              <a14:hiddenLine xmlns:a14="http://schemas.microsoft.com/office/drawing/2010/main" w="9525">
+              <a14:hiddenLine xmlns:a14="http://schemas.microsoft.com/office/drawing/2010/main" xmlns="" w="9525">
                 <a:solidFill>
                   <a:schemeClr val="tx1"/>
                 </a:solidFill>
@@ -18350,7 +18376,7 @@
               </a14:hiddenLine>
             </a:ext>
             <a:ext uri="{AF507438-7753-43E0-B8FC-AC1667EBCBE1}">
-              <a14:hiddenEffects xmlns:a14="http://schemas.microsoft.com/office/drawing/2010/main">
+              <a14:hiddenEffects xmlns:a14="http://schemas.microsoft.com/office/drawing/2010/main" xmlns="">
                 <a:effectLst>
                   <a:outerShdw dist="35921" dir="2700000" algn="ctr" rotWithShape="0">
                     <a:schemeClr val="bg2"/>
@@ -18364,20 +18390,20 @@
     </p:spTree>
     <p:extLst>
       <p:ext uri="{BB962C8B-B14F-4D97-AF65-F5344CB8AC3E}">
-        <p14:creationId xmlns:p14="http://schemas.microsoft.com/office/powerpoint/2010/main" val="2701624253"/>
+        <p14:creationId xmlns:p14="http://schemas.microsoft.com/office/powerpoint/2010/main" xmlns="" val="2701624253"/>
       </p:ext>
     </p:extLst>
   </p:cSld>
   <p:clrMapOvr>
     <a:masterClrMapping/>
   </p:clrMapOvr>
-  <mc:AlternateContent xmlns:mc="http://schemas.openxmlformats.org/markup-compatibility/2006" xmlns:p14="http://schemas.microsoft.com/office/powerpoint/2010/main">
-    <mc:Choice Requires="p14">
+  <mc:AlternateContent xmlns:mc="http://schemas.openxmlformats.org/markup-compatibility/2006">
+    <mc:Choice xmlns:p14="http://schemas.microsoft.com/office/powerpoint/2010/main" xmlns="" Requires="p14">
       <p:transition spd="slow" p14:dur="2000">
         <p14:ferris dir="l"/>
       </p:transition>
     </mc:Choice>
-    <mc:Fallback xmlns="">
+    <mc:Fallback>
       <p:transition spd="slow">
         <p:fade/>
       </p:transition>

</xml_diff>